<commit_message>
Abstract, introduction, images and table are ready.
</commit_message>
<xml_diff>
--- a/doc/ECCB2012_paper/Conversion.pptx
+++ b/doc/ECCB2012_paper/Conversion.pptx
@@ -292,7 +292,7 @@
             <a:fld id="{7FFB8D8C-A3C7-4ABD-A7A4-8E27FCE4E604}" type="datetimeFigureOut">
               <a:rPr lang="de-DE" smtClean="0"/>
               <a:pPr/>
-              <a:t>19.03.2012</a:t>
+              <a:t>20.03.2012</a:t>
             </a:fld>
             <a:endParaRPr lang="de-DE"/>
           </a:p>
@@ -459,7 +459,7 @@
             <a:fld id="{7FFB8D8C-A3C7-4ABD-A7A4-8E27FCE4E604}" type="datetimeFigureOut">
               <a:rPr lang="de-DE" smtClean="0"/>
               <a:pPr/>
-              <a:t>19.03.2012</a:t>
+              <a:t>20.03.2012</a:t>
             </a:fld>
             <a:endParaRPr lang="de-DE"/>
           </a:p>
@@ -636,7 +636,7 @@
             <a:fld id="{7FFB8D8C-A3C7-4ABD-A7A4-8E27FCE4E604}" type="datetimeFigureOut">
               <a:rPr lang="de-DE" smtClean="0"/>
               <a:pPr/>
-              <a:t>19.03.2012</a:t>
+              <a:t>20.03.2012</a:t>
             </a:fld>
             <a:endParaRPr lang="de-DE"/>
           </a:p>
@@ -803,7 +803,7 @@
             <a:fld id="{7FFB8D8C-A3C7-4ABD-A7A4-8E27FCE4E604}" type="datetimeFigureOut">
               <a:rPr lang="de-DE" smtClean="0"/>
               <a:pPr/>
-              <a:t>19.03.2012</a:t>
+              <a:t>20.03.2012</a:t>
             </a:fld>
             <a:endParaRPr lang="de-DE"/>
           </a:p>
@@ -1046,7 +1046,7 @@
             <a:fld id="{7FFB8D8C-A3C7-4ABD-A7A4-8E27FCE4E604}" type="datetimeFigureOut">
               <a:rPr lang="de-DE" smtClean="0"/>
               <a:pPr/>
-              <a:t>19.03.2012</a:t>
+              <a:t>20.03.2012</a:t>
             </a:fld>
             <a:endParaRPr lang="de-DE"/>
           </a:p>
@@ -1331,7 +1331,7 @@
             <a:fld id="{7FFB8D8C-A3C7-4ABD-A7A4-8E27FCE4E604}" type="datetimeFigureOut">
               <a:rPr lang="de-DE" smtClean="0"/>
               <a:pPr/>
-              <a:t>19.03.2012</a:t>
+              <a:t>20.03.2012</a:t>
             </a:fld>
             <a:endParaRPr lang="de-DE"/>
           </a:p>
@@ -1750,7 +1750,7 @@
             <a:fld id="{7FFB8D8C-A3C7-4ABD-A7A4-8E27FCE4E604}" type="datetimeFigureOut">
               <a:rPr lang="de-DE" smtClean="0"/>
               <a:pPr/>
-              <a:t>19.03.2012</a:t>
+              <a:t>20.03.2012</a:t>
             </a:fld>
             <a:endParaRPr lang="de-DE"/>
           </a:p>
@@ -1865,7 +1865,7 @@
             <a:fld id="{7FFB8D8C-A3C7-4ABD-A7A4-8E27FCE4E604}" type="datetimeFigureOut">
               <a:rPr lang="de-DE" smtClean="0"/>
               <a:pPr/>
-              <a:t>19.03.2012</a:t>
+              <a:t>20.03.2012</a:t>
             </a:fld>
             <a:endParaRPr lang="de-DE"/>
           </a:p>
@@ -1957,7 +1957,7 @@
             <a:fld id="{7FFB8D8C-A3C7-4ABD-A7A4-8E27FCE4E604}" type="datetimeFigureOut">
               <a:rPr lang="de-DE" smtClean="0"/>
               <a:pPr/>
-              <a:t>19.03.2012</a:t>
+              <a:t>20.03.2012</a:t>
             </a:fld>
             <a:endParaRPr lang="de-DE"/>
           </a:p>
@@ -2231,7 +2231,7 @@
             <a:fld id="{7FFB8D8C-A3C7-4ABD-A7A4-8E27FCE4E604}" type="datetimeFigureOut">
               <a:rPr lang="de-DE" smtClean="0"/>
               <a:pPr/>
-              <a:t>19.03.2012</a:t>
+              <a:t>20.03.2012</a:t>
             </a:fld>
             <a:endParaRPr lang="de-DE"/>
           </a:p>
@@ -2481,7 +2481,7 @@
             <a:fld id="{7FFB8D8C-A3C7-4ABD-A7A4-8E27FCE4E604}" type="datetimeFigureOut">
               <a:rPr lang="de-DE" smtClean="0"/>
               <a:pPr/>
-              <a:t>19.03.2012</a:t>
+              <a:t>20.03.2012</a:t>
             </a:fld>
             <a:endParaRPr lang="de-DE"/>
           </a:p>
@@ -2691,7 +2691,7 @@
             <a:fld id="{7FFB8D8C-A3C7-4ABD-A7A4-8E27FCE4E604}" type="datetimeFigureOut">
               <a:rPr lang="de-DE" smtClean="0"/>
               <a:pPr/>
-              <a:t>19.03.2012</a:t>
+              <a:t>20.03.2012</a:t>
             </a:fld>
             <a:endParaRPr lang="de-DE"/>
           </a:p>
@@ -10038,18 +10038,107 @@
       </p:grpSpPr>
       <p:sp>
         <p:nvSpPr>
+          <p:cNvPr id="81" name="Abgerundetes Rechteck 80"/>
+          <p:cNvSpPr/>
+          <p:nvPr/>
+        </p:nvSpPr>
+        <p:spPr>
+          <a:xfrm>
+            <a:off x="4786314" y="71414"/>
+            <a:ext cx="4286280" cy="5000636"/>
+          </a:xfrm>
+          <a:prstGeom prst="roundRect">
+            <a:avLst>
+              <a:gd name="adj" fmla="val 5553"/>
+            </a:avLst>
+          </a:prstGeom>
+          <a:noFill/>
+          <a:ln w="25400"/>
+        </p:spPr>
+        <p:style>
+          <a:lnRef idx="1">
+            <a:schemeClr val="accent3"/>
+          </a:lnRef>
+          <a:fillRef idx="2">
+            <a:schemeClr val="accent3"/>
+          </a:fillRef>
+          <a:effectRef idx="1">
+            <a:schemeClr val="accent3"/>
+          </a:effectRef>
+          <a:fontRef idx="minor">
+            <a:schemeClr val="dk1"/>
+          </a:fontRef>
+        </p:style>
+        <p:txBody>
+          <a:bodyPr rtlCol="0" anchor="ctr"/>
+          <a:lstStyle/>
+          <a:p>
+            <a:pPr algn="ctr"/>
+            <a:endParaRPr lang="de-DE"/>
+          </a:p>
+        </p:txBody>
+      </p:sp>
+      <p:sp>
+        <p:nvSpPr>
+          <p:cNvPr id="80" name="Abgerundetes Rechteck 79"/>
+          <p:cNvSpPr/>
+          <p:nvPr/>
+        </p:nvSpPr>
+        <p:spPr>
+          <a:xfrm>
+            <a:off x="71438" y="71438"/>
+            <a:ext cx="4500562" cy="5000636"/>
+          </a:xfrm>
+          <a:prstGeom prst="roundRect">
+            <a:avLst>
+              <a:gd name="adj" fmla="val 5553"/>
+            </a:avLst>
+          </a:prstGeom>
+          <a:noFill/>
+          <a:ln w="25400"/>
+        </p:spPr>
+        <p:style>
+          <a:lnRef idx="1">
+            <a:schemeClr val="accent2"/>
+          </a:lnRef>
+          <a:fillRef idx="2">
+            <a:schemeClr val="accent2"/>
+          </a:fillRef>
+          <a:effectRef idx="1">
+            <a:schemeClr val="accent2"/>
+          </a:effectRef>
+          <a:fontRef idx="minor">
+            <a:schemeClr val="dk1"/>
+          </a:fontRef>
+        </p:style>
+        <p:txBody>
+          <a:bodyPr rtlCol="0" anchor="ctr"/>
+          <a:lstStyle/>
+          <a:p>
+            <a:pPr algn="ctr"/>
+            <a:endParaRPr lang="de-DE"/>
+          </a:p>
+        </p:txBody>
+      </p:sp>
+      <p:sp>
+        <p:nvSpPr>
           <p:cNvPr id="4" name="Abgerundetes Rechteck 3"/>
           <p:cNvSpPr/>
           <p:nvPr/>
         </p:nvSpPr>
         <p:spPr>
           <a:xfrm>
-            <a:off x="71406" y="1285860"/>
+            <a:off x="142876" y="1285860"/>
             <a:ext cx="785818" cy="214314"/>
           </a:xfrm>
           <a:prstGeom prst="roundRect">
             <a:avLst/>
           </a:prstGeom>
+          <a:solidFill>
+            <a:srgbClr val="FBF3F3">
+              <a:alpha val="92000"/>
+            </a:srgbClr>
+          </a:solidFill>
         </p:spPr>
         <p:style>
           <a:lnRef idx="2">
@@ -10086,12 +10175,17 @@
         </p:nvSpPr>
         <p:spPr>
           <a:xfrm>
-            <a:off x="1357290" y="1285860"/>
+            <a:off x="1428760" y="1285860"/>
             <a:ext cx="1071570" cy="214314"/>
           </a:xfrm>
           <a:prstGeom prst="roundRect">
             <a:avLst/>
           </a:prstGeom>
+          <a:solidFill>
+            <a:srgbClr val="FBF3F3">
+              <a:alpha val="92000"/>
+            </a:srgbClr>
+          </a:solidFill>
         </p:spPr>
         <p:style>
           <a:lnRef idx="2">
@@ -10128,12 +10222,17 @@
         </p:nvSpPr>
         <p:spPr>
           <a:xfrm>
-            <a:off x="2857488" y="214290"/>
+            <a:off x="2928958" y="214290"/>
             <a:ext cx="1143008" cy="214314"/>
           </a:xfrm>
           <a:prstGeom prst="roundRect">
             <a:avLst/>
           </a:prstGeom>
+          <a:solidFill>
+            <a:srgbClr val="FBF3F3">
+              <a:alpha val="92000"/>
+            </a:srgbClr>
+          </a:solidFill>
         </p:spPr>
         <p:style>
           <a:lnRef idx="2">
@@ -10170,12 +10269,17 @@
         </p:nvSpPr>
         <p:spPr>
           <a:xfrm>
-            <a:off x="214282" y="1857364"/>
+            <a:off x="285752" y="1857364"/>
             <a:ext cx="1000132" cy="214314"/>
           </a:xfrm>
           <a:prstGeom prst="roundRect">
             <a:avLst/>
           </a:prstGeom>
+          <a:solidFill>
+            <a:srgbClr val="FBF3F3">
+              <a:alpha val="92000"/>
+            </a:srgbClr>
+          </a:solidFill>
         </p:spPr>
         <p:style>
           <a:lnRef idx="2">
@@ -10212,12 +10316,17 @@
         </p:nvSpPr>
         <p:spPr>
           <a:xfrm>
-            <a:off x="2857488" y="1000108"/>
+            <a:off x="2928958" y="1000108"/>
             <a:ext cx="1143008" cy="214314"/>
           </a:xfrm>
           <a:prstGeom prst="roundRect">
             <a:avLst/>
           </a:prstGeom>
+          <a:solidFill>
+            <a:srgbClr val="FBF3F3">
+              <a:alpha val="92000"/>
+            </a:srgbClr>
+          </a:solidFill>
         </p:spPr>
         <p:style>
           <a:lnRef idx="2">
@@ -10254,12 +10363,17 @@
         </p:nvSpPr>
         <p:spPr>
           <a:xfrm>
-            <a:off x="2857488" y="1285860"/>
+            <a:off x="2928958" y="1285860"/>
             <a:ext cx="1143008" cy="214314"/>
           </a:xfrm>
           <a:prstGeom prst="roundRect">
             <a:avLst/>
           </a:prstGeom>
+          <a:solidFill>
+            <a:srgbClr val="FBF3F3">
+              <a:alpha val="92000"/>
+            </a:srgbClr>
+          </a:solidFill>
         </p:spPr>
         <p:style>
           <a:lnRef idx="2">
@@ -10296,12 +10410,17 @@
         </p:nvSpPr>
         <p:spPr>
           <a:xfrm>
-            <a:off x="2857488" y="1571612"/>
+            <a:off x="2928958" y="1571612"/>
             <a:ext cx="1143008" cy="214314"/>
           </a:xfrm>
           <a:prstGeom prst="roundRect">
             <a:avLst/>
           </a:prstGeom>
+          <a:solidFill>
+            <a:srgbClr val="FBF3F3">
+              <a:alpha val="92000"/>
+            </a:srgbClr>
+          </a:solidFill>
         </p:spPr>
         <p:style>
           <a:lnRef idx="2">
@@ -10338,12 +10457,17 @@
         </p:nvSpPr>
         <p:spPr>
           <a:xfrm>
-            <a:off x="2857488" y="1857364"/>
+            <a:off x="2928958" y="1857364"/>
             <a:ext cx="1143008" cy="214314"/>
           </a:xfrm>
           <a:prstGeom prst="roundRect">
             <a:avLst/>
           </a:prstGeom>
+          <a:solidFill>
+            <a:srgbClr val="FBF3F3">
+              <a:alpha val="92000"/>
+            </a:srgbClr>
+          </a:solidFill>
         </p:spPr>
         <p:style>
           <a:lnRef idx="2">
@@ -10380,12 +10504,17 @@
         </p:nvSpPr>
         <p:spPr>
           <a:xfrm>
-            <a:off x="2857488" y="2143116"/>
+            <a:off x="2928958" y="2143116"/>
             <a:ext cx="1143008" cy="214314"/>
           </a:xfrm>
           <a:prstGeom prst="roundRect">
             <a:avLst/>
           </a:prstGeom>
+          <a:solidFill>
+            <a:srgbClr val="FBF3F3">
+              <a:alpha val="92000"/>
+            </a:srgbClr>
+          </a:solidFill>
         </p:spPr>
         <p:style>
           <a:lnRef idx="2">
@@ -10422,12 +10551,17 @@
         </p:nvSpPr>
         <p:spPr>
           <a:xfrm>
-            <a:off x="214282" y="2500306"/>
+            <a:off x="285752" y="2500306"/>
             <a:ext cx="1428760" cy="214314"/>
           </a:xfrm>
           <a:prstGeom prst="roundRect">
             <a:avLst/>
           </a:prstGeom>
+          <a:solidFill>
+            <a:srgbClr val="FBF3F3">
+              <a:alpha val="92000"/>
+            </a:srgbClr>
+          </a:solidFill>
         </p:spPr>
         <p:style>
           <a:lnRef idx="2">
@@ -10464,12 +10598,17 @@
         </p:nvSpPr>
         <p:spPr>
           <a:xfrm>
-            <a:off x="1357290" y="3000373"/>
+            <a:off x="1428760" y="3000373"/>
             <a:ext cx="1000132" cy="214314"/>
           </a:xfrm>
           <a:prstGeom prst="roundRect">
             <a:avLst/>
           </a:prstGeom>
+          <a:solidFill>
+            <a:srgbClr val="FBF3F3">
+              <a:alpha val="92000"/>
+            </a:srgbClr>
+          </a:solidFill>
         </p:spPr>
         <p:style>
           <a:lnRef idx="2">
@@ -10506,12 +10645,17 @@
         </p:nvSpPr>
         <p:spPr>
           <a:xfrm>
-            <a:off x="1357290" y="4357695"/>
+            <a:off x="1428760" y="4357695"/>
             <a:ext cx="1000132" cy="214314"/>
           </a:xfrm>
           <a:prstGeom prst="roundRect">
             <a:avLst/>
           </a:prstGeom>
+          <a:solidFill>
+            <a:srgbClr val="FBF3F3">
+              <a:alpha val="92000"/>
+            </a:srgbClr>
+          </a:solidFill>
         </p:spPr>
         <p:style>
           <a:lnRef idx="2">
@@ -10548,12 +10692,17 @@
         </p:nvSpPr>
         <p:spPr>
           <a:xfrm>
-            <a:off x="2857488" y="3000373"/>
+            <a:off x="2928958" y="3000373"/>
             <a:ext cx="1571636" cy="214314"/>
           </a:xfrm>
           <a:prstGeom prst="roundRect">
             <a:avLst/>
           </a:prstGeom>
+          <a:solidFill>
+            <a:srgbClr val="FBF3F3">
+              <a:alpha val="92000"/>
+            </a:srgbClr>
+          </a:solidFill>
         </p:spPr>
         <p:style>
           <a:lnRef idx="2">
@@ -10590,12 +10739,17 @@
         </p:nvSpPr>
         <p:spPr>
           <a:xfrm>
-            <a:off x="2857488" y="2714621"/>
+            <a:off x="2928958" y="2714621"/>
             <a:ext cx="1571636" cy="214314"/>
           </a:xfrm>
           <a:prstGeom prst="roundRect">
             <a:avLst/>
           </a:prstGeom>
+          <a:solidFill>
+            <a:srgbClr val="FBF3F3">
+              <a:alpha val="92000"/>
+            </a:srgbClr>
+          </a:solidFill>
         </p:spPr>
         <p:style>
           <a:lnRef idx="2">
@@ -10632,12 +10786,17 @@
         </p:nvSpPr>
         <p:spPr>
           <a:xfrm>
-            <a:off x="2857488" y="3857629"/>
+            <a:off x="2928958" y="3857629"/>
             <a:ext cx="1571636" cy="214314"/>
           </a:xfrm>
           <a:prstGeom prst="roundRect">
             <a:avLst/>
           </a:prstGeom>
+          <a:solidFill>
+            <a:srgbClr val="FBF3F3">
+              <a:alpha val="92000"/>
+            </a:srgbClr>
+          </a:solidFill>
         </p:spPr>
         <p:style>
           <a:lnRef idx="2">
@@ -10674,12 +10833,17 @@
         </p:nvSpPr>
         <p:spPr>
           <a:xfrm>
-            <a:off x="2857488" y="3357563"/>
+            <a:off x="2928958" y="3357563"/>
             <a:ext cx="1571636" cy="357190"/>
           </a:xfrm>
           <a:prstGeom prst="roundRect">
             <a:avLst/>
           </a:prstGeom>
+          <a:solidFill>
+            <a:srgbClr val="FBF3F3">
+              <a:alpha val="92000"/>
+            </a:srgbClr>
+          </a:solidFill>
         </p:spPr>
         <p:style>
           <a:lnRef idx="2">
@@ -10724,12 +10888,17 @@
         </p:nvSpPr>
         <p:spPr>
           <a:xfrm>
-            <a:off x="2857488" y="4357695"/>
+            <a:off x="2928958" y="4357695"/>
             <a:ext cx="1571636" cy="214314"/>
           </a:xfrm>
           <a:prstGeom prst="roundRect">
             <a:avLst/>
           </a:prstGeom>
+          <a:solidFill>
+            <a:srgbClr val="FBF3F3">
+              <a:alpha val="92000"/>
+            </a:srgbClr>
+          </a:solidFill>
         </p:spPr>
         <p:style>
           <a:lnRef idx="2">
@@ -10766,12 +10935,17 @@
         </p:nvSpPr>
         <p:spPr>
           <a:xfrm>
-            <a:off x="2857488" y="4643446"/>
+            <a:off x="2928958" y="4643446"/>
             <a:ext cx="1571636" cy="214314"/>
           </a:xfrm>
           <a:prstGeom prst="roundRect">
             <a:avLst/>
           </a:prstGeom>
+          <a:solidFill>
+            <a:srgbClr val="FBF3F3">
+              <a:alpha val="92000"/>
+            </a:srgbClr>
+          </a:solidFill>
         </p:spPr>
         <p:style>
           <a:lnRef idx="2">
@@ -10814,6 +10988,9 @@
           <a:prstGeom prst="roundRect">
             <a:avLst/>
           </a:prstGeom>
+          <a:solidFill>
+            <a:srgbClr val="F7F9F1"/>
+          </a:solidFill>
         </p:spPr>
         <p:style>
           <a:lnRef idx="2">
@@ -10836,7 +11013,7 @@
             <a:pPr algn="ctr"/>
             <a:r>
               <a:rPr lang="de-DE" sz="1200" dirty="0" err="1" smtClean="0"/>
-              <a:t>sBase</a:t>
+              <a:t>SBase</a:t>
             </a:r>
             <a:endParaRPr lang="de-DE" sz="1200" dirty="0"/>
           </a:p>
@@ -10856,6 +11033,9 @@
           <a:prstGeom prst="roundRect">
             <a:avLst/>
           </a:prstGeom>
+          <a:solidFill>
+            <a:srgbClr val="F7F9F1"/>
+          </a:solidFill>
         </p:spPr>
         <p:style>
           <a:lnRef idx="2">
@@ -10898,6 +11078,9 @@
           <a:prstGeom prst="roundRect">
             <a:avLst/>
           </a:prstGeom>
+          <a:solidFill>
+            <a:srgbClr val="F7F9F1"/>
+          </a:solidFill>
         </p:spPr>
         <p:style>
           <a:lnRef idx="2">
@@ -10940,6 +11123,9 @@
           <a:prstGeom prst="roundRect">
             <a:avLst/>
           </a:prstGeom>
+          <a:solidFill>
+            <a:srgbClr val="F7F9F1"/>
+          </a:solidFill>
         </p:spPr>
         <p:style>
           <a:lnRef idx="2">
@@ -10982,6 +11168,9 @@
           <a:prstGeom prst="roundRect">
             <a:avLst/>
           </a:prstGeom>
+          <a:solidFill>
+            <a:srgbClr val="F7F9F1"/>
+          </a:solidFill>
         </p:spPr>
         <p:style>
           <a:lnRef idx="2">
@@ -11024,6 +11213,9 @@
           <a:prstGeom prst="roundRect">
             <a:avLst/>
           </a:prstGeom>
+          <a:solidFill>
+            <a:srgbClr val="F7F9F1"/>
+          </a:solidFill>
         </p:spPr>
         <p:style>
           <a:lnRef idx="2">
@@ -11066,6 +11258,9 @@
           <a:prstGeom prst="roundRect">
             <a:avLst/>
           </a:prstGeom>
+          <a:solidFill>
+            <a:srgbClr val="F7F9F1"/>
+          </a:solidFill>
         </p:spPr>
         <p:style>
           <a:lnRef idx="2">
@@ -11088,7 +11283,7 @@
             <a:pPr algn="ctr"/>
             <a:r>
               <a:rPr lang="de-DE" sz="1200" dirty="0" err="1" smtClean="0"/>
-              <a:t>QualitativeModel</a:t>
+              <a:t>qualitativeModel</a:t>
             </a:r>
             <a:endParaRPr lang="de-DE" sz="1200" dirty="0"/>
           </a:p>
@@ -11108,6 +11303,9 @@
           <a:prstGeom prst="roundRect">
             <a:avLst/>
           </a:prstGeom>
+          <a:solidFill>
+            <a:srgbClr val="F7F9F1"/>
+          </a:solidFill>
         </p:spPr>
         <p:style>
           <a:lnRef idx="2">
@@ -11130,7 +11328,7 @@
             <a:pPr algn="ctr"/>
             <a:r>
               <a:rPr lang="de-DE" sz="1200" dirty="0" err="1" smtClean="0"/>
-              <a:t>QualitativeSpecies</a:t>
+              <a:t>qualitativeSpecies</a:t>
             </a:r>
             <a:endParaRPr lang="de-DE" sz="1200" dirty="0"/>
           </a:p>
@@ -11150,6 +11348,9 @@
           <a:prstGeom prst="roundRect">
             <a:avLst/>
           </a:prstGeom>
+          <a:solidFill>
+            <a:srgbClr val="F7F9F1"/>
+          </a:solidFill>
         </p:spPr>
         <p:style>
           <a:lnRef idx="2">
@@ -11192,6 +11393,9 @@
           <a:prstGeom prst="roundRect">
             <a:avLst/>
           </a:prstGeom>
+          <a:solidFill>
+            <a:srgbClr val="F7F9F1"/>
+          </a:solidFill>
         </p:spPr>
         <p:style>
           <a:lnRef idx="2">
@@ -11234,6 +11438,9 @@
           <a:prstGeom prst="roundRect">
             <a:avLst/>
           </a:prstGeom>
+          <a:solidFill>
+            <a:srgbClr val="F7F9F1"/>
+          </a:solidFill>
         </p:spPr>
         <p:style>
           <a:lnRef idx="2">
@@ -11255,8 +11462,8 @@
           <a:p>
             <a:pPr algn="ctr"/>
             <a:r>
-              <a:rPr lang="de-DE" sz="1200" dirty="0" smtClean="0"/>
-              <a:t>Transition</a:t>
+              <a:rPr lang="de-DE" sz="1200" dirty="0" err="1" smtClean="0"/>
+              <a:t>transition</a:t>
             </a:r>
             <a:endParaRPr lang="de-DE" sz="1200" dirty="0"/>
           </a:p>
@@ -11273,7 +11480,7 @@
         </p:nvCxnSpPr>
         <p:spPr>
           <a:xfrm>
-            <a:off x="857224" y="1393017"/>
+            <a:off x="928694" y="1393017"/>
             <a:ext cx="500066" cy="0"/>
           </a:xfrm>
           <a:prstGeom prst="line">
@@ -11307,7 +11514,7 @@
         </p:nvCxnSpPr>
         <p:spPr>
           <a:xfrm flipV="1">
-            <a:off x="857224" y="321447"/>
+            <a:off x="928694" y="321447"/>
             <a:ext cx="2000264" cy="1071570"/>
           </a:xfrm>
           <a:prstGeom prst="line">
@@ -11341,7 +11548,7 @@
         </p:nvCxnSpPr>
         <p:spPr>
           <a:xfrm rot="16200000" flipV="1">
-            <a:off x="410737" y="1553752"/>
+            <a:off x="482207" y="1553752"/>
             <a:ext cx="357190" cy="250033"/>
           </a:xfrm>
           <a:prstGeom prst="line">
@@ -11375,7 +11582,7 @@
         </p:nvCxnSpPr>
         <p:spPr>
           <a:xfrm rot="16200000" flipH="1">
-            <a:off x="607191" y="2178835"/>
+            <a:off x="678661" y="2178835"/>
             <a:ext cx="428628" cy="214314"/>
           </a:xfrm>
           <a:prstGeom prst="line">
@@ -11409,7 +11616,7 @@
         </p:nvCxnSpPr>
         <p:spPr>
           <a:xfrm rot="16200000" flipH="1">
-            <a:off x="946521" y="2696761"/>
+            <a:off x="1017991" y="2696761"/>
             <a:ext cx="392910" cy="428628"/>
           </a:xfrm>
           <a:prstGeom prst="line">
@@ -11443,7 +11650,7 @@
         </p:nvCxnSpPr>
         <p:spPr>
           <a:xfrm rot="16200000" flipH="1">
-            <a:off x="267860" y="3375422"/>
+            <a:off x="339330" y="3375422"/>
             <a:ext cx="1750232" cy="428628"/>
           </a:xfrm>
           <a:prstGeom prst="line">
@@ -11477,7 +11684,7 @@
         </p:nvCxnSpPr>
         <p:spPr>
           <a:xfrm rot="10800000" flipV="1">
-            <a:off x="2428860" y="1107265"/>
+            <a:off x="2500330" y="1107265"/>
             <a:ext cx="428628" cy="285752"/>
           </a:xfrm>
           <a:prstGeom prst="line">
@@ -11511,7 +11718,7 @@
         </p:nvCxnSpPr>
         <p:spPr>
           <a:xfrm rot="10800000">
-            <a:off x="2428860" y="1393017"/>
+            <a:off x="2500330" y="1393017"/>
             <a:ext cx="428628" cy="0"/>
           </a:xfrm>
           <a:prstGeom prst="line">
@@ -11545,7 +11752,7 @@
         </p:nvCxnSpPr>
         <p:spPr>
           <a:xfrm rot="10800000">
-            <a:off x="2428860" y="1393017"/>
+            <a:off x="2500330" y="1393017"/>
             <a:ext cx="428628" cy="285752"/>
           </a:xfrm>
           <a:prstGeom prst="line">
@@ -11579,7 +11786,7 @@
         </p:nvCxnSpPr>
         <p:spPr>
           <a:xfrm rot="10800000">
-            <a:off x="2428860" y="1393017"/>
+            <a:off x="2500330" y="1393017"/>
             <a:ext cx="428628" cy="571504"/>
           </a:xfrm>
           <a:prstGeom prst="line">
@@ -11613,7 +11820,7 @@
         </p:nvCxnSpPr>
         <p:spPr>
           <a:xfrm rot="10800000">
-            <a:off x="2428860" y="1393017"/>
+            <a:off x="2500330" y="1393017"/>
             <a:ext cx="428628" cy="857256"/>
           </a:xfrm>
           <a:prstGeom prst="line">
@@ -11647,7 +11854,7 @@
         </p:nvCxnSpPr>
         <p:spPr>
           <a:xfrm>
-            <a:off x="2357422" y="3107530"/>
+            <a:off x="2428892" y="3107530"/>
             <a:ext cx="500066" cy="0"/>
           </a:xfrm>
           <a:prstGeom prst="line">
@@ -11681,7 +11888,7 @@
         </p:nvCxnSpPr>
         <p:spPr>
           <a:xfrm flipV="1">
-            <a:off x="2357422" y="2821778"/>
+            <a:off x="2428892" y="2821778"/>
             <a:ext cx="500066" cy="285752"/>
           </a:xfrm>
           <a:prstGeom prst="line">
@@ -11715,7 +11922,7 @@
         </p:nvCxnSpPr>
         <p:spPr>
           <a:xfrm>
-            <a:off x="2357422" y="3107530"/>
+            <a:off x="2428892" y="3107530"/>
             <a:ext cx="500066" cy="857256"/>
           </a:xfrm>
           <a:prstGeom prst="line">
@@ -11749,7 +11956,7 @@
         </p:nvCxnSpPr>
         <p:spPr>
           <a:xfrm>
-            <a:off x="2357422" y="4464852"/>
+            <a:off x="2428892" y="4464852"/>
             <a:ext cx="500066" cy="0"/>
           </a:xfrm>
           <a:prstGeom prst="line">
@@ -11783,7 +11990,7 @@
         </p:nvCxnSpPr>
         <p:spPr>
           <a:xfrm>
-            <a:off x="2357422" y="4464852"/>
+            <a:off x="2428892" y="4464852"/>
             <a:ext cx="500066" cy="285751"/>
           </a:xfrm>
           <a:prstGeom prst="line">
@@ -11817,7 +12024,7 @@
         </p:nvCxnSpPr>
         <p:spPr>
           <a:xfrm rot="5400000">
-            <a:off x="3571868" y="3786191"/>
+            <a:off x="3643338" y="3786191"/>
             <a:ext cx="142876" cy="0"/>
           </a:xfrm>
           <a:prstGeom prst="line">
@@ -11851,7 +12058,7 @@
         </p:nvCxnSpPr>
         <p:spPr>
           <a:xfrm rot="5400000">
-            <a:off x="3571868" y="3286125"/>
+            <a:off x="3643338" y="3286125"/>
             <a:ext cx="142876" cy="0"/>
           </a:xfrm>
           <a:prstGeom prst="line">
@@ -12225,8 +12432,8 @@
         </p:nvCxnSpPr>
         <p:spPr>
           <a:xfrm>
-            <a:off x="4000496" y="321447"/>
-            <a:ext cx="928694" cy="0"/>
+            <a:off x="4071966" y="321447"/>
+            <a:ext cx="857224" cy="0"/>
           </a:xfrm>
           <a:prstGeom prst="line">
             <a:avLst/>
@@ -12259,8 +12466,8 @@
         </p:nvCxnSpPr>
         <p:spPr>
           <a:xfrm>
-            <a:off x="4000496" y="321447"/>
-            <a:ext cx="928694" cy="285752"/>
+            <a:off x="4071966" y="321447"/>
+            <a:ext cx="857224" cy="285752"/>
           </a:xfrm>
           <a:prstGeom prst="line">
             <a:avLst/>
@@ -12293,8 +12500,8 @@
         </p:nvCxnSpPr>
         <p:spPr>
           <a:xfrm>
-            <a:off x="4000496" y="1107265"/>
-            <a:ext cx="928694" cy="285752"/>
+            <a:off x="4071966" y="1107265"/>
+            <a:ext cx="857224" cy="285752"/>
           </a:xfrm>
           <a:prstGeom prst="line">
             <a:avLst/>
@@ -12327,8 +12534,8 @@
         </p:nvCxnSpPr>
         <p:spPr>
           <a:xfrm>
-            <a:off x="4000496" y="1107265"/>
-            <a:ext cx="928694" cy="857256"/>
+            <a:off x="4071966" y="1107265"/>
+            <a:ext cx="857224" cy="857256"/>
           </a:xfrm>
           <a:prstGeom prst="line">
             <a:avLst/>
@@ -12361,8 +12568,8 @@
         </p:nvCxnSpPr>
         <p:spPr>
           <a:xfrm>
-            <a:off x="4000496" y="1393017"/>
-            <a:ext cx="928694" cy="0"/>
+            <a:off x="4071966" y="1393017"/>
+            <a:ext cx="857224" cy="0"/>
           </a:xfrm>
           <a:prstGeom prst="line">
             <a:avLst/>
@@ -12395,8 +12602,8 @@
         </p:nvCxnSpPr>
         <p:spPr>
           <a:xfrm>
-            <a:off x="4000496" y="1393017"/>
-            <a:ext cx="928694" cy="571504"/>
+            <a:off x="4071966" y="1393017"/>
+            <a:ext cx="857224" cy="571504"/>
           </a:xfrm>
           <a:prstGeom prst="line">
             <a:avLst/>
@@ -12429,8 +12636,8 @@
         </p:nvCxnSpPr>
         <p:spPr>
           <a:xfrm flipV="1">
-            <a:off x="4000496" y="1393017"/>
-            <a:ext cx="928694" cy="285752"/>
+            <a:off x="4071966" y="1393017"/>
+            <a:ext cx="857224" cy="285752"/>
           </a:xfrm>
           <a:prstGeom prst="line">
             <a:avLst/>
@@ -12463,8 +12670,8 @@
         </p:nvCxnSpPr>
         <p:spPr>
           <a:xfrm flipV="1">
-            <a:off x="4000496" y="1393017"/>
-            <a:ext cx="928694" cy="571504"/>
+            <a:off x="4071966" y="1393017"/>
+            <a:ext cx="857224" cy="571504"/>
           </a:xfrm>
           <a:prstGeom prst="line">
             <a:avLst/>
@@ -12497,8 +12704,8 @@
         </p:nvCxnSpPr>
         <p:spPr>
           <a:xfrm flipV="1">
-            <a:off x="4000496" y="1393017"/>
-            <a:ext cx="928694" cy="857256"/>
+            <a:off x="4071966" y="1393017"/>
+            <a:ext cx="857224" cy="857256"/>
           </a:xfrm>
           <a:prstGeom prst="line">
             <a:avLst/>
@@ -12531,8 +12738,8 @@
         </p:nvCxnSpPr>
         <p:spPr>
           <a:xfrm>
-            <a:off x="4000496" y="1678769"/>
-            <a:ext cx="928694" cy="285752"/>
+            <a:off x="4071966" y="1678769"/>
+            <a:ext cx="857224" cy="285752"/>
           </a:xfrm>
           <a:prstGeom prst="line">
             <a:avLst/>
@@ -12565,8 +12772,8 @@
         </p:nvCxnSpPr>
         <p:spPr>
           <a:xfrm>
-            <a:off x="4000496" y="1964521"/>
-            <a:ext cx="928694" cy="0"/>
+            <a:off x="4071966" y="1964521"/>
+            <a:ext cx="857224" cy="0"/>
           </a:xfrm>
           <a:prstGeom prst="line">
             <a:avLst/>
@@ -12599,8 +12806,8 @@
         </p:nvCxnSpPr>
         <p:spPr>
           <a:xfrm flipV="1">
-            <a:off x="4000496" y="1964521"/>
-            <a:ext cx="928694" cy="285752"/>
+            <a:off x="4071966" y="1964521"/>
+            <a:ext cx="857224" cy="285752"/>
           </a:xfrm>
           <a:prstGeom prst="line">
             <a:avLst/>
@@ -12633,8 +12840,8 @@
         </p:nvCxnSpPr>
         <p:spPr>
           <a:xfrm>
-            <a:off x="4429124" y="2821778"/>
-            <a:ext cx="1428760" cy="285752"/>
+            <a:off x="4500594" y="2821778"/>
+            <a:ext cx="1357290" cy="285752"/>
           </a:xfrm>
           <a:prstGeom prst="line">
             <a:avLst/>
@@ -12667,8 +12874,8 @@
         </p:nvCxnSpPr>
         <p:spPr>
           <a:xfrm>
-            <a:off x="4429124" y="3107530"/>
-            <a:ext cx="1428760" cy="0"/>
+            <a:off x="4500594" y="3107530"/>
+            <a:ext cx="1357290" cy="0"/>
           </a:xfrm>
           <a:prstGeom prst="line">
             <a:avLst/>
@@ -12701,8 +12908,8 @@
         </p:nvCxnSpPr>
         <p:spPr>
           <a:xfrm>
-            <a:off x="4429124" y="3964786"/>
-            <a:ext cx="1428760" cy="0"/>
+            <a:off x="4500594" y="3964786"/>
+            <a:ext cx="1357290" cy="0"/>
           </a:xfrm>
           <a:prstGeom prst="line">
             <a:avLst/>
@@ -12735,8 +12942,8 @@
         </p:nvCxnSpPr>
         <p:spPr>
           <a:xfrm flipV="1">
-            <a:off x="4429124" y="3107530"/>
-            <a:ext cx="1428760" cy="428628"/>
+            <a:off x="4500594" y="3107530"/>
+            <a:ext cx="1357290" cy="428628"/>
           </a:xfrm>
           <a:prstGeom prst="line">
             <a:avLst/>
@@ -12758,16 +12965,160 @@
           </a:fontRef>
         </p:style>
       </p:cxnSp>
-      <p:sp>
-        <p:nvSpPr>
-          <p:cNvPr id="478" name="Textfeld 477"/>
+      <p:cxnSp>
+        <p:nvCxnSpPr>
+          <p:cNvPr id="500" name="Gerade Verbindung 499"/>
+          <p:cNvCxnSpPr>
+            <a:stCxn id="31" idx="3"/>
+            <a:endCxn id="51" idx="1"/>
+          </p:cNvCxnSpPr>
+          <p:nvPr/>
+        </p:nvCxnSpPr>
+        <p:spPr>
+          <a:xfrm flipV="1">
+            <a:off x="4500594" y="3964786"/>
+            <a:ext cx="1357290" cy="500066"/>
+          </a:xfrm>
+          <a:prstGeom prst="line">
+            <a:avLst/>
+          </a:prstGeom>
+          <a:ln w="12700">
+            <a:prstDash val="dash"/>
+          </a:ln>
+        </p:spPr>
+        <p:style>
+          <a:lnRef idx="1">
+            <a:schemeClr val="dk1"/>
+          </a:lnRef>
+          <a:fillRef idx="0">
+            <a:schemeClr val="dk1"/>
+          </a:fillRef>
+          <a:effectRef idx="0">
+            <a:schemeClr val="dk1"/>
+          </a:effectRef>
+          <a:fontRef idx="minor">
+            <a:schemeClr val="tx1"/>
+          </a:fontRef>
+        </p:style>
+      </p:cxnSp>
+      <p:cxnSp>
+        <p:nvCxnSpPr>
+          <p:cNvPr id="503" name="Gerade Verbindung 502"/>
+          <p:cNvCxnSpPr>
+            <a:stCxn id="31" idx="3"/>
+            <a:endCxn id="40" idx="1"/>
+          </p:cNvCxnSpPr>
+          <p:nvPr/>
+        </p:nvCxnSpPr>
+        <p:spPr>
+          <a:xfrm flipV="1">
+            <a:off x="4500594" y="3107530"/>
+            <a:ext cx="1357290" cy="1357322"/>
+          </a:xfrm>
+          <a:prstGeom prst="line">
+            <a:avLst/>
+          </a:prstGeom>
+          <a:ln w="12700">
+            <a:prstDash val="dash"/>
+          </a:ln>
+        </p:spPr>
+        <p:style>
+          <a:lnRef idx="1">
+            <a:schemeClr val="dk1"/>
+          </a:lnRef>
+          <a:fillRef idx="0">
+            <a:schemeClr val="dk1"/>
+          </a:fillRef>
+          <a:effectRef idx="0">
+            <a:schemeClr val="dk1"/>
+          </a:effectRef>
+          <a:fontRef idx="minor">
+            <a:schemeClr val="tx1"/>
+          </a:fontRef>
+        </p:style>
+      </p:cxnSp>
+      <p:cxnSp>
+        <p:nvCxnSpPr>
+          <p:cNvPr id="506" name="Gerade Verbindung 505"/>
+          <p:cNvCxnSpPr>
+            <a:stCxn id="32" idx="3"/>
+            <a:endCxn id="40" idx="1"/>
+          </p:cNvCxnSpPr>
+          <p:nvPr/>
+        </p:nvCxnSpPr>
+        <p:spPr>
+          <a:xfrm flipV="1">
+            <a:off x="4500594" y="3107530"/>
+            <a:ext cx="1357290" cy="1643073"/>
+          </a:xfrm>
+          <a:prstGeom prst="line">
+            <a:avLst/>
+          </a:prstGeom>
+          <a:ln w="12700">
+            <a:prstDash val="dash"/>
+          </a:ln>
+        </p:spPr>
+        <p:style>
+          <a:lnRef idx="1">
+            <a:schemeClr val="dk1"/>
+          </a:lnRef>
+          <a:fillRef idx="0">
+            <a:schemeClr val="dk1"/>
+          </a:fillRef>
+          <a:effectRef idx="0">
+            <a:schemeClr val="dk1"/>
+          </a:effectRef>
+          <a:fontRef idx="minor">
+            <a:schemeClr val="tx1"/>
+          </a:fontRef>
+        </p:style>
+      </p:cxnSp>
+      <p:cxnSp>
+        <p:nvCxnSpPr>
+          <p:cNvPr id="509" name="Gerade Verbindung 508"/>
+          <p:cNvCxnSpPr>
+            <a:stCxn id="32" idx="3"/>
+            <a:endCxn id="51" idx="1"/>
+          </p:cNvCxnSpPr>
+          <p:nvPr/>
+        </p:nvCxnSpPr>
+        <p:spPr>
+          <a:xfrm flipV="1">
+            <a:off x="4500594" y="3964786"/>
+            <a:ext cx="1357290" cy="785817"/>
+          </a:xfrm>
+          <a:prstGeom prst="line">
+            <a:avLst/>
+          </a:prstGeom>
+          <a:ln w="12700">
+            <a:prstDash val="dash"/>
+          </a:ln>
+        </p:spPr>
+        <p:style>
+          <a:lnRef idx="1">
+            <a:schemeClr val="dk1"/>
+          </a:lnRef>
+          <a:fillRef idx="0">
+            <a:schemeClr val="dk1"/>
+          </a:fillRef>
+          <a:effectRef idx="0">
+            <a:schemeClr val="dk1"/>
+          </a:effectRef>
+          <a:fontRef idx="minor">
+            <a:schemeClr val="tx1"/>
+          </a:fontRef>
+        </p:style>
+      </p:cxnSp>
+      <p:sp>
+        <p:nvSpPr>
+          <p:cNvPr id="83" name="Textfeld 82"/>
           <p:cNvSpPr txBox="1"/>
           <p:nvPr/>
         </p:nvSpPr>
         <p:spPr>
           <a:xfrm>
-            <a:off x="285720" y="4929198"/>
-            <a:ext cx="2857520" cy="369332"/>
+            <a:off x="214282" y="4643446"/>
+            <a:ext cx="1571636" cy="369332"/>
           </a:xfrm>
           <a:prstGeom prst="rect">
             <a:avLst/>
@@ -12781,34 +13132,86 @@
           <a:lstStyle/>
           <a:p>
             <a:r>
-              <a:rPr lang="de-DE" dirty="0" err="1" smtClean="0"/>
+              <a:rPr lang="de-DE" b="1" dirty="0" err="1" smtClean="0">
+                <a:solidFill>
+                  <a:schemeClr val="accent2"/>
+                </a:solidFill>
+              </a:rPr>
               <a:t>BioPax</a:t>
             </a:r>
             <a:r>
-              <a:rPr lang="de-DE" dirty="0" smtClean="0"/>
-              <a:t> Level 2 – SBML </a:t>
-            </a:r>
-            <a:r>
-              <a:rPr lang="de-DE" dirty="0" err="1" smtClean="0"/>
+              <a:rPr lang="de-DE" b="1" dirty="0" smtClean="0">
+                <a:solidFill>
+                  <a:schemeClr val="accent2"/>
+                </a:solidFill>
+              </a:rPr>
+              <a:t> Level 2</a:t>
+            </a:r>
+            <a:endParaRPr lang="de-DE" b="1" dirty="0">
+              <a:solidFill>
+                <a:schemeClr val="accent2"/>
+              </a:solidFill>
+            </a:endParaRPr>
+          </a:p>
+        </p:txBody>
+      </p:sp>
+      <p:sp>
+        <p:nvSpPr>
+          <p:cNvPr id="84" name="Textfeld 83"/>
+          <p:cNvSpPr txBox="1"/>
+          <p:nvPr/>
+        </p:nvSpPr>
+        <p:spPr>
+          <a:xfrm>
+            <a:off x="7429520" y="4643446"/>
+            <a:ext cx="1571636" cy="369332"/>
+          </a:xfrm>
+          <a:prstGeom prst="rect">
+            <a:avLst/>
+          </a:prstGeom>
+          <a:noFill/>
+        </p:spPr>
+        <p:txBody>
+          <a:bodyPr wrap="square" rtlCol="0">
+            <a:spAutoFit/>
+          </a:bodyPr>
+          <a:lstStyle/>
+          <a:p>
+            <a:pPr algn="r"/>
+            <a:r>
+              <a:rPr lang="de-DE" b="1" dirty="0" smtClean="0">
+                <a:solidFill>
+                  <a:schemeClr val="accent3"/>
+                </a:solidFill>
+              </a:rPr>
+              <a:t>SBML </a:t>
+            </a:r>
+            <a:r>
+              <a:rPr lang="de-DE" b="1" dirty="0" err="1" smtClean="0">
+                <a:solidFill>
+                  <a:schemeClr val="accent3"/>
+                </a:solidFill>
+              </a:rPr>
               <a:t>qual</a:t>
             </a:r>
-            <a:endParaRPr lang="de-DE" dirty="0"/>
-          </a:p>
-        </p:txBody>
-      </p:sp>
-      <p:cxnSp>
-        <p:nvCxnSpPr>
-          <p:cNvPr id="500" name="Gerade Verbindung 499"/>
-          <p:cNvCxnSpPr>
-            <a:stCxn id="31" idx="3"/>
-            <a:endCxn id="51" idx="1"/>
-          </p:cNvCxnSpPr>
-          <p:nvPr/>
-        </p:nvCxnSpPr>
-        <p:spPr>
-          <a:xfrm flipV="1">
-            <a:off x="4429124" y="3964786"/>
-            <a:ext cx="1428760" cy="500066"/>
+            <a:endParaRPr lang="de-DE" b="1" dirty="0">
+              <a:solidFill>
+                <a:schemeClr val="accent3"/>
+              </a:solidFill>
+            </a:endParaRPr>
+          </a:p>
+        </p:txBody>
+      </p:sp>
+      <p:cxnSp>
+        <p:nvCxnSpPr>
+          <p:cNvPr id="86" name="Gerade Verbindung 85"/>
+          <p:cNvCxnSpPr/>
+          <p:nvPr/>
+        </p:nvCxnSpPr>
+        <p:spPr>
+          <a:xfrm>
+            <a:off x="214282" y="285728"/>
+            <a:ext cx="357190" cy="0"/>
           </a:xfrm>
           <a:prstGeom prst="line">
             <a:avLst/>
@@ -12832,22 +13235,21 @@
       </p:cxnSp>
       <p:cxnSp>
         <p:nvCxnSpPr>
-          <p:cNvPr id="503" name="Gerade Verbindung 502"/>
-          <p:cNvCxnSpPr>
-            <a:stCxn id="31" idx="3"/>
-            <a:endCxn id="40" idx="1"/>
-          </p:cNvCxnSpPr>
-          <p:nvPr/>
-        </p:nvCxnSpPr>
-        <p:spPr>
-          <a:xfrm flipV="1">
-            <a:off x="4429124" y="3107530"/>
-            <a:ext cx="1428760" cy="1357322"/>
-          </a:xfrm>
-          <a:prstGeom prst="line">
-            <a:avLst/>
-          </a:prstGeom>
-          <a:ln w="12700"/>
+          <p:cNvPr id="87" name="Gerade Verbindung 86"/>
+          <p:cNvCxnSpPr/>
+          <p:nvPr/>
+        </p:nvCxnSpPr>
+        <p:spPr>
+          <a:xfrm>
+            <a:off x="214282" y="571480"/>
+            <a:ext cx="357190" cy="0"/>
+          </a:xfrm>
+          <a:prstGeom prst="line">
+            <a:avLst/>
+          </a:prstGeom>
+          <a:ln w="12700">
+            <a:prstDash val="dash"/>
+          </a:ln>
         </p:spPr>
         <p:style>
           <a:lnRef idx="1">
@@ -12864,74 +13266,96 @@
           </a:fontRef>
         </p:style>
       </p:cxnSp>
-      <p:cxnSp>
-        <p:nvCxnSpPr>
-          <p:cNvPr id="506" name="Gerade Verbindung 505"/>
-          <p:cNvCxnSpPr>
-            <a:stCxn id="32" idx="3"/>
-            <a:endCxn id="40" idx="1"/>
-          </p:cNvCxnSpPr>
-          <p:nvPr/>
-        </p:nvCxnSpPr>
-        <p:spPr>
-          <a:xfrm flipV="1">
-            <a:off x="4429124" y="3107530"/>
-            <a:ext cx="1428760" cy="1643073"/>
-          </a:xfrm>
-          <a:prstGeom prst="line">
-            <a:avLst/>
-          </a:prstGeom>
-          <a:ln w="12700"/>
-        </p:spPr>
-        <p:style>
-          <a:lnRef idx="1">
-            <a:schemeClr val="dk1"/>
-          </a:lnRef>
-          <a:fillRef idx="0">
-            <a:schemeClr val="dk1"/>
-          </a:fillRef>
-          <a:effectRef idx="0">
-            <a:schemeClr val="dk1"/>
-          </a:effectRef>
-          <a:fontRef idx="minor">
-            <a:schemeClr val="tx1"/>
-          </a:fontRef>
-        </p:style>
-      </p:cxnSp>
-      <p:cxnSp>
-        <p:nvCxnSpPr>
-          <p:cNvPr id="509" name="Gerade Verbindung 508"/>
-          <p:cNvCxnSpPr>
-            <a:stCxn id="32" idx="3"/>
-            <a:endCxn id="51" idx="1"/>
-          </p:cNvCxnSpPr>
-          <p:nvPr/>
-        </p:nvCxnSpPr>
-        <p:spPr>
-          <a:xfrm flipV="1">
-            <a:off x="4429124" y="3964786"/>
-            <a:ext cx="1428760" cy="785817"/>
-          </a:xfrm>
-          <a:prstGeom prst="line">
-            <a:avLst/>
-          </a:prstGeom>
-          <a:ln w="12700"/>
-        </p:spPr>
-        <p:style>
-          <a:lnRef idx="1">
-            <a:schemeClr val="dk1"/>
-          </a:lnRef>
-          <a:fillRef idx="0">
-            <a:schemeClr val="dk1"/>
-          </a:fillRef>
-          <a:effectRef idx="0">
-            <a:schemeClr val="dk1"/>
-          </a:effectRef>
-          <a:fontRef idx="minor">
-            <a:schemeClr val="tx1"/>
-          </a:fontRef>
-        </p:style>
-      </p:cxnSp>
+      <p:sp>
+        <p:nvSpPr>
+          <p:cNvPr id="89" name="Textfeld 88"/>
+          <p:cNvSpPr txBox="1"/>
+          <p:nvPr/>
+        </p:nvSpPr>
+        <p:spPr>
+          <a:xfrm>
+            <a:off x="642910" y="182383"/>
+            <a:ext cx="982961" cy="246221"/>
+          </a:xfrm>
+          <a:prstGeom prst="rect">
+            <a:avLst/>
+          </a:prstGeom>
+          <a:noFill/>
+        </p:spPr>
+        <p:txBody>
+          <a:bodyPr wrap="none" rtlCol="0">
+            <a:spAutoFit/>
+          </a:bodyPr>
+          <a:lstStyle/>
+          <a:p>
+            <a:r>
+              <a:rPr lang="de-DE" sz="1000" dirty="0" err="1" smtClean="0"/>
+              <a:t>Direct</a:t>
+            </a:r>
+            <a:r>
+              <a:rPr lang="de-DE" sz="1000" dirty="0" smtClean="0"/>
+              <a:t> </a:t>
+            </a:r>
+            <a:r>
+              <a:rPr lang="de-DE" sz="1000" dirty="0" err="1" smtClean="0"/>
+              <a:t>mapping</a:t>
+            </a:r>
+            <a:endParaRPr lang="de-DE" sz="1000" dirty="0"/>
+          </a:p>
+        </p:txBody>
+      </p:sp>
+      <p:sp>
+        <p:nvSpPr>
+          <p:cNvPr id="90" name="Textfeld 89"/>
+          <p:cNvSpPr txBox="1"/>
+          <p:nvPr/>
+        </p:nvSpPr>
+        <p:spPr>
+          <a:xfrm>
+            <a:off x="642910" y="381308"/>
+            <a:ext cx="1314784" cy="400110"/>
+          </a:xfrm>
+          <a:prstGeom prst="rect">
+            <a:avLst/>
+          </a:prstGeom>
+          <a:noFill/>
+        </p:spPr>
+        <p:txBody>
+          <a:bodyPr wrap="none" rtlCol="0">
+            <a:spAutoFit/>
+          </a:bodyPr>
+          <a:lstStyle/>
+          <a:p>
+            <a:r>
+              <a:rPr lang="de-DE" sz="1000" dirty="0" smtClean="0"/>
+              <a:t>Mapping </a:t>
+            </a:r>
+            <a:r>
+              <a:rPr lang="de-DE" sz="1000" dirty="0" err="1" smtClean="0"/>
+              <a:t>depends</a:t>
+            </a:r>
+            <a:r>
+              <a:rPr lang="de-DE" sz="1000" dirty="0" smtClean="0"/>
+              <a:t> on </a:t>
+            </a:r>
+          </a:p>
+          <a:p>
+            <a:r>
+              <a:rPr lang="de-DE" sz="1000" dirty="0" err="1" smtClean="0"/>
+              <a:t>enclosed</a:t>
+            </a:r>
+            <a:r>
+              <a:rPr lang="de-DE" sz="1000" dirty="0" smtClean="0"/>
+              <a:t> </a:t>
+            </a:r>
+            <a:r>
+              <a:rPr lang="de-DE" sz="1000" dirty="0" err="1" smtClean="0"/>
+              <a:t>elements</a:t>
+            </a:r>
+            <a:endParaRPr lang="de-DE" sz="1000" dirty="0"/>
+          </a:p>
+        </p:txBody>
+      </p:sp>
     </p:spTree>
   </p:cSld>
   <p:clrMapOvr>
@@ -12959,18 +13383,105 @@
       </p:grpSpPr>
       <p:sp>
         <p:nvSpPr>
+          <p:cNvPr id="107" name="Abgerundetes Rechteck 106"/>
+          <p:cNvSpPr/>
+          <p:nvPr/>
+        </p:nvSpPr>
+        <p:spPr>
+          <a:xfrm>
+            <a:off x="71406" y="71414"/>
+            <a:ext cx="4857784" cy="6357982"/>
+          </a:xfrm>
+          <a:prstGeom prst="roundRect">
+            <a:avLst>
+              <a:gd name="adj" fmla="val 5553"/>
+            </a:avLst>
+          </a:prstGeom>
+          <a:noFill/>
+          <a:ln w="25400"/>
+        </p:spPr>
+        <p:style>
+          <a:lnRef idx="1">
+            <a:schemeClr val="accent1"/>
+          </a:lnRef>
+          <a:fillRef idx="2">
+            <a:schemeClr val="accent1"/>
+          </a:fillRef>
+          <a:effectRef idx="1">
+            <a:schemeClr val="accent1"/>
+          </a:effectRef>
+          <a:fontRef idx="minor">
+            <a:schemeClr val="dk1"/>
+          </a:fontRef>
+        </p:style>
+        <p:txBody>
+          <a:bodyPr rtlCol="0" anchor="ctr"/>
+          <a:lstStyle/>
+          <a:p>
+            <a:pPr algn="ctr"/>
+            <a:endParaRPr lang="de-DE" dirty="0"/>
+          </a:p>
+        </p:txBody>
+      </p:sp>
+      <p:sp>
+        <p:nvSpPr>
+          <p:cNvPr id="102" name="Abgerundetes Rechteck 101"/>
+          <p:cNvSpPr/>
+          <p:nvPr/>
+        </p:nvSpPr>
+        <p:spPr>
+          <a:xfrm>
+            <a:off x="5143504" y="71414"/>
+            <a:ext cx="3929090" cy="6357982"/>
+          </a:xfrm>
+          <a:prstGeom prst="roundRect">
+            <a:avLst>
+              <a:gd name="adj" fmla="val 5553"/>
+            </a:avLst>
+          </a:prstGeom>
+          <a:noFill/>
+          <a:ln w="25400"/>
+        </p:spPr>
+        <p:style>
+          <a:lnRef idx="1">
+            <a:schemeClr val="accent3"/>
+          </a:lnRef>
+          <a:fillRef idx="2">
+            <a:schemeClr val="accent3"/>
+          </a:fillRef>
+          <a:effectRef idx="1">
+            <a:schemeClr val="accent3"/>
+          </a:effectRef>
+          <a:fontRef idx="minor">
+            <a:schemeClr val="dk1"/>
+          </a:fontRef>
+        </p:style>
+        <p:txBody>
+          <a:bodyPr rtlCol="0" anchor="ctr"/>
+          <a:lstStyle/>
+          <a:p>
+            <a:pPr algn="ctr"/>
+            <a:endParaRPr lang="de-DE"/>
+          </a:p>
+        </p:txBody>
+      </p:sp>
+      <p:sp>
+        <p:nvSpPr>
           <p:cNvPr id="4" name="Abgerundetes Rechteck 3"/>
           <p:cNvSpPr/>
           <p:nvPr/>
         </p:nvSpPr>
         <p:spPr>
           <a:xfrm>
-            <a:off x="71406" y="1571612"/>
+            <a:off x="142844" y="1571612"/>
             <a:ext cx="785818" cy="214314"/>
           </a:xfrm>
           <a:prstGeom prst="roundRect">
             <a:avLst/>
           </a:prstGeom>
+          <a:solidFill>
+            <a:srgbClr val="F7FAFF"/>
+          </a:solidFill>
         </p:spPr>
         <p:style>
           <a:lnRef idx="2">
@@ -13017,6 +13528,9 @@
           <a:prstGeom prst="roundRect">
             <a:avLst/>
           </a:prstGeom>
+          <a:solidFill>
+            <a:srgbClr val="F7FAFF"/>
+          </a:solidFill>
         </p:spPr>
         <p:style>
           <a:lnRef idx="2">
@@ -13059,6 +13573,9 @@
           <a:prstGeom prst="roundRect">
             <a:avLst/>
           </a:prstGeom>
+          <a:solidFill>
+            <a:srgbClr val="F7FAFF"/>
+          </a:solidFill>
         </p:spPr>
         <p:style>
           <a:lnRef idx="2">
@@ -13095,12 +13612,15 @@
         </p:nvSpPr>
         <p:spPr>
           <a:xfrm>
-            <a:off x="142844" y="2357430"/>
+            <a:off x="214282" y="2357430"/>
             <a:ext cx="1000132" cy="214314"/>
           </a:xfrm>
           <a:prstGeom prst="roundRect">
             <a:avLst/>
           </a:prstGeom>
+          <a:solidFill>
+            <a:srgbClr val="F7FAFF"/>
+          </a:solidFill>
         </p:spPr>
         <p:style>
           <a:lnRef idx="2">
@@ -13147,6 +13667,9 @@
           <a:prstGeom prst="roundRect">
             <a:avLst/>
           </a:prstGeom>
+          <a:solidFill>
+            <a:srgbClr val="F7FAFF"/>
+          </a:solidFill>
         </p:spPr>
         <p:style>
           <a:lnRef idx="2">
@@ -13189,6 +13712,9 @@
           <a:prstGeom prst="roundRect">
             <a:avLst/>
           </a:prstGeom>
+          <a:solidFill>
+            <a:srgbClr val="F7FAFF"/>
+          </a:solidFill>
         </p:spPr>
         <p:style>
           <a:lnRef idx="2">
@@ -13231,6 +13757,9 @@
           <a:prstGeom prst="roundRect">
             <a:avLst/>
           </a:prstGeom>
+          <a:solidFill>
+            <a:srgbClr val="F7FAFF"/>
+          </a:solidFill>
         </p:spPr>
         <p:style>
           <a:lnRef idx="2">
@@ -13277,6 +13806,9 @@
           <a:prstGeom prst="roundRect">
             <a:avLst/>
           </a:prstGeom>
+          <a:solidFill>
+            <a:srgbClr val="F7FAFF"/>
+          </a:solidFill>
         </p:spPr>
         <p:style>
           <a:lnRef idx="2">
@@ -13319,6 +13851,9 @@
           <a:prstGeom prst="roundRect">
             <a:avLst/>
           </a:prstGeom>
+          <a:solidFill>
+            <a:srgbClr val="F7FAFF"/>
+          </a:solidFill>
         </p:spPr>
         <p:style>
           <a:lnRef idx="2">
@@ -13355,12 +13890,15 @@
         </p:nvSpPr>
         <p:spPr>
           <a:xfrm>
-            <a:off x="142876" y="3357562"/>
+            <a:off x="214314" y="3357562"/>
             <a:ext cx="1428728" cy="214314"/>
           </a:xfrm>
           <a:prstGeom prst="roundRect">
             <a:avLst/>
           </a:prstGeom>
+          <a:solidFill>
+            <a:srgbClr val="F7FAFF"/>
+          </a:solidFill>
         </p:spPr>
         <p:style>
           <a:lnRef idx="2">
@@ -13403,6 +13941,9 @@
           <a:prstGeom prst="roundRect">
             <a:avLst/>
           </a:prstGeom>
+          <a:solidFill>
+            <a:srgbClr val="F7FAFF"/>
+          </a:solidFill>
         </p:spPr>
         <p:style>
           <a:lnRef idx="2">
@@ -13445,6 +13986,9 @@
           <a:prstGeom prst="roundRect">
             <a:avLst/>
           </a:prstGeom>
+          <a:solidFill>
+            <a:srgbClr val="F7FAFF"/>
+          </a:solidFill>
         </p:spPr>
         <p:style>
           <a:lnRef idx="2">
@@ -13487,6 +14031,9 @@
           <a:prstGeom prst="roundRect">
             <a:avLst/>
           </a:prstGeom>
+          <a:solidFill>
+            <a:srgbClr val="F7FAFF"/>
+          </a:solidFill>
         </p:spPr>
         <p:style>
           <a:lnRef idx="2">
@@ -13529,6 +14076,9 @@
           <a:prstGeom prst="roundRect">
             <a:avLst/>
           </a:prstGeom>
+          <a:solidFill>
+            <a:srgbClr val="F7FAFF"/>
+          </a:solidFill>
         </p:spPr>
         <p:style>
           <a:lnRef idx="2">
@@ -13571,6 +14121,9 @@
           <a:prstGeom prst="roundRect">
             <a:avLst/>
           </a:prstGeom>
+          <a:solidFill>
+            <a:srgbClr val="F7FAFF"/>
+          </a:solidFill>
         </p:spPr>
         <p:style>
           <a:lnRef idx="2">
@@ -13613,6 +14166,9 @@
           <a:prstGeom prst="roundRect">
             <a:avLst/>
           </a:prstGeom>
+          <a:solidFill>
+            <a:srgbClr val="F7FAFF"/>
+          </a:solidFill>
         </p:spPr>
         <p:style>
           <a:lnRef idx="2">
@@ -13667,6 +14223,9 @@
           <a:prstGeom prst="roundRect">
             <a:avLst/>
           </a:prstGeom>
+          <a:solidFill>
+            <a:srgbClr val="F7FAFF"/>
+          </a:solidFill>
         </p:spPr>
         <p:style>
           <a:lnRef idx="2">
@@ -13713,6 +14272,9 @@
           <a:prstGeom prst="roundRect">
             <a:avLst/>
           </a:prstGeom>
+          <a:solidFill>
+            <a:srgbClr val="F7FAFF"/>
+          </a:solidFill>
         </p:spPr>
         <p:style>
           <a:lnRef idx="2">
@@ -13759,6 +14321,9 @@
           <a:prstGeom prst="roundRect">
             <a:avLst/>
           </a:prstGeom>
+          <a:solidFill>
+            <a:srgbClr val="F7F9F1"/>
+          </a:solidFill>
         </p:spPr>
         <p:style>
           <a:lnRef idx="2">
@@ -13781,7 +14346,7 @@
             <a:pPr algn="ctr"/>
             <a:r>
               <a:rPr lang="de-DE" sz="1200" dirty="0" err="1" smtClean="0"/>
-              <a:t>sBase</a:t>
+              <a:t>SBase</a:t>
             </a:r>
             <a:endParaRPr lang="de-DE" sz="1200" dirty="0"/>
           </a:p>
@@ -13801,6 +14366,9 @@
           <a:prstGeom prst="roundRect">
             <a:avLst/>
           </a:prstGeom>
+          <a:solidFill>
+            <a:srgbClr val="F7F9F1"/>
+          </a:solidFill>
         </p:spPr>
         <p:style>
           <a:lnRef idx="2">
@@ -13843,6 +14411,9 @@
           <a:prstGeom prst="roundRect">
             <a:avLst/>
           </a:prstGeom>
+          <a:solidFill>
+            <a:srgbClr val="F7F9F1"/>
+          </a:solidFill>
         </p:spPr>
         <p:style>
           <a:lnRef idx="2">
@@ -13885,6 +14456,9 @@
           <a:prstGeom prst="roundRect">
             <a:avLst/>
           </a:prstGeom>
+          <a:solidFill>
+            <a:srgbClr val="F7F9F1"/>
+          </a:solidFill>
         </p:spPr>
         <p:style>
           <a:lnRef idx="2">
@@ -13927,6 +14501,9 @@
           <a:prstGeom prst="roundRect">
             <a:avLst/>
           </a:prstGeom>
+          <a:solidFill>
+            <a:srgbClr val="F7F9F1"/>
+          </a:solidFill>
         </p:spPr>
         <p:style>
           <a:lnRef idx="2">
@@ -13969,6 +14546,9 @@
           <a:prstGeom prst="roundRect">
             <a:avLst/>
           </a:prstGeom>
+          <a:solidFill>
+            <a:srgbClr val="F7F9F1"/>
+          </a:solidFill>
         </p:spPr>
         <p:style>
           <a:lnRef idx="2">
@@ -14011,6 +14591,9 @@
           <a:prstGeom prst="roundRect">
             <a:avLst/>
           </a:prstGeom>
+          <a:solidFill>
+            <a:srgbClr val="F7F9F1"/>
+          </a:solidFill>
         </p:spPr>
         <p:style>
           <a:lnRef idx="2">
@@ -14033,7 +14616,7 @@
             <a:pPr algn="ctr"/>
             <a:r>
               <a:rPr lang="de-DE" sz="1200" dirty="0" err="1" smtClean="0"/>
-              <a:t>QualitativeModel</a:t>
+              <a:t>qualitativeModel</a:t>
             </a:r>
             <a:endParaRPr lang="de-DE" sz="1200" dirty="0"/>
           </a:p>
@@ -14053,6 +14636,9 @@
           <a:prstGeom prst="roundRect">
             <a:avLst/>
           </a:prstGeom>
+          <a:solidFill>
+            <a:srgbClr val="F7F9F1"/>
+          </a:solidFill>
         </p:spPr>
         <p:style>
           <a:lnRef idx="2">
@@ -14075,7 +14661,7 @@
             <a:pPr algn="ctr"/>
             <a:r>
               <a:rPr lang="de-DE" sz="1200" dirty="0" err="1" smtClean="0"/>
-              <a:t>QualitativeSpecies</a:t>
+              <a:t>qualitativeSpecies</a:t>
             </a:r>
             <a:endParaRPr lang="de-DE" sz="1200" dirty="0"/>
           </a:p>
@@ -14095,6 +14681,9 @@
           <a:prstGeom prst="roundRect">
             <a:avLst/>
           </a:prstGeom>
+          <a:solidFill>
+            <a:srgbClr val="F7F9F1"/>
+          </a:solidFill>
         </p:spPr>
         <p:style>
           <a:lnRef idx="2">
@@ -14137,6 +14726,9 @@
           <a:prstGeom prst="roundRect">
             <a:avLst/>
           </a:prstGeom>
+          <a:solidFill>
+            <a:srgbClr val="F7F9F1"/>
+          </a:solidFill>
         </p:spPr>
         <p:style>
           <a:lnRef idx="2">
@@ -14179,6 +14771,9 @@
           <a:prstGeom prst="roundRect">
             <a:avLst/>
           </a:prstGeom>
+          <a:solidFill>
+            <a:srgbClr val="F7F9F1"/>
+          </a:solidFill>
         </p:spPr>
         <p:style>
           <a:lnRef idx="2">
@@ -14200,8 +14795,8 @@
           <a:p>
             <a:pPr algn="ctr"/>
             <a:r>
-              <a:rPr lang="de-DE" sz="1200" dirty="0" smtClean="0"/>
-              <a:t>Transition</a:t>
+              <a:rPr lang="de-DE" sz="1200" dirty="0" err="1" smtClean="0"/>
+              <a:t>transition</a:t>
             </a:r>
             <a:endParaRPr lang="de-DE" sz="1200" dirty="0"/>
           </a:p>
@@ -14218,8 +14813,8 @@
         </p:nvCxnSpPr>
         <p:spPr>
           <a:xfrm>
-            <a:off x="857224" y="1678769"/>
-            <a:ext cx="500066" cy="0"/>
+            <a:off x="928662" y="1678769"/>
+            <a:ext cx="428628" cy="0"/>
           </a:xfrm>
           <a:prstGeom prst="line">
             <a:avLst/>
@@ -14252,8 +14847,8 @@
         </p:nvCxnSpPr>
         <p:spPr>
           <a:xfrm flipV="1">
-            <a:off x="857224" y="321447"/>
-            <a:ext cx="2000264" cy="1357322"/>
+            <a:off x="928662" y="321447"/>
+            <a:ext cx="1928826" cy="1357322"/>
           </a:xfrm>
           <a:prstGeom prst="line">
             <a:avLst/>
@@ -14286,7 +14881,7 @@
         </p:nvCxnSpPr>
         <p:spPr>
           <a:xfrm rot="16200000" flipV="1">
-            <a:off x="267861" y="1982380"/>
+            <a:off x="339299" y="1982380"/>
             <a:ext cx="571504" cy="178595"/>
           </a:xfrm>
           <a:prstGeom prst="line">
@@ -14320,7 +14915,7 @@
         </p:nvCxnSpPr>
         <p:spPr>
           <a:xfrm rot="16200000" flipH="1">
-            <a:off x="357166" y="2857488"/>
+            <a:off x="428604" y="2857488"/>
             <a:ext cx="785818" cy="214330"/>
           </a:xfrm>
           <a:prstGeom prst="line">
@@ -14354,8 +14949,8 @@
         </p:nvCxnSpPr>
         <p:spPr>
           <a:xfrm rot="16200000" flipH="1">
-            <a:off x="1160844" y="3268272"/>
-            <a:ext cx="250033" cy="857240"/>
+            <a:off x="1196563" y="3303991"/>
+            <a:ext cx="250033" cy="785802"/>
           </a:xfrm>
           <a:prstGeom prst="line">
             <a:avLst/>
@@ -14388,8 +14983,8 @@
         </p:nvCxnSpPr>
         <p:spPr>
           <a:xfrm rot="16200000" flipH="1">
-            <a:off x="946530" y="3482586"/>
-            <a:ext cx="678661" cy="857240"/>
+            <a:off x="982249" y="3518305"/>
+            <a:ext cx="678661" cy="785802"/>
           </a:xfrm>
           <a:prstGeom prst="line">
             <a:avLst/>
@@ -15702,14 +16297,990 @@
       </p:cxnSp>
       <p:sp>
         <p:nvSpPr>
-          <p:cNvPr id="478" name="Textfeld 477"/>
+          <p:cNvPr id="92" name="Abgerundetes Rechteck 91"/>
+          <p:cNvSpPr/>
+          <p:nvPr/>
+        </p:nvSpPr>
+        <p:spPr>
+          <a:xfrm>
+            <a:off x="2857488" y="6072206"/>
+            <a:ext cx="2000264" cy="214314"/>
+          </a:xfrm>
+          <a:prstGeom prst="roundRect">
+            <a:avLst/>
+          </a:prstGeom>
+          <a:solidFill>
+            <a:srgbClr val="F7FAFF"/>
+          </a:solidFill>
+        </p:spPr>
+        <p:style>
+          <a:lnRef idx="2">
+            <a:schemeClr val="accent1"/>
+          </a:lnRef>
+          <a:fillRef idx="1">
+            <a:schemeClr val="lt1"/>
+          </a:fillRef>
+          <a:effectRef idx="0">
+            <a:schemeClr val="accent1"/>
+          </a:effectRef>
+          <a:fontRef idx="minor">
+            <a:schemeClr val="dk1"/>
+          </a:fontRef>
+        </p:style>
+        <p:txBody>
+          <a:bodyPr rtlCol="0" anchor="ctr"/>
+          <a:lstStyle/>
+          <a:p>
+            <a:pPr algn="ctr"/>
+            <a:r>
+              <a:rPr lang="de-DE" sz="1200" dirty="0" err="1" smtClean="0"/>
+              <a:t>MolecularInteraction</a:t>
+            </a:r>
+            <a:endParaRPr lang="de-DE" sz="1200" dirty="0"/>
+          </a:p>
+        </p:txBody>
+      </p:sp>
+      <p:sp>
+        <p:nvSpPr>
+          <p:cNvPr id="93" name="Abgerundetes Rechteck 92"/>
+          <p:cNvSpPr/>
+          <p:nvPr/>
+        </p:nvSpPr>
+        <p:spPr>
+          <a:xfrm>
+            <a:off x="2857488" y="5786454"/>
+            <a:ext cx="2000264" cy="214314"/>
+          </a:xfrm>
+          <a:prstGeom prst="roundRect">
+            <a:avLst/>
+          </a:prstGeom>
+          <a:solidFill>
+            <a:srgbClr val="F7FAFF"/>
+          </a:solidFill>
+        </p:spPr>
+        <p:style>
+          <a:lnRef idx="2">
+            <a:schemeClr val="accent1"/>
+          </a:lnRef>
+          <a:fillRef idx="1">
+            <a:schemeClr val="lt1"/>
+          </a:fillRef>
+          <a:effectRef idx="0">
+            <a:schemeClr val="accent1"/>
+          </a:effectRef>
+          <a:fontRef idx="minor">
+            <a:schemeClr val="dk1"/>
+          </a:fontRef>
+        </p:style>
+        <p:txBody>
+          <a:bodyPr rtlCol="0" anchor="ctr"/>
+          <a:lstStyle/>
+          <a:p>
+            <a:pPr algn="ctr"/>
+            <a:r>
+              <a:rPr lang="de-DE" sz="1200" dirty="0" err="1" smtClean="0"/>
+              <a:t>GeneticInteraction</a:t>
+            </a:r>
+            <a:endParaRPr lang="de-DE" sz="1200" dirty="0"/>
+          </a:p>
+        </p:txBody>
+      </p:sp>
+      <p:cxnSp>
+        <p:nvCxnSpPr>
+          <p:cNvPr id="95" name="Gerade Verbindung 94"/>
+          <p:cNvCxnSpPr>
+            <a:stCxn id="13" idx="2"/>
+            <a:endCxn id="93" idx="1"/>
+          </p:cNvCxnSpPr>
+          <p:nvPr/>
+        </p:nvCxnSpPr>
+        <p:spPr>
+          <a:xfrm rot="16200000" flipH="1">
+            <a:off x="732216" y="3768338"/>
+            <a:ext cx="2321735" cy="1928810"/>
+          </a:xfrm>
+          <a:prstGeom prst="line">
+            <a:avLst/>
+          </a:prstGeom>
+          <a:ln/>
+        </p:spPr>
+        <p:style>
+          <a:lnRef idx="2">
+            <a:schemeClr val="accent1"/>
+          </a:lnRef>
+          <a:fillRef idx="1">
+            <a:schemeClr val="lt1"/>
+          </a:fillRef>
+          <a:effectRef idx="0">
+            <a:schemeClr val="accent1"/>
+          </a:effectRef>
+          <a:fontRef idx="minor">
+            <a:schemeClr val="dk1"/>
+          </a:fontRef>
+        </p:style>
+      </p:cxnSp>
+      <p:cxnSp>
+        <p:nvCxnSpPr>
+          <p:cNvPr id="99" name="Gerade Verbindung 98"/>
+          <p:cNvCxnSpPr>
+            <a:stCxn id="13" idx="2"/>
+            <a:endCxn id="92" idx="1"/>
+          </p:cNvCxnSpPr>
+          <p:nvPr/>
+        </p:nvCxnSpPr>
+        <p:spPr>
+          <a:xfrm rot="16200000" flipH="1">
+            <a:off x="589340" y="3911214"/>
+            <a:ext cx="2607487" cy="1928810"/>
+          </a:xfrm>
+          <a:prstGeom prst="line">
+            <a:avLst/>
+          </a:prstGeom>
+          <a:ln/>
+        </p:spPr>
+        <p:style>
+          <a:lnRef idx="2">
+            <a:schemeClr val="accent1"/>
+          </a:lnRef>
+          <a:fillRef idx="1">
+            <a:schemeClr val="lt1"/>
+          </a:fillRef>
+          <a:effectRef idx="0">
+            <a:schemeClr val="accent1"/>
+          </a:effectRef>
+          <a:fontRef idx="minor">
+            <a:schemeClr val="dk1"/>
+          </a:fontRef>
+        </p:style>
+      </p:cxnSp>
+      <p:sp>
+        <p:nvSpPr>
+          <p:cNvPr id="103" name="Abgerundetes Rechteck 102"/>
+          <p:cNvSpPr/>
+          <p:nvPr/>
+        </p:nvSpPr>
+        <p:spPr>
+          <a:xfrm>
+            <a:off x="2857488" y="5500702"/>
+            <a:ext cx="2000264" cy="214314"/>
+          </a:xfrm>
+          <a:prstGeom prst="roundRect">
+            <a:avLst/>
+          </a:prstGeom>
+          <a:solidFill>
+            <a:srgbClr val="F7FAFF"/>
+          </a:solidFill>
+        </p:spPr>
+        <p:style>
+          <a:lnRef idx="2">
+            <a:schemeClr val="accent1"/>
+          </a:lnRef>
+          <a:fillRef idx="1">
+            <a:schemeClr val="lt1"/>
+          </a:fillRef>
+          <a:effectRef idx="0">
+            <a:schemeClr val="accent1"/>
+          </a:effectRef>
+          <a:fontRef idx="minor">
+            <a:schemeClr val="dk1"/>
+          </a:fontRef>
+        </p:style>
+        <p:txBody>
+          <a:bodyPr rtlCol="0" anchor="ctr"/>
+          <a:lstStyle/>
+          <a:p>
+            <a:pPr algn="ctr"/>
+            <a:r>
+              <a:rPr lang="de-DE" sz="1200" dirty="0" err="1" smtClean="0"/>
+              <a:t>TemplateReaction</a:t>
+            </a:r>
+            <a:endParaRPr lang="de-DE" sz="1200" dirty="0"/>
+          </a:p>
+        </p:txBody>
+      </p:sp>
+      <p:cxnSp>
+        <p:nvCxnSpPr>
+          <p:cNvPr id="105" name="Gerade Verbindung 104"/>
+          <p:cNvCxnSpPr>
+            <a:stCxn id="13" idx="2"/>
+            <a:endCxn id="103" idx="1"/>
+          </p:cNvCxnSpPr>
+          <p:nvPr/>
+        </p:nvCxnSpPr>
+        <p:spPr>
+          <a:xfrm rot="16200000" flipH="1">
+            <a:off x="875092" y="3625462"/>
+            <a:ext cx="2035983" cy="1928810"/>
+          </a:xfrm>
+          <a:prstGeom prst="line">
+            <a:avLst/>
+          </a:prstGeom>
+          <a:ln/>
+        </p:spPr>
+        <p:style>
+          <a:lnRef idx="2">
+            <a:schemeClr val="accent1"/>
+          </a:lnRef>
+          <a:fillRef idx="1">
+            <a:schemeClr val="lt1"/>
+          </a:fillRef>
+          <a:effectRef idx="0">
+            <a:schemeClr val="accent1"/>
+          </a:effectRef>
+          <a:fontRef idx="minor">
+            <a:schemeClr val="dk1"/>
+          </a:fontRef>
+        </p:style>
+      </p:cxnSp>
+      <p:sp>
+        <p:nvSpPr>
+          <p:cNvPr id="168" name="Abgerundetes Rechteck 167"/>
+          <p:cNvSpPr/>
+          <p:nvPr/>
+        </p:nvSpPr>
+        <p:spPr>
+          <a:xfrm>
+            <a:off x="2857488" y="5072074"/>
+            <a:ext cx="2000264" cy="214314"/>
+          </a:xfrm>
+          <a:prstGeom prst="roundRect">
+            <a:avLst/>
+          </a:prstGeom>
+          <a:solidFill>
+            <a:srgbClr val="F7FAFF"/>
+          </a:solidFill>
+        </p:spPr>
+        <p:style>
+          <a:lnRef idx="2">
+            <a:schemeClr val="accent1"/>
+          </a:lnRef>
+          <a:fillRef idx="1">
+            <a:schemeClr val="lt1"/>
+          </a:fillRef>
+          <a:effectRef idx="0">
+            <a:schemeClr val="accent1"/>
+          </a:effectRef>
+          <a:fontRef idx="minor">
+            <a:schemeClr val="dk1"/>
+          </a:fontRef>
+        </p:style>
+        <p:txBody>
+          <a:bodyPr rtlCol="0" anchor="ctr"/>
+          <a:lstStyle/>
+          <a:p>
+            <a:pPr algn="ctr"/>
+            <a:r>
+              <a:rPr lang="de-DE" sz="1200" dirty="0" err="1" smtClean="0"/>
+              <a:t>TemplateReactionRegulation</a:t>
+            </a:r>
+            <a:endParaRPr lang="de-DE" sz="1200" dirty="0"/>
+          </a:p>
+        </p:txBody>
+      </p:sp>
+      <p:cxnSp>
+        <p:nvCxnSpPr>
+          <p:cNvPr id="169" name="Gerade Verbindung 168"/>
+          <p:cNvCxnSpPr>
+            <a:stCxn id="15" idx="3"/>
+            <a:endCxn id="168" idx="1"/>
+          </p:cNvCxnSpPr>
+          <p:nvPr/>
+        </p:nvCxnSpPr>
+        <p:spPr>
+          <a:xfrm>
+            <a:off x="2643174" y="4250537"/>
+            <a:ext cx="214314" cy="928694"/>
+          </a:xfrm>
+          <a:prstGeom prst="line">
+            <a:avLst/>
+          </a:prstGeom>
+          <a:ln/>
+        </p:spPr>
+        <p:style>
+          <a:lnRef idx="2">
+            <a:schemeClr val="accent1"/>
+          </a:lnRef>
+          <a:fillRef idx="1">
+            <a:schemeClr val="lt1"/>
+          </a:fillRef>
+          <a:effectRef idx="0">
+            <a:schemeClr val="accent1"/>
+          </a:effectRef>
+          <a:fontRef idx="minor">
+            <a:schemeClr val="dk1"/>
+          </a:fontRef>
+        </p:style>
+      </p:cxnSp>
+      <p:sp>
+        <p:nvSpPr>
+          <p:cNvPr id="180" name="Abgerundetes Rechteck 179"/>
+          <p:cNvSpPr/>
+          <p:nvPr/>
+        </p:nvSpPr>
+        <p:spPr>
+          <a:xfrm>
+            <a:off x="2857488" y="4071942"/>
+            <a:ext cx="2000264" cy="214314"/>
+          </a:xfrm>
+          <a:prstGeom prst="roundRect">
+            <a:avLst/>
+          </a:prstGeom>
+          <a:solidFill>
+            <a:srgbClr val="F7FAFF"/>
+          </a:solidFill>
+        </p:spPr>
+        <p:style>
+          <a:lnRef idx="2">
+            <a:schemeClr val="accent1"/>
+          </a:lnRef>
+          <a:fillRef idx="1">
+            <a:schemeClr val="lt1"/>
+          </a:fillRef>
+          <a:effectRef idx="0">
+            <a:schemeClr val="accent1"/>
+          </a:effectRef>
+          <a:fontRef idx="minor">
+            <a:schemeClr val="dk1"/>
+          </a:fontRef>
+        </p:style>
+        <p:txBody>
+          <a:bodyPr rtlCol="0" anchor="ctr"/>
+          <a:lstStyle/>
+          <a:p>
+            <a:pPr algn="ctr"/>
+            <a:r>
+              <a:rPr lang="de-DE" sz="1200" dirty="0" smtClean="0"/>
+              <a:t>Degradation</a:t>
+            </a:r>
+            <a:endParaRPr lang="de-DE" sz="1200" dirty="0"/>
+          </a:p>
+        </p:txBody>
+      </p:sp>
+      <p:cxnSp>
+        <p:nvCxnSpPr>
+          <p:cNvPr id="184" name="Gerade Verbindung 183"/>
+          <p:cNvCxnSpPr>
+            <a:endCxn id="180" idx="1"/>
+          </p:cNvCxnSpPr>
+          <p:nvPr/>
+        </p:nvCxnSpPr>
+        <p:spPr>
+          <a:xfrm>
+            <a:off x="2643174" y="3893347"/>
+            <a:ext cx="214314" cy="285752"/>
+          </a:xfrm>
+          <a:prstGeom prst="line">
+            <a:avLst/>
+          </a:prstGeom>
+          <a:ln/>
+        </p:spPr>
+        <p:style>
+          <a:lnRef idx="2">
+            <a:schemeClr val="accent1"/>
+          </a:lnRef>
+          <a:fillRef idx="1">
+            <a:schemeClr val="lt1"/>
+          </a:fillRef>
+          <a:effectRef idx="0">
+            <a:schemeClr val="accent1"/>
+          </a:effectRef>
+          <a:fontRef idx="minor">
+            <a:schemeClr val="dk1"/>
+          </a:fontRef>
+        </p:style>
+      </p:cxnSp>
+      <p:sp>
+        <p:nvSpPr>
+          <p:cNvPr id="245" name="Abgerundetes Rechteck 244"/>
+          <p:cNvSpPr/>
+          <p:nvPr/>
+        </p:nvSpPr>
+        <p:spPr>
+          <a:xfrm>
+            <a:off x="2857488" y="2000240"/>
+            <a:ext cx="1571636" cy="214314"/>
+          </a:xfrm>
+          <a:prstGeom prst="roundRect">
+            <a:avLst/>
+          </a:prstGeom>
+          <a:solidFill>
+            <a:srgbClr val="F7FAFF"/>
+          </a:solidFill>
+        </p:spPr>
+        <p:style>
+          <a:lnRef idx="2">
+            <a:schemeClr val="accent1"/>
+          </a:lnRef>
+          <a:fillRef idx="1">
+            <a:schemeClr val="lt1"/>
+          </a:fillRef>
+          <a:effectRef idx="0">
+            <a:schemeClr val="accent1"/>
+          </a:effectRef>
+          <a:fontRef idx="minor">
+            <a:schemeClr val="dk1"/>
+          </a:fontRef>
+        </p:style>
+        <p:txBody>
+          <a:bodyPr rtlCol="0" anchor="ctr"/>
+          <a:lstStyle/>
+          <a:p>
+            <a:pPr algn="ctr"/>
+            <a:r>
+              <a:rPr lang="de-DE" sz="1200" dirty="0" err="1" smtClean="0"/>
+              <a:t>RnaRegion</a:t>
+            </a:r>
+            <a:endParaRPr lang="de-DE" sz="1200" dirty="0"/>
+          </a:p>
+        </p:txBody>
+      </p:sp>
+      <p:sp>
+        <p:nvSpPr>
+          <p:cNvPr id="246" name="Abgerundetes Rechteck 245"/>
+          <p:cNvSpPr/>
+          <p:nvPr/>
+        </p:nvSpPr>
+        <p:spPr>
+          <a:xfrm>
+            <a:off x="2857488" y="2285992"/>
+            <a:ext cx="1571636" cy="214314"/>
+          </a:xfrm>
+          <a:prstGeom prst="roundRect">
+            <a:avLst/>
+          </a:prstGeom>
+          <a:solidFill>
+            <a:srgbClr val="F7FAFF"/>
+          </a:solidFill>
+        </p:spPr>
+        <p:style>
+          <a:lnRef idx="2">
+            <a:schemeClr val="accent1"/>
+          </a:lnRef>
+          <a:fillRef idx="1">
+            <a:schemeClr val="lt1"/>
+          </a:fillRef>
+          <a:effectRef idx="0">
+            <a:schemeClr val="accent1"/>
+          </a:effectRef>
+          <a:fontRef idx="minor">
+            <a:schemeClr val="dk1"/>
+          </a:fontRef>
+        </p:style>
+        <p:txBody>
+          <a:bodyPr rtlCol="0" anchor="ctr"/>
+          <a:lstStyle/>
+          <a:p>
+            <a:pPr algn="ctr"/>
+            <a:r>
+              <a:rPr lang="de-DE" sz="1200" dirty="0" err="1"/>
+              <a:t>S</a:t>
+            </a:r>
+            <a:r>
+              <a:rPr lang="de-DE" sz="1200" dirty="0" err="1" smtClean="0"/>
+              <a:t>mallMolecule</a:t>
+            </a:r>
+            <a:endParaRPr lang="de-DE" sz="1200" dirty="0"/>
+          </a:p>
+        </p:txBody>
+      </p:sp>
+      <p:cxnSp>
+        <p:nvCxnSpPr>
+          <p:cNvPr id="250" name="Gerade Verbindung 249"/>
+          <p:cNvCxnSpPr>
+            <a:stCxn id="245" idx="1"/>
+            <a:endCxn id="5" idx="3"/>
+          </p:cNvCxnSpPr>
+          <p:nvPr/>
+        </p:nvCxnSpPr>
+        <p:spPr>
+          <a:xfrm rot="10800000">
+            <a:off x="2500298" y="1678769"/>
+            <a:ext cx="357190" cy="428628"/>
+          </a:xfrm>
+          <a:prstGeom prst="line">
+            <a:avLst/>
+          </a:prstGeom>
+          <a:ln/>
+        </p:spPr>
+        <p:style>
+          <a:lnRef idx="2">
+            <a:schemeClr val="accent1"/>
+          </a:lnRef>
+          <a:fillRef idx="1">
+            <a:schemeClr val="lt1"/>
+          </a:fillRef>
+          <a:effectRef idx="0">
+            <a:schemeClr val="accent1"/>
+          </a:effectRef>
+          <a:fontRef idx="minor">
+            <a:schemeClr val="dk1"/>
+          </a:fontRef>
+        </p:style>
+      </p:cxnSp>
+      <p:cxnSp>
+        <p:nvCxnSpPr>
+          <p:cNvPr id="251" name="Gerade Verbindung 250"/>
+          <p:cNvCxnSpPr>
+            <a:stCxn id="246" idx="1"/>
+            <a:endCxn id="5" idx="3"/>
+          </p:cNvCxnSpPr>
+          <p:nvPr/>
+        </p:nvCxnSpPr>
+        <p:spPr>
+          <a:xfrm rot="10800000">
+            <a:off x="2500298" y="1678769"/>
+            <a:ext cx="357190" cy="714380"/>
+          </a:xfrm>
+          <a:prstGeom prst="line">
+            <a:avLst/>
+          </a:prstGeom>
+          <a:ln/>
+        </p:spPr>
+        <p:style>
+          <a:lnRef idx="2">
+            <a:schemeClr val="accent1"/>
+          </a:lnRef>
+          <a:fillRef idx="1">
+            <a:schemeClr val="lt1"/>
+          </a:fillRef>
+          <a:effectRef idx="0">
+            <a:schemeClr val="accent1"/>
+          </a:effectRef>
+          <a:fontRef idx="minor">
+            <a:schemeClr val="dk1"/>
+          </a:fontRef>
+        </p:style>
+      </p:cxnSp>
+      <p:cxnSp>
+        <p:nvCxnSpPr>
+          <p:cNvPr id="256" name="Gerade Verbindung 255"/>
+          <p:cNvCxnSpPr>
+            <a:stCxn id="245" idx="3"/>
+            <a:endCxn id="39" idx="1"/>
+          </p:cNvCxnSpPr>
+          <p:nvPr/>
+        </p:nvCxnSpPr>
+        <p:spPr>
+          <a:xfrm flipV="1">
+            <a:off x="4429124" y="1464455"/>
+            <a:ext cx="857256" cy="642942"/>
+          </a:xfrm>
+          <a:prstGeom prst="line">
+            <a:avLst/>
+          </a:prstGeom>
+          <a:ln w="12700"/>
+        </p:spPr>
+        <p:style>
+          <a:lnRef idx="1">
+            <a:schemeClr val="dk1"/>
+          </a:lnRef>
+          <a:fillRef idx="0">
+            <a:schemeClr val="dk1"/>
+          </a:fillRef>
+          <a:effectRef idx="0">
+            <a:schemeClr val="dk1"/>
+          </a:effectRef>
+          <a:fontRef idx="minor">
+            <a:schemeClr val="tx1"/>
+          </a:fontRef>
+        </p:style>
+      </p:cxnSp>
+      <p:cxnSp>
+        <p:nvCxnSpPr>
+          <p:cNvPr id="259" name="Gerade Verbindung 258"/>
+          <p:cNvCxnSpPr>
+            <a:stCxn id="246" idx="3"/>
+            <a:endCxn id="39" idx="1"/>
+          </p:cNvCxnSpPr>
+          <p:nvPr/>
+        </p:nvCxnSpPr>
+        <p:spPr>
+          <a:xfrm flipV="1">
+            <a:off x="4429124" y="1464455"/>
+            <a:ext cx="857256" cy="928694"/>
+          </a:xfrm>
+          <a:prstGeom prst="line">
+            <a:avLst/>
+          </a:prstGeom>
+          <a:ln w="12700"/>
+        </p:spPr>
+        <p:style>
+          <a:lnRef idx="1">
+            <a:schemeClr val="dk1"/>
+          </a:lnRef>
+          <a:fillRef idx="0">
+            <a:schemeClr val="dk1"/>
+          </a:fillRef>
+          <a:effectRef idx="0">
+            <a:schemeClr val="dk1"/>
+          </a:effectRef>
+          <a:fontRef idx="minor">
+            <a:schemeClr val="tx1"/>
+          </a:fontRef>
+        </p:style>
+      </p:cxnSp>
+      <p:cxnSp>
+        <p:nvCxnSpPr>
+          <p:cNvPr id="262" name="Gerade Verbindung 261"/>
+          <p:cNvCxnSpPr>
+            <a:stCxn id="93" idx="3"/>
+            <a:endCxn id="51" idx="1"/>
+          </p:cNvCxnSpPr>
+          <p:nvPr/>
+        </p:nvCxnSpPr>
+        <p:spPr>
+          <a:xfrm flipV="1">
+            <a:off x="4857752" y="4893479"/>
+            <a:ext cx="1000132" cy="1000132"/>
+          </a:xfrm>
+          <a:prstGeom prst="line">
+            <a:avLst/>
+          </a:prstGeom>
+          <a:ln w="12700"/>
+        </p:spPr>
+        <p:style>
+          <a:lnRef idx="1">
+            <a:schemeClr val="dk1"/>
+          </a:lnRef>
+          <a:fillRef idx="0">
+            <a:schemeClr val="dk1"/>
+          </a:fillRef>
+          <a:effectRef idx="0">
+            <a:schemeClr val="dk1"/>
+          </a:effectRef>
+          <a:fontRef idx="minor">
+            <a:schemeClr val="tx1"/>
+          </a:fontRef>
+        </p:style>
+      </p:cxnSp>
+      <p:cxnSp>
+        <p:nvCxnSpPr>
+          <p:cNvPr id="263" name="Gerade Verbindung 262"/>
+          <p:cNvCxnSpPr>
+            <a:stCxn id="92" idx="3"/>
+            <a:endCxn id="51" idx="1"/>
+          </p:cNvCxnSpPr>
+          <p:nvPr/>
+        </p:nvCxnSpPr>
+        <p:spPr>
+          <a:xfrm flipV="1">
+            <a:off x="4857752" y="4893479"/>
+            <a:ext cx="1000132" cy="1285884"/>
+          </a:xfrm>
+          <a:prstGeom prst="line">
+            <a:avLst/>
+          </a:prstGeom>
+          <a:ln w="12700"/>
+        </p:spPr>
+        <p:style>
+          <a:lnRef idx="1">
+            <a:schemeClr val="dk1"/>
+          </a:lnRef>
+          <a:fillRef idx="0">
+            <a:schemeClr val="dk1"/>
+          </a:fillRef>
+          <a:effectRef idx="0">
+            <a:schemeClr val="dk1"/>
+          </a:effectRef>
+          <a:fontRef idx="minor">
+            <a:schemeClr val="tx1"/>
+          </a:fontRef>
+        </p:style>
+      </p:cxnSp>
+      <p:cxnSp>
+        <p:nvCxnSpPr>
+          <p:cNvPr id="264" name="Gerade Verbindung 263"/>
+          <p:cNvCxnSpPr>
+            <a:stCxn id="168" idx="3"/>
+            <a:endCxn id="51" idx="1"/>
+          </p:cNvCxnSpPr>
+          <p:nvPr/>
+        </p:nvCxnSpPr>
+        <p:spPr>
+          <a:xfrm flipV="1">
+            <a:off x="4857752" y="4893479"/>
+            <a:ext cx="1000132" cy="285752"/>
+          </a:xfrm>
+          <a:prstGeom prst="line">
+            <a:avLst/>
+          </a:prstGeom>
+          <a:ln w="12700"/>
+        </p:spPr>
+        <p:style>
+          <a:lnRef idx="1">
+            <a:schemeClr val="dk1"/>
+          </a:lnRef>
+          <a:fillRef idx="0">
+            <a:schemeClr val="dk1"/>
+          </a:fillRef>
+          <a:effectRef idx="0">
+            <a:schemeClr val="dk1"/>
+          </a:effectRef>
+          <a:fontRef idx="minor">
+            <a:schemeClr val="tx1"/>
+          </a:fontRef>
+        </p:style>
+      </p:cxnSp>
+      <p:cxnSp>
+        <p:nvCxnSpPr>
+          <p:cNvPr id="265" name="Gerade Verbindung 264"/>
+          <p:cNvCxnSpPr>
+            <a:stCxn id="180" idx="3"/>
+            <a:endCxn id="51" idx="1"/>
+          </p:cNvCxnSpPr>
+          <p:nvPr/>
+        </p:nvCxnSpPr>
+        <p:spPr>
+          <a:xfrm>
+            <a:off x="4857752" y="4179099"/>
+            <a:ext cx="1000132" cy="714380"/>
+          </a:xfrm>
+          <a:prstGeom prst="line">
+            <a:avLst/>
+          </a:prstGeom>
+          <a:ln w="12700"/>
+        </p:spPr>
+        <p:style>
+          <a:lnRef idx="1">
+            <a:schemeClr val="dk1"/>
+          </a:lnRef>
+          <a:fillRef idx="0">
+            <a:schemeClr val="dk1"/>
+          </a:fillRef>
+          <a:effectRef idx="0">
+            <a:schemeClr val="dk1"/>
+          </a:effectRef>
+          <a:fontRef idx="minor">
+            <a:schemeClr val="tx1"/>
+          </a:fontRef>
+        </p:style>
+      </p:cxnSp>
+      <p:cxnSp>
+        <p:nvCxnSpPr>
+          <p:cNvPr id="266" name="Gerade Verbindung 265"/>
+          <p:cNvCxnSpPr>
+            <a:stCxn id="103" idx="3"/>
+            <a:endCxn id="51" idx="1"/>
+          </p:cNvCxnSpPr>
+          <p:nvPr/>
+        </p:nvCxnSpPr>
+        <p:spPr>
+          <a:xfrm flipV="1">
+            <a:off x="4857752" y="4893479"/>
+            <a:ext cx="1000132" cy="714380"/>
+          </a:xfrm>
+          <a:prstGeom prst="line">
+            <a:avLst/>
+          </a:prstGeom>
+          <a:ln w="12700">
+            <a:prstDash val="dash"/>
+          </a:ln>
+        </p:spPr>
+        <p:style>
+          <a:lnRef idx="1">
+            <a:schemeClr val="dk1"/>
+          </a:lnRef>
+          <a:fillRef idx="0">
+            <a:schemeClr val="dk1"/>
+          </a:fillRef>
+          <a:effectRef idx="0">
+            <a:schemeClr val="dk1"/>
+          </a:effectRef>
+          <a:fontRef idx="minor">
+            <a:schemeClr val="tx1"/>
+          </a:fontRef>
+        </p:style>
+      </p:cxnSp>
+      <p:cxnSp>
+        <p:nvCxnSpPr>
+          <p:cNvPr id="267" name="Gerade Verbindung 266"/>
+          <p:cNvCxnSpPr>
+            <a:stCxn id="103" idx="3"/>
+            <a:endCxn id="40" idx="1"/>
+          </p:cNvCxnSpPr>
+          <p:nvPr/>
+        </p:nvCxnSpPr>
+        <p:spPr>
+          <a:xfrm flipV="1">
+            <a:off x="4857752" y="3821909"/>
+            <a:ext cx="1000132" cy="1785950"/>
+          </a:xfrm>
+          <a:prstGeom prst="line">
+            <a:avLst/>
+          </a:prstGeom>
+          <a:ln w="12700">
+            <a:prstDash val="dash"/>
+          </a:ln>
+        </p:spPr>
+        <p:style>
+          <a:lnRef idx="1">
+            <a:schemeClr val="dk1"/>
+          </a:lnRef>
+          <a:fillRef idx="0">
+            <a:schemeClr val="dk1"/>
+          </a:fillRef>
+          <a:effectRef idx="0">
+            <a:schemeClr val="dk1"/>
+          </a:effectRef>
+          <a:fontRef idx="minor">
+            <a:schemeClr val="tx1"/>
+          </a:fontRef>
+        </p:style>
+      </p:cxnSp>
+      <p:cxnSp>
+        <p:nvCxnSpPr>
+          <p:cNvPr id="268" name="Gerade Verbindung 267"/>
+          <p:cNvCxnSpPr>
+            <a:stCxn id="31" idx="3"/>
+            <a:endCxn id="51" idx="1"/>
+          </p:cNvCxnSpPr>
+          <p:nvPr/>
+        </p:nvCxnSpPr>
+        <p:spPr>
+          <a:xfrm>
+            <a:off x="4857752" y="4607727"/>
+            <a:ext cx="1000132" cy="285752"/>
+          </a:xfrm>
+          <a:prstGeom prst="line">
+            <a:avLst/>
+          </a:prstGeom>
+          <a:ln w="12700">
+            <a:prstDash val="dash"/>
+          </a:ln>
+        </p:spPr>
+        <p:style>
+          <a:lnRef idx="1">
+            <a:schemeClr val="dk1"/>
+          </a:lnRef>
+          <a:fillRef idx="0">
+            <a:schemeClr val="dk1"/>
+          </a:fillRef>
+          <a:effectRef idx="0">
+            <a:schemeClr val="dk1"/>
+          </a:effectRef>
+          <a:fontRef idx="minor">
+            <a:schemeClr val="tx1"/>
+          </a:fontRef>
+        </p:style>
+      </p:cxnSp>
+      <p:cxnSp>
+        <p:nvCxnSpPr>
+          <p:cNvPr id="285" name="Gerade Verbindung 284"/>
+          <p:cNvCxnSpPr>
+            <a:stCxn id="32" idx="3"/>
+            <a:endCxn id="40" idx="1"/>
+          </p:cNvCxnSpPr>
+          <p:nvPr/>
+        </p:nvCxnSpPr>
+        <p:spPr>
+          <a:xfrm flipV="1">
+            <a:off x="4857752" y="3821909"/>
+            <a:ext cx="1000132" cy="1071570"/>
+          </a:xfrm>
+          <a:prstGeom prst="line">
+            <a:avLst/>
+          </a:prstGeom>
+          <a:ln w="12700">
+            <a:prstDash val="dash"/>
+          </a:ln>
+        </p:spPr>
+        <p:style>
+          <a:lnRef idx="1">
+            <a:schemeClr val="dk1"/>
+          </a:lnRef>
+          <a:fillRef idx="0">
+            <a:schemeClr val="dk1"/>
+          </a:fillRef>
+          <a:effectRef idx="0">
+            <a:schemeClr val="dk1"/>
+          </a:effectRef>
+          <a:fontRef idx="minor">
+            <a:schemeClr val="tx1"/>
+          </a:fontRef>
+        </p:style>
+      </p:cxnSp>
+      <p:cxnSp>
+        <p:nvCxnSpPr>
+          <p:cNvPr id="286" name="Gerade Verbindung 285"/>
+          <p:cNvCxnSpPr>
+            <a:stCxn id="31" idx="3"/>
+            <a:endCxn id="40" idx="1"/>
+          </p:cNvCxnSpPr>
+          <p:nvPr/>
+        </p:nvCxnSpPr>
+        <p:spPr>
+          <a:xfrm flipV="1">
+            <a:off x="4857752" y="3821909"/>
+            <a:ext cx="1000132" cy="785818"/>
+          </a:xfrm>
+          <a:prstGeom prst="line">
+            <a:avLst/>
+          </a:prstGeom>
+          <a:ln w="12700">
+            <a:prstDash val="dash"/>
+          </a:ln>
+        </p:spPr>
+        <p:style>
+          <a:lnRef idx="1">
+            <a:schemeClr val="dk1"/>
+          </a:lnRef>
+          <a:fillRef idx="0">
+            <a:schemeClr val="dk1"/>
+          </a:fillRef>
+          <a:effectRef idx="0">
+            <a:schemeClr val="dk1"/>
+          </a:effectRef>
+          <a:fontRef idx="minor">
+            <a:schemeClr val="tx1"/>
+          </a:fontRef>
+        </p:style>
+      </p:cxnSp>
+      <p:cxnSp>
+        <p:nvCxnSpPr>
+          <p:cNvPr id="291" name="Gerade Verbindung 290"/>
+          <p:cNvCxnSpPr>
+            <a:stCxn id="32" idx="3"/>
+            <a:endCxn id="51" idx="1"/>
+          </p:cNvCxnSpPr>
+          <p:nvPr/>
+        </p:nvCxnSpPr>
+        <p:spPr>
+          <a:xfrm>
+            <a:off x="4857752" y="4893479"/>
+            <a:ext cx="1000132" cy="0"/>
+          </a:xfrm>
+          <a:prstGeom prst="line">
+            <a:avLst/>
+          </a:prstGeom>
+          <a:ln w="12700">
+            <a:prstDash val="dash"/>
+          </a:ln>
+        </p:spPr>
+        <p:style>
+          <a:lnRef idx="1">
+            <a:schemeClr val="dk1"/>
+          </a:lnRef>
+          <a:fillRef idx="0">
+            <a:schemeClr val="dk1"/>
+          </a:fillRef>
+          <a:effectRef idx="0">
+            <a:schemeClr val="dk1"/>
+          </a:effectRef>
+          <a:fontRef idx="minor">
+            <a:schemeClr val="tx1"/>
+          </a:fontRef>
+        </p:style>
+      </p:cxnSp>
+      <p:sp>
+        <p:nvSpPr>
+          <p:cNvPr id="106" name="Textfeld 105"/>
           <p:cNvSpPr txBox="1"/>
           <p:nvPr/>
         </p:nvSpPr>
         <p:spPr>
           <a:xfrm>
-            <a:off x="285720" y="6345816"/>
-            <a:ext cx="2857520" cy="369332"/>
+            <a:off x="7429520" y="5988626"/>
+            <a:ext cx="1571636" cy="369332"/>
           </a:xfrm>
           <a:prstGeom prst="rect">
             <a:avLst/>
@@ -15722,570 +17293,87 @@
           </a:bodyPr>
           <a:lstStyle/>
           <a:p>
-            <a:r>
-              <a:rPr lang="de-DE" dirty="0" err="1" smtClean="0"/>
-              <a:t>BioPax</a:t>
-            </a:r>
-            <a:r>
-              <a:rPr lang="de-DE" dirty="0" smtClean="0"/>
-              <a:t> Level 3 – SBML </a:t>
-            </a:r>
-            <a:r>
-              <a:rPr lang="de-DE" dirty="0" err="1" smtClean="0"/>
+            <a:pPr algn="r"/>
+            <a:r>
+              <a:rPr lang="de-DE" b="1" dirty="0" smtClean="0">
+                <a:solidFill>
+                  <a:schemeClr val="accent3"/>
+                </a:solidFill>
+              </a:rPr>
+              <a:t>SBML </a:t>
+            </a:r>
+            <a:r>
+              <a:rPr lang="de-DE" b="1" dirty="0" err="1" smtClean="0">
+                <a:solidFill>
+                  <a:schemeClr val="accent3"/>
+                </a:solidFill>
+              </a:rPr>
               <a:t>qual</a:t>
             </a:r>
-            <a:endParaRPr lang="de-DE" dirty="0"/>
-          </a:p>
-        </p:txBody>
-      </p:sp>
-      <p:sp>
-        <p:nvSpPr>
-          <p:cNvPr id="92" name="Abgerundetes Rechteck 91"/>
-          <p:cNvSpPr/>
-          <p:nvPr/>
-        </p:nvSpPr>
-        <p:spPr>
-          <a:xfrm>
-            <a:off x="2857488" y="6072206"/>
-            <a:ext cx="2000264" cy="214314"/>
-          </a:xfrm>
-          <a:prstGeom prst="roundRect">
-            <a:avLst/>
-          </a:prstGeom>
-        </p:spPr>
-        <p:style>
-          <a:lnRef idx="2">
-            <a:schemeClr val="accent1"/>
-          </a:lnRef>
-          <a:fillRef idx="1">
-            <a:schemeClr val="lt1"/>
-          </a:fillRef>
-          <a:effectRef idx="0">
-            <a:schemeClr val="accent1"/>
-          </a:effectRef>
-          <a:fontRef idx="minor">
-            <a:schemeClr val="dk1"/>
-          </a:fontRef>
-        </p:style>
-        <p:txBody>
-          <a:bodyPr rtlCol="0" anchor="ctr"/>
-          <a:lstStyle/>
-          <a:p>
-            <a:pPr algn="ctr"/>
-            <a:r>
-              <a:rPr lang="de-DE" sz="1200" dirty="0" err="1" smtClean="0"/>
-              <a:t>MolecularInteraction</a:t>
-            </a:r>
-            <a:endParaRPr lang="de-DE" sz="1200" dirty="0"/>
-          </a:p>
-        </p:txBody>
-      </p:sp>
-      <p:sp>
-        <p:nvSpPr>
-          <p:cNvPr id="93" name="Abgerundetes Rechteck 92"/>
-          <p:cNvSpPr/>
-          <p:nvPr/>
-        </p:nvSpPr>
-        <p:spPr>
-          <a:xfrm>
-            <a:off x="2857488" y="5786454"/>
-            <a:ext cx="2000264" cy="214314"/>
-          </a:xfrm>
-          <a:prstGeom prst="roundRect">
-            <a:avLst/>
-          </a:prstGeom>
-        </p:spPr>
-        <p:style>
-          <a:lnRef idx="2">
-            <a:schemeClr val="accent1"/>
-          </a:lnRef>
-          <a:fillRef idx="1">
-            <a:schemeClr val="lt1"/>
-          </a:fillRef>
-          <a:effectRef idx="0">
-            <a:schemeClr val="accent1"/>
-          </a:effectRef>
-          <a:fontRef idx="minor">
-            <a:schemeClr val="dk1"/>
-          </a:fontRef>
-        </p:style>
-        <p:txBody>
-          <a:bodyPr rtlCol="0" anchor="ctr"/>
-          <a:lstStyle/>
-          <a:p>
-            <a:pPr algn="ctr"/>
-            <a:r>
-              <a:rPr lang="de-DE" sz="1200" dirty="0" err="1" smtClean="0"/>
-              <a:t>GeneticInteraction</a:t>
-            </a:r>
-            <a:endParaRPr lang="de-DE" sz="1200" dirty="0"/>
-          </a:p>
-        </p:txBody>
-      </p:sp>
-      <p:cxnSp>
-        <p:nvCxnSpPr>
-          <p:cNvPr id="95" name="Gerade Verbindung 94"/>
-          <p:cNvCxnSpPr>
-            <a:stCxn id="13" idx="2"/>
-            <a:endCxn id="93" idx="1"/>
-          </p:cNvCxnSpPr>
-          <p:nvPr/>
-        </p:nvCxnSpPr>
-        <p:spPr>
-          <a:xfrm rot="16200000" flipH="1">
-            <a:off x="696497" y="3732619"/>
-            <a:ext cx="2321735" cy="2000248"/>
-          </a:xfrm>
-          <a:prstGeom prst="line">
-            <a:avLst/>
-          </a:prstGeom>
-          <a:ln/>
-        </p:spPr>
-        <p:style>
-          <a:lnRef idx="2">
-            <a:schemeClr val="accent1"/>
-          </a:lnRef>
-          <a:fillRef idx="1">
-            <a:schemeClr val="lt1"/>
-          </a:fillRef>
-          <a:effectRef idx="0">
-            <a:schemeClr val="accent1"/>
-          </a:effectRef>
-          <a:fontRef idx="minor">
-            <a:schemeClr val="dk1"/>
-          </a:fontRef>
-        </p:style>
-      </p:cxnSp>
-      <p:cxnSp>
-        <p:nvCxnSpPr>
-          <p:cNvPr id="99" name="Gerade Verbindung 98"/>
-          <p:cNvCxnSpPr>
-            <a:stCxn id="13" idx="2"/>
-            <a:endCxn id="92" idx="1"/>
-          </p:cNvCxnSpPr>
-          <p:nvPr/>
-        </p:nvCxnSpPr>
-        <p:spPr>
-          <a:xfrm rot="16200000" flipH="1">
-            <a:off x="553621" y="3875495"/>
-            <a:ext cx="2607487" cy="2000248"/>
-          </a:xfrm>
-          <a:prstGeom prst="line">
-            <a:avLst/>
-          </a:prstGeom>
-          <a:ln/>
-        </p:spPr>
-        <p:style>
-          <a:lnRef idx="2">
-            <a:schemeClr val="accent1"/>
-          </a:lnRef>
-          <a:fillRef idx="1">
-            <a:schemeClr val="lt1"/>
-          </a:fillRef>
-          <a:effectRef idx="0">
-            <a:schemeClr val="accent1"/>
-          </a:effectRef>
-          <a:fontRef idx="minor">
-            <a:schemeClr val="dk1"/>
-          </a:fontRef>
-        </p:style>
-      </p:cxnSp>
-      <p:sp>
-        <p:nvSpPr>
-          <p:cNvPr id="103" name="Abgerundetes Rechteck 102"/>
-          <p:cNvSpPr/>
-          <p:nvPr/>
-        </p:nvSpPr>
-        <p:spPr>
-          <a:xfrm>
-            <a:off x="2857488" y="5500702"/>
-            <a:ext cx="2000264" cy="214314"/>
-          </a:xfrm>
-          <a:prstGeom prst="roundRect">
-            <a:avLst/>
-          </a:prstGeom>
-        </p:spPr>
-        <p:style>
-          <a:lnRef idx="2">
-            <a:schemeClr val="accent1"/>
-          </a:lnRef>
-          <a:fillRef idx="1">
-            <a:schemeClr val="lt1"/>
-          </a:fillRef>
-          <a:effectRef idx="0">
-            <a:schemeClr val="accent1"/>
-          </a:effectRef>
-          <a:fontRef idx="minor">
-            <a:schemeClr val="dk1"/>
-          </a:fontRef>
-        </p:style>
-        <p:txBody>
-          <a:bodyPr rtlCol="0" anchor="ctr"/>
-          <a:lstStyle/>
-          <a:p>
-            <a:pPr algn="ctr"/>
-            <a:r>
-              <a:rPr lang="de-DE" sz="1200" dirty="0" err="1" smtClean="0"/>
-              <a:t>TemplateReaction</a:t>
-            </a:r>
-            <a:endParaRPr lang="de-DE" sz="1200" dirty="0"/>
-          </a:p>
-        </p:txBody>
-      </p:sp>
-      <p:cxnSp>
-        <p:nvCxnSpPr>
-          <p:cNvPr id="105" name="Gerade Verbindung 104"/>
-          <p:cNvCxnSpPr>
-            <a:stCxn id="13" idx="2"/>
-            <a:endCxn id="103" idx="1"/>
-          </p:cNvCxnSpPr>
-          <p:nvPr/>
-        </p:nvCxnSpPr>
-        <p:spPr>
-          <a:xfrm rot="16200000" flipH="1">
-            <a:off x="839373" y="3589743"/>
-            <a:ext cx="2035983" cy="2000248"/>
-          </a:xfrm>
-          <a:prstGeom prst="line">
-            <a:avLst/>
-          </a:prstGeom>
-          <a:ln/>
-        </p:spPr>
-        <p:style>
-          <a:lnRef idx="2">
-            <a:schemeClr val="accent1"/>
-          </a:lnRef>
-          <a:fillRef idx="1">
-            <a:schemeClr val="lt1"/>
-          </a:fillRef>
-          <a:effectRef idx="0">
-            <a:schemeClr val="accent1"/>
-          </a:effectRef>
-          <a:fontRef idx="minor">
-            <a:schemeClr val="dk1"/>
-          </a:fontRef>
-        </p:style>
-      </p:cxnSp>
-      <p:sp>
-        <p:nvSpPr>
-          <p:cNvPr id="168" name="Abgerundetes Rechteck 167"/>
-          <p:cNvSpPr/>
-          <p:nvPr/>
-        </p:nvSpPr>
-        <p:spPr>
-          <a:xfrm>
-            <a:off x="2857488" y="5072074"/>
-            <a:ext cx="2000264" cy="214314"/>
-          </a:xfrm>
-          <a:prstGeom prst="roundRect">
-            <a:avLst/>
-          </a:prstGeom>
-        </p:spPr>
-        <p:style>
-          <a:lnRef idx="2">
-            <a:schemeClr val="accent1"/>
-          </a:lnRef>
-          <a:fillRef idx="1">
-            <a:schemeClr val="lt1"/>
-          </a:fillRef>
-          <a:effectRef idx="0">
-            <a:schemeClr val="accent1"/>
-          </a:effectRef>
-          <a:fontRef idx="minor">
-            <a:schemeClr val="dk1"/>
-          </a:fontRef>
-        </p:style>
-        <p:txBody>
-          <a:bodyPr rtlCol="0" anchor="ctr"/>
-          <a:lstStyle/>
-          <a:p>
-            <a:pPr algn="ctr"/>
-            <a:r>
-              <a:rPr lang="de-DE" sz="1200" dirty="0" err="1" smtClean="0"/>
-              <a:t>TemplateReactionRegulation</a:t>
-            </a:r>
-            <a:endParaRPr lang="de-DE" sz="1200" dirty="0"/>
-          </a:p>
-        </p:txBody>
-      </p:sp>
-      <p:cxnSp>
-        <p:nvCxnSpPr>
-          <p:cNvPr id="169" name="Gerade Verbindung 168"/>
-          <p:cNvCxnSpPr>
-            <a:stCxn id="15" idx="3"/>
-            <a:endCxn id="168" idx="1"/>
-          </p:cNvCxnSpPr>
-          <p:nvPr/>
-        </p:nvCxnSpPr>
-        <p:spPr>
-          <a:xfrm>
-            <a:off x="2643174" y="4250537"/>
-            <a:ext cx="214314" cy="928694"/>
-          </a:xfrm>
-          <a:prstGeom prst="line">
-            <a:avLst/>
-          </a:prstGeom>
-          <a:ln/>
-        </p:spPr>
-        <p:style>
-          <a:lnRef idx="2">
-            <a:schemeClr val="accent1"/>
-          </a:lnRef>
-          <a:fillRef idx="1">
-            <a:schemeClr val="lt1"/>
-          </a:fillRef>
-          <a:effectRef idx="0">
-            <a:schemeClr val="accent1"/>
-          </a:effectRef>
-          <a:fontRef idx="minor">
-            <a:schemeClr val="dk1"/>
-          </a:fontRef>
-        </p:style>
-      </p:cxnSp>
-      <p:sp>
-        <p:nvSpPr>
-          <p:cNvPr id="180" name="Abgerundetes Rechteck 179"/>
-          <p:cNvSpPr/>
-          <p:nvPr/>
-        </p:nvSpPr>
-        <p:spPr>
-          <a:xfrm>
-            <a:off x="2857488" y="4071942"/>
-            <a:ext cx="2000264" cy="214314"/>
-          </a:xfrm>
-          <a:prstGeom prst="roundRect">
-            <a:avLst/>
-          </a:prstGeom>
-        </p:spPr>
-        <p:style>
-          <a:lnRef idx="2">
-            <a:schemeClr val="accent1"/>
-          </a:lnRef>
-          <a:fillRef idx="1">
-            <a:schemeClr val="lt1"/>
-          </a:fillRef>
-          <a:effectRef idx="0">
-            <a:schemeClr val="accent1"/>
-          </a:effectRef>
-          <a:fontRef idx="minor">
-            <a:schemeClr val="dk1"/>
-          </a:fontRef>
-        </p:style>
-        <p:txBody>
-          <a:bodyPr rtlCol="0" anchor="ctr"/>
-          <a:lstStyle/>
-          <a:p>
-            <a:pPr algn="ctr"/>
-            <a:r>
-              <a:rPr lang="de-DE" sz="1200" dirty="0" smtClean="0"/>
-              <a:t>Degradation</a:t>
-            </a:r>
-            <a:endParaRPr lang="de-DE" sz="1200" dirty="0"/>
-          </a:p>
-        </p:txBody>
-      </p:sp>
-      <p:cxnSp>
-        <p:nvCxnSpPr>
-          <p:cNvPr id="184" name="Gerade Verbindung 183"/>
-          <p:cNvCxnSpPr>
-            <a:endCxn id="180" idx="1"/>
-          </p:cNvCxnSpPr>
-          <p:nvPr/>
-        </p:nvCxnSpPr>
-        <p:spPr>
-          <a:xfrm>
-            <a:off x="2643174" y="3893347"/>
-            <a:ext cx="214314" cy="285752"/>
-          </a:xfrm>
-          <a:prstGeom prst="line">
-            <a:avLst/>
-          </a:prstGeom>
-          <a:ln/>
-        </p:spPr>
-        <p:style>
-          <a:lnRef idx="2">
-            <a:schemeClr val="accent1"/>
-          </a:lnRef>
-          <a:fillRef idx="1">
-            <a:schemeClr val="lt1"/>
-          </a:fillRef>
-          <a:effectRef idx="0">
-            <a:schemeClr val="accent1"/>
-          </a:effectRef>
-          <a:fontRef idx="minor">
-            <a:schemeClr val="dk1"/>
-          </a:fontRef>
-        </p:style>
-      </p:cxnSp>
-      <p:sp>
-        <p:nvSpPr>
-          <p:cNvPr id="245" name="Abgerundetes Rechteck 244"/>
-          <p:cNvSpPr/>
-          <p:nvPr/>
-        </p:nvSpPr>
-        <p:spPr>
-          <a:xfrm>
-            <a:off x="2857488" y="2000240"/>
-            <a:ext cx="1571636" cy="214314"/>
-          </a:xfrm>
-          <a:prstGeom prst="roundRect">
-            <a:avLst/>
-          </a:prstGeom>
-        </p:spPr>
-        <p:style>
-          <a:lnRef idx="2">
-            <a:schemeClr val="accent1"/>
-          </a:lnRef>
-          <a:fillRef idx="1">
-            <a:schemeClr val="lt1"/>
-          </a:fillRef>
-          <a:effectRef idx="0">
-            <a:schemeClr val="accent1"/>
-          </a:effectRef>
-          <a:fontRef idx="minor">
-            <a:schemeClr val="dk1"/>
-          </a:fontRef>
-        </p:style>
-        <p:txBody>
-          <a:bodyPr rtlCol="0" anchor="ctr"/>
-          <a:lstStyle/>
-          <a:p>
-            <a:pPr algn="ctr"/>
-            <a:r>
-              <a:rPr lang="de-DE" sz="1200" dirty="0" err="1" smtClean="0"/>
-              <a:t>RnaRegion</a:t>
-            </a:r>
-            <a:endParaRPr lang="de-DE" sz="1200" dirty="0"/>
-          </a:p>
-        </p:txBody>
-      </p:sp>
-      <p:sp>
-        <p:nvSpPr>
-          <p:cNvPr id="246" name="Abgerundetes Rechteck 245"/>
-          <p:cNvSpPr/>
-          <p:nvPr/>
-        </p:nvSpPr>
-        <p:spPr>
-          <a:xfrm>
-            <a:off x="2857488" y="2285992"/>
-            <a:ext cx="1571636" cy="214314"/>
-          </a:xfrm>
-          <a:prstGeom prst="roundRect">
-            <a:avLst/>
-          </a:prstGeom>
-        </p:spPr>
-        <p:style>
-          <a:lnRef idx="2">
-            <a:schemeClr val="accent1"/>
-          </a:lnRef>
-          <a:fillRef idx="1">
-            <a:schemeClr val="lt1"/>
-          </a:fillRef>
-          <a:effectRef idx="0">
-            <a:schemeClr val="accent1"/>
-          </a:effectRef>
-          <a:fontRef idx="minor">
-            <a:schemeClr val="dk1"/>
-          </a:fontRef>
-        </p:style>
-        <p:txBody>
-          <a:bodyPr rtlCol="0" anchor="ctr"/>
-          <a:lstStyle/>
-          <a:p>
-            <a:pPr algn="ctr"/>
-            <a:r>
-              <a:rPr lang="de-DE" sz="1200" dirty="0" err="1"/>
-              <a:t>S</a:t>
-            </a:r>
-            <a:r>
-              <a:rPr lang="de-DE" sz="1200" dirty="0" err="1" smtClean="0"/>
-              <a:t>mallMolecule</a:t>
-            </a:r>
-            <a:endParaRPr lang="de-DE" sz="1200" dirty="0"/>
-          </a:p>
-        </p:txBody>
-      </p:sp>
-      <p:cxnSp>
-        <p:nvCxnSpPr>
-          <p:cNvPr id="250" name="Gerade Verbindung 249"/>
-          <p:cNvCxnSpPr>
-            <a:stCxn id="245" idx="1"/>
-            <a:endCxn id="5" idx="3"/>
-          </p:cNvCxnSpPr>
-          <p:nvPr/>
-        </p:nvCxnSpPr>
-        <p:spPr>
-          <a:xfrm rot="10800000">
-            <a:off x="2500298" y="1678769"/>
-            <a:ext cx="357190" cy="428628"/>
-          </a:xfrm>
-          <a:prstGeom prst="line">
-            <a:avLst/>
-          </a:prstGeom>
-          <a:ln/>
-        </p:spPr>
-        <p:style>
-          <a:lnRef idx="2">
-            <a:schemeClr val="accent1"/>
-          </a:lnRef>
-          <a:fillRef idx="1">
-            <a:schemeClr val="lt1"/>
-          </a:fillRef>
-          <a:effectRef idx="0">
-            <a:schemeClr val="accent1"/>
-          </a:effectRef>
-          <a:fontRef idx="minor">
-            <a:schemeClr val="dk1"/>
-          </a:fontRef>
-        </p:style>
-      </p:cxnSp>
-      <p:cxnSp>
-        <p:nvCxnSpPr>
-          <p:cNvPr id="251" name="Gerade Verbindung 250"/>
-          <p:cNvCxnSpPr>
-            <a:stCxn id="246" idx="1"/>
-            <a:endCxn id="5" idx="3"/>
-          </p:cNvCxnSpPr>
-          <p:nvPr/>
-        </p:nvCxnSpPr>
-        <p:spPr>
-          <a:xfrm rot="10800000">
-            <a:off x="2500298" y="1678769"/>
-            <a:ext cx="357190" cy="714380"/>
-          </a:xfrm>
-          <a:prstGeom prst="line">
-            <a:avLst/>
-          </a:prstGeom>
-          <a:ln/>
-        </p:spPr>
-        <p:style>
-          <a:lnRef idx="2">
-            <a:schemeClr val="accent1"/>
-          </a:lnRef>
-          <a:fillRef idx="1">
-            <a:schemeClr val="lt1"/>
-          </a:fillRef>
-          <a:effectRef idx="0">
-            <a:schemeClr val="accent1"/>
-          </a:effectRef>
-          <a:fontRef idx="minor">
-            <a:schemeClr val="dk1"/>
-          </a:fontRef>
-        </p:style>
-      </p:cxnSp>
-      <p:cxnSp>
-        <p:nvCxnSpPr>
-          <p:cNvPr id="256" name="Gerade Verbindung 255"/>
-          <p:cNvCxnSpPr>
-            <a:stCxn id="245" idx="3"/>
-            <a:endCxn id="39" idx="1"/>
-          </p:cNvCxnSpPr>
-          <p:nvPr/>
-        </p:nvCxnSpPr>
-        <p:spPr>
-          <a:xfrm flipV="1">
-            <a:off x="4429124" y="1464455"/>
-            <a:ext cx="857256" cy="642942"/>
+            <a:endParaRPr lang="de-DE" b="1" dirty="0">
+              <a:solidFill>
+                <a:schemeClr val="accent3"/>
+              </a:solidFill>
+            </a:endParaRPr>
+          </a:p>
+        </p:txBody>
+      </p:sp>
+      <p:sp>
+        <p:nvSpPr>
+          <p:cNvPr id="108" name="Textfeld 107"/>
+          <p:cNvSpPr txBox="1"/>
+          <p:nvPr/>
+        </p:nvSpPr>
+        <p:spPr>
+          <a:xfrm>
+            <a:off x="142844" y="5988626"/>
+            <a:ext cx="1571636" cy="369332"/>
+          </a:xfrm>
+          <a:prstGeom prst="rect">
+            <a:avLst/>
+          </a:prstGeom>
+          <a:noFill/>
+        </p:spPr>
+        <p:txBody>
+          <a:bodyPr wrap="square" rtlCol="0">
+            <a:spAutoFit/>
+          </a:bodyPr>
+          <a:lstStyle/>
+          <a:p>
+            <a:r>
+              <a:rPr lang="de-DE" b="1" dirty="0" err="1" smtClean="0">
+                <a:solidFill>
+                  <a:schemeClr val="accent1"/>
+                </a:solidFill>
+              </a:rPr>
+              <a:t>Biopax</a:t>
+            </a:r>
+            <a:r>
+              <a:rPr lang="de-DE" b="1" dirty="0" smtClean="0">
+                <a:solidFill>
+                  <a:schemeClr val="accent1"/>
+                </a:solidFill>
+              </a:rPr>
+              <a:t> Level 3</a:t>
+            </a:r>
+            <a:endParaRPr lang="de-DE" b="1" dirty="0">
+              <a:solidFill>
+                <a:schemeClr val="accent1"/>
+              </a:solidFill>
+            </a:endParaRPr>
+          </a:p>
+        </p:txBody>
+      </p:sp>
+      <p:cxnSp>
+        <p:nvCxnSpPr>
+          <p:cNvPr id="109" name="Gerade Verbindung 108"/>
+          <p:cNvCxnSpPr/>
+          <p:nvPr/>
+        </p:nvCxnSpPr>
+        <p:spPr>
+          <a:xfrm>
+            <a:off x="214282" y="285728"/>
+            <a:ext cx="357190" cy="0"/>
           </a:xfrm>
           <a:prstGeom prst="line">
             <a:avLst/>
@@ -16309,22 +17397,21 @@
       </p:cxnSp>
       <p:cxnSp>
         <p:nvCxnSpPr>
-          <p:cNvPr id="259" name="Gerade Verbindung 258"/>
-          <p:cNvCxnSpPr>
-            <a:stCxn id="246" idx="3"/>
-            <a:endCxn id="39" idx="1"/>
-          </p:cNvCxnSpPr>
-          <p:nvPr/>
-        </p:nvCxnSpPr>
-        <p:spPr>
-          <a:xfrm flipV="1">
-            <a:off x="4429124" y="1464455"/>
-            <a:ext cx="857256" cy="928694"/>
-          </a:xfrm>
-          <a:prstGeom prst="line">
-            <a:avLst/>
-          </a:prstGeom>
-          <a:ln w="12700"/>
+          <p:cNvPr id="115" name="Gerade Verbindung 114"/>
+          <p:cNvCxnSpPr/>
+          <p:nvPr/>
+        </p:nvCxnSpPr>
+        <p:spPr>
+          <a:xfrm>
+            <a:off x="214282" y="571480"/>
+            <a:ext cx="357190" cy="0"/>
+          </a:xfrm>
+          <a:prstGeom prst="line">
+            <a:avLst/>
+          </a:prstGeom>
+          <a:ln w="12700">
+            <a:prstDash val="dash"/>
+          </a:ln>
         </p:spPr>
         <p:style>
           <a:lnRef idx="1">
@@ -16341,346 +17428,96 @@
           </a:fontRef>
         </p:style>
       </p:cxnSp>
-      <p:cxnSp>
-        <p:nvCxnSpPr>
-          <p:cNvPr id="262" name="Gerade Verbindung 261"/>
-          <p:cNvCxnSpPr>
-            <a:stCxn id="93" idx="3"/>
-            <a:endCxn id="51" idx="1"/>
-          </p:cNvCxnSpPr>
-          <p:nvPr/>
-        </p:nvCxnSpPr>
-        <p:spPr>
-          <a:xfrm flipV="1">
-            <a:off x="4857752" y="4893479"/>
-            <a:ext cx="1000132" cy="1000132"/>
-          </a:xfrm>
-          <a:prstGeom prst="line">
-            <a:avLst/>
-          </a:prstGeom>
-          <a:ln w="12700"/>
-        </p:spPr>
-        <p:style>
-          <a:lnRef idx="1">
-            <a:schemeClr val="dk1"/>
-          </a:lnRef>
-          <a:fillRef idx="0">
-            <a:schemeClr val="dk1"/>
-          </a:fillRef>
-          <a:effectRef idx="0">
-            <a:schemeClr val="dk1"/>
-          </a:effectRef>
-          <a:fontRef idx="minor">
-            <a:schemeClr val="tx1"/>
-          </a:fontRef>
-        </p:style>
-      </p:cxnSp>
-      <p:cxnSp>
-        <p:nvCxnSpPr>
-          <p:cNvPr id="263" name="Gerade Verbindung 262"/>
-          <p:cNvCxnSpPr>
-            <a:stCxn id="92" idx="3"/>
-            <a:endCxn id="51" idx="1"/>
-          </p:cNvCxnSpPr>
-          <p:nvPr/>
-        </p:nvCxnSpPr>
-        <p:spPr>
-          <a:xfrm flipV="1">
-            <a:off x="4857752" y="4893479"/>
-            <a:ext cx="1000132" cy="1285884"/>
-          </a:xfrm>
-          <a:prstGeom prst="line">
-            <a:avLst/>
-          </a:prstGeom>
-          <a:ln w="12700"/>
-        </p:spPr>
-        <p:style>
-          <a:lnRef idx="1">
-            <a:schemeClr val="dk1"/>
-          </a:lnRef>
-          <a:fillRef idx="0">
-            <a:schemeClr val="dk1"/>
-          </a:fillRef>
-          <a:effectRef idx="0">
-            <a:schemeClr val="dk1"/>
-          </a:effectRef>
-          <a:fontRef idx="minor">
-            <a:schemeClr val="tx1"/>
-          </a:fontRef>
-        </p:style>
-      </p:cxnSp>
-      <p:cxnSp>
-        <p:nvCxnSpPr>
-          <p:cNvPr id="264" name="Gerade Verbindung 263"/>
-          <p:cNvCxnSpPr>
-            <a:stCxn id="168" idx="3"/>
-            <a:endCxn id="51" idx="1"/>
-          </p:cNvCxnSpPr>
-          <p:nvPr/>
-        </p:nvCxnSpPr>
-        <p:spPr>
-          <a:xfrm flipV="1">
-            <a:off x="4857752" y="4893479"/>
-            <a:ext cx="1000132" cy="285752"/>
-          </a:xfrm>
-          <a:prstGeom prst="line">
-            <a:avLst/>
-          </a:prstGeom>
-          <a:ln w="12700"/>
-        </p:spPr>
-        <p:style>
-          <a:lnRef idx="1">
-            <a:schemeClr val="dk1"/>
-          </a:lnRef>
-          <a:fillRef idx="0">
-            <a:schemeClr val="dk1"/>
-          </a:fillRef>
-          <a:effectRef idx="0">
-            <a:schemeClr val="dk1"/>
-          </a:effectRef>
-          <a:fontRef idx="minor">
-            <a:schemeClr val="tx1"/>
-          </a:fontRef>
-        </p:style>
-      </p:cxnSp>
-      <p:cxnSp>
-        <p:nvCxnSpPr>
-          <p:cNvPr id="265" name="Gerade Verbindung 264"/>
-          <p:cNvCxnSpPr>
-            <a:stCxn id="180" idx="3"/>
-            <a:endCxn id="51" idx="1"/>
-          </p:cNvCxnSpPr>
-          <p:nvPr/>
-        </p:nvCxnSpPr>
-        <p:spPr>
-          <a:xfrm>
-            <a:off x="4857752" y="4179099"/>
-            <a:ext cx="1000132" cy="714380"/>
-          </a:xfrm>
-          <a:prstGeom prst="line">
-            <a:avLst/>
-          </a:prstGeom>
-          <a:ln w="12700"/>
-        </p:spPr>
-        <p:style>
-          <a:lnRef idx="1">
-            <a:schemeClr val="dk1"/>
-          </a:lnRef>
-          <a:fillRef idx="0">
-            <a:schemeClr val="dk1"/>
-          </a:fillRef>
-          <a:effectRef idx="0">
-            <a:schemeClr val="dk1"/>
-          </a:effectRef>
-          <a:fontRef idx="minor">
-            <a:schemeClr val="tx1"/>
-          </a:fontRef>
-        </p:style>
-      </p:cxnSp>
-      <p:cxnSp>
-        <p:nvCxnSpPr>
-          <p:cNvPr id="266" name="Gerade Verbindung 265"/>
-          <p:cNvCxnSpPr>
-            <a:stCxn id="103" idx="3"/>
-            <a:endCxn id="51" idx="1"/>
-          </p:cNvCxnSpPr>
-          <p:nvPr/>
-        </p:nvCxnSpPr>
-        <p:spPr>
-          <a:xfrm flipV="1">
-            <a:off x="4857752" y="4893479"/>
-            <a:ext cx="1000132" cy="714380"/>
-          </a:xfrm>
-          <a:prstGeom prst="line">
-            <a:avLst/>
-          </a:prstGeom>
-          <a:ln w="12700"/>
-        </p:spPr>
-        <p:style>
-          <a:lnRef idx="1">
-            <a:schemeClr val="dk1"/>
-          </a:lnRef>
-          <a:fillRef idx="0">
-            <a:schemeClr val="dk1"/>
-          </a:fillRef>
-          <a:effectRef idx="0">
-            <a:schemeClr val="dk1"/>
-          </a:effectRef>
-          <a:fontRef idx="minor">
-            <a:schemeClr val="tx1"/>
-          </a:fontRef>
-        </p:style>
-      </p:cxnSp>
-      <p:cxnSp>
-        <p:nvCxnSpPr>
-          <p:cNvPr id="267" name="Gerade Verbindung 266"/>
-          <p:cNvCxnSpPr>
-            <a:stCxn id="103" idx="3"/>
-            <a:endCxn id="40" idx="1"/>
-          </p:cNvCxnSpPr>
-          <p:nvPr/>
-        </p:nvCxnSpPr>
-        <p:spPr>
-          <a:xfrm flipV="1">
-            <a:off x="4857752" y="3821909"/>
-            <a:ext cx="1000132" cy="1785950"/>
-          </a:xfrm>
-          <a:prstGeom prst="line">
-            <a:avLst/>
-          </a:prstGeom>
-          <a:ln w="12700"/>
-        </p:spPr>
-        <p:style>
-          <a:lnRef idx="1">
-            <a:schemeClr val="dk1"/>
-          </a:lnRef>
-          <a:fillRef idx="0">
-            <a:schemeClr val="dk1"/>
-          </a:fillRef>
-          <a:effectRef idx="0">
-            <a:schemeClr val="dk1"/>
-          </a:effectRef>
-          <a:fontRef idx="minor">
-            <a:schemeClr val="tx1"/>
-          </a:fontRef>
-        </p:style>
-      </p:cxnSp>
-      <p:cxnSp>
-        <p:nvCxnSpPr>
-          <p:cNvPr id="268" name="Gerade Verbindung 267"/>
-          <p:cNvCxnSpPr>
-            <a:stCxn id="31" idx="3"/>
-            <a:endCxn id="51" idx="1"/>
-          </p:cNvCxnSpPr>
-          <p:nvPr/>
-        </p:nvCxnSpPr>
-        <p:spPr>
-          <a:xfrm>
-            <a:off x="4857752" y="4607727"/>
-            <a:ext cx="1000132" cy="285752"/>
-          </a:xfrm>
-          <a:prstGeom prst="line">
-            <a:avLst/>
-          </a:prstGeom>
-          <a:ln w="12700"/>
-        </p:spPr>
-        <p:style>
-          <a:lnRef idx="1">
-            <a:schemeClr val="dk1"/>
-          </a:lnRef>
-          <a:fillRef idx="0">
-            <a:schemeClr val="dk1"/>
-          </a:fillRef>
-          <a:effectRef idx="0">
-            <a:schemeClr val="dk1"/>
-          </a:effectRef>
-          <a:fontRef idx="minor">
-            <a:schemeClr val="tx1"/>
-          </a:fontRef>
-        </p:style>
-      </p:cxnSp>
-      <p:cxnSp>
-        <p:nvCxnSpPr>
-          <p:cNvPr id="285" name="Gerade Verbindung 284"/>
-          <p:cNvCxnSpPr>
-            <a:stCxn id="32" idx="3"/>
-            <a:endCxn id="40" idx="1"/>
-          </p:cNvCxnSpPr>
-          <p:nvPr/>
-        </p:nvCxnSpPr>
-        <p:spPr>
-          <a:xfrm flipV="1">
-            <a:off x="4857752" y="3821909"/>
-            <a:ext cx="1000132" cy="1071570"/>
-          </a:xfrm>
-          <a:prstGeom prst="line">
-            <a:avLst/>
-          </a:prstGeom>
-          <a:ln w="12700"/>
-        </p:spPr>
-        <p:style>
-          <a:lnRef idx="1">
-            <a:schemeClr val="dk1"/>
-          </a:lnRef>
-          <a:fillRef idx="0">
-            <a:schemeClr val="dk1"/>
-          </a:fillRef>
-          <a:effectRef idx="0">
-            <a:schemeClr val="dk1"/>
-          </a:effectRef>
-          <a:fontRef idx="minor">
-            <a:schemeClr val="tx1"/>
-          </a:fontRef>
-        </p:style>
-      </p:cxnSp>
-      <p:cxnSp>
-        <p:nvCxnSpPr>
-          <p:cNvPr id="286" name="Gerade Verbindung 285"/>
-          <p:cNvCxnSpPr>
-            <a:stCxn id="31" idx="3"/>
-            <a:endCxn id="40" idx="1"/>
-          </p:cNvCxnSpPr>
-          <p:nvPr/>
-        </p:nvCxnSpPr>
-        <p:spPr>
-          <a:xfrm flipV="1">
-            <a:off x="4857752" y="3821909"/>
-            <a:ext cx="1000132" cy="785818"/>
-          </a:xfrm>
-          <a:prstGeom prst="line">
-            <a:avLst/>
-          </a:prstGeom>
-          <a:ln w="12700"/>
-        </p:spPr>
-        <p:style>
-          <a:lnRef idx="1">
-            <a:schemeClr val="dk1"/>
-          </a:lnRef>
-          <a:fillRef idx="0">
-            <a:schemeClr val="dk1"/>
-          </a:fillRef>
-          <a:effectRef idx="0">
-            <a:schemeClr val="dk1"/>
-          </a:effectRef>
-          <a:fontRef idx="minor">
-            <a:schemeClr val="tx1"/>
-          </a:fontRef>
-        </p:style>
-      </p:cxnSp>
-      <p:cxnSp>
-        <p:nvCxnSpPr>
-          <p:cNvPr id="291" name="Gerade Verbindung 290"/>
-          <p:cNvCxnSpPr>
-            <a:stCxn id="32" idx="3"/>
-            <a:endCxn id="51" idx="1"/>
-          </p:cNvCxnSpPr>
-          <p:nvPr/>
-        </p:nvCxnSpPr>
-        <p:spPr>
-          <a:xfrm>
-            <a:off x="4857752" y="4893479"/>
-            <a:ext cx="1000132" cy="0"/>
-          </a:xfrm>
-          <a:prstGeom prst="line">
-            <a:avLst/>
-          </a:prstGeom>
-          <a:ln w="12700"/>
-        </p:spPr>
-        <p:style>
-          <a:lnRef idx="1">
-            <a:schemeClr val="dk1"/>
-          </a:lnRef>
-          <a:fillRef idx="0">
-            <a:schemeClr val="dk1"/>
-          </a:fillRef>
-          <a:effectRef idx="0">
-            <a:schemeClr val="dk1"/>
-          </a:effectRef>
-          <a:fontRef idx="minor">
-            <a:schemeClr val="tx1"/>
-          </a:fontRef>
-        </p:style>
-      </p:cxnSp>
+      <p:sp>
+        <p:nvSpPr>
+          <p:cNvPr id="116" name="Textfeld 115"/>
+          <p:cNvSpPr txBox="1"/>
+          <p:nvPr/>
+        </p:nvSpPr>
+        <p:spPr>
+          <a:xfrm>
+            <a:off x="642910" y="182383"/>
+            <a:ext cx="982961" cy="246221"/>
+          </a:xfrm>
+          <a:prstGeom prst="rect">
+            <a:avLst/>
+          </a:prstGeom>
+          <a:noFill/>
+        </p:spPr>
+        <p:txBody>
+          <a:bodyPr wrap="none" rtlCol="0">
+            <a:spAutoFit/>
+          </a:bodyPr>
+          <a:lstStyle/>
+          <a:p>
+            <a:r>
+              <a:rPr lang="de-DE" sz="1000" dirty="0" err="1" smtClean="0"/>
+              <a:t>Direct</a:t>
+            </a:r>
+            <a:r>
+              <a:rPr lang="de-DE" sz="1000" dirty="0" smtClean="0"/>
+              <a:t> </a:t>
+            </a:r>
+            <a:r>
+              <a:rPr lang="de-DE" sz="1000" dirty="0" err="1" smtClean="0"/>
+              <a:t>mapping</a:t>
+            </a:r>
+            <a:endParaRPr lang="de-DE" sz="1000" dirty="0"/>
+          </a:p>
+        </p:txBody>
+      </p:sp>
+      <p:sp>
+        <p:nvSpPr>
+          <p:cNvPr id="118" name="Textfeld 117"/>
+          <p:cNvSpPr txBox="1"/>
+          <p:nvPr/>
+        </p:nvSpPr>
+        <p:spPr>
+          <a:xfrm>
+            <a:off x="642910" y="381308"/>
+            <a:ext cx="1314784" cy="400110"/>
+          </a:xfrm>
+          <a:prstGeom prst="rect">
+            <a:avLst/>
+          </a:prstGeom>
+          <a:noFill/>
+        </p:spPr>
+        <p:txBody>
+          <a:bodyPr wrap="none" rtlCol="0">
+            <a:spAutoFit/>
+          </a:bodyPr>
+          <a:lstStyle/>
+          <a:p>
+            <a:r>
+              <a:rPr lang="de-DE" sz="1000" dirty="0" smtClean="0"/>
+              <a:t>Mapping </a:t>
+            </a:r>
+            <a:r>
+              <a:rPr lang="de-DE" sz="1000" dirty="0" err="1" smtClean="0"/>
+              <a:t>depends</a:t>
+            </a:r>
+            <a:r>
+              <a:rPr lang="de-DE" sz="1000" dirty="0" smtClean="0"/>
+              <a:t> on </a:t>
+            </a:r>
+          </a:p>
+          <a:p>
+            <a:r>
+              <a:rPr lang="de-DE" sz="1000" dirty="0" err="1" smtClean="0"/>
+              <a:t>enclosed</a:t>
+            </a:r>
+            <a:r>
+              <a:rPr lang="de-DE" sz="1000" dirty="0" smtClean="0"/>
+              <a:t> </a:t>
+            </a:r>
+            <a:r>
+              <a:rPr lang="de-DE" sz="1000" dirty="0" err="1" smtClean="0"/>
+              <a:t>elements</a:t>
+            </a:r>
+            <a:endParaRPr lang="de-DE" sz="1000" dirty="0"/>
+          </a:p>
+        </p:txBody>
+      </p:sp>
     </p:spTree>
   </p:cSld>
   <p:clrMapOvr>

</xml_diff>

<commit_message>
Added some citations, changed the image. Currently, I am working on the chapter 2.4
</commit_message>
<xml_diff>
--- a/doc/ECCB2012_paper/Conversion.pptx
+++ b/doc/ECCB2012_paper/Conversion.pptx
@@ -18108,6 +18108,9 @@
           <a:solidFill>
             <a:srgbClr val="F7FAFF"/>
           </a:solidFill>
+          <a:ln>
+            <a:prstDash val="sysDash"/>
+          </a:ln>
         </p:spPr>
         <p:style>
           <a:lnRef idx="2">
@@ -21087,6 +21090,9 @@
           <a:solidFill>
             <a:srgbClr val="F7FAFF"/>
           </a:solidFill>
+          <a:ln>
+            <a:prstDash val="sysDash"/>
+          </a:ln>
         </p:spPr>
         <p:style>
           <a:lnRef idx="2">

</xml_diff>

<commit_message>
Paper nearly finished. Some TODO's needs to be removed and the Result and Discussion parts needs enhancement!!!!
</commit_message>
<xml_diff>
--- a/doc/ECCB2012_paper/Conversion.pptx
+++ b/doc/ECCB2012_paper/Conversion.pptx
@@ -22245,7 +22245,7 @@
         </p:nvSpPr>
         <p:spPr>
           <a:xfrm>
-            <a:off x="142844" y="1715750"/>
+            <a:off x="142844" y="1896439"/>
             <a:ext cx="785818" cy="214314"/>
           </a:xfrm>
           <a:prstGeom prst="roundRect">
@@ -22294,7 +22294,7 @@
         </p:nvSpPr>
         <p:spPr>
           <a:xfrm>
-            <a:off x="1357290" y="1715750"/>
+            <a:off x="1357290" y="1930064"/>
             <a:ext cx="1143008" cy="214314"/>
           </a:xfrm>
           <a:prstGeom prst="roundRect">
@@ -22339,7 +22339,7 @@
         </p:nvSpPr>
         <p:spPr>
           <a:xfrm>
-            <a:off x="2857488" y="214290"/>
+            <a:off x="2857488" y="142852"/>
             <a:ext cx="1571636" cy="214314"/>
           </a:xfrm>
           <a:prstGeom prst="roundRect">
@@ -22384,7 +22384,7 @@
         </p:nvSpPr>
         <p:spPr>
           <a:xfrm>
-            <a:off x="214282" y="2357430"/>
+            <a:off x="214282" y="2501568"/>
             <a:ext cx="1000132" cy="214314"/>
           </a:xfrm>
           <a:prstGeom prst="roundRect">
@@ -22433,7 +22433,7 @@
         </p:nvSpPr>
         <p:spPr>
           <a:xfrm>
-            <a:off x="2857488" y="571480"/>
+            <a:off x="2857488" y="785794"/>
             <a:ext cx="1571636" cy="214314"/>
           </a:xfrm>
           <a:prstGeom prst="roundRect">
@@ -22478,7 +22478,7 @@
         </p:nvSpPr>
         <p:spPr>
           <a:xfrm>
-            <a:off x="2857488" y="857232"/>
+            <a:off x="2857488" y="1071546"/>
             <a:ext cx="1571636" cy="214314"/>
           </a:xfrm>
           <a:prstGeom prst="roundRect">
@@ -22523,7 +22523,7 @@
         </p:nvSpPr>
         <p:spPr>
           <a:xfrm>
-            <a:off x="2857488" y="1142984"/>
+            <a:off x="2857488" y="1357298"/>
             <a:ext cx="1571636" cy="214314"/>
           </a:xfrm>
           <a:prstGeom prst="roundRect">
@@ -22572,7 +22572,7 @@
         </p:nvSpPr>
         <p:spPr>
           <a:xfrm>
-            <a:off x="2857488" y="1428736"/>
+            <a:off x="2857488" y="1643050"/>
             <a:ext cx="1571636" cy="214314"/>
           </a:xfrm>
           <a:prstGeom prst="roundRect">
@@ -22620,7 +22620,7 @@
         </p:nvSpPr>
         <p:spPr>
           <a:xfrm>
-            <a:off x="2857488" y="1714488"/>
+            <a:off x="2857488" y="1928802"/>
             <a:ext cx="1571636" cy="214314"/>
           </a:xfrm>
           <a:prstGeom prst="roundRect">
@@ -22710,7 +22710,7 @@
         </p:nvSpPr>
         <p:spPr>
           <a:xfrm>
-            <a:off x="1511740" y="3857628"/>
+            <a:off x="1511740" y="3929066"/>
             <a:ext cx="928694" cy="214314"/>
           </a:xfrm>
           <a:prstGeom prst="roundRect">
@@ -22800,7 +22800,7 @@
         </p:nvSpPr>
         <p:spPr>
           <a:xfrm>
-            <a:off x="2857488" y="2960194"/>
+            <a:off x="2857488" y="3103070"/>
             <a:ext cx="2000264" cy="214314"/>
           </a:xfrm>
           <a:prstGeom prst="roundRect">
@@ -22845,7 +22845,7 @@
         </p:nvSpPr>
         <p:spPr>
           <a:xfrm>
-            <a:off x="2857488" y="2674442"/>
+            <a:off x="2857488" y="2817318"/>
             <a:ext cx="2000264" cy="214314"/>
           </a:xfrm>
           <a:prstGeom prst="roundRect">
@@ -22890,7 +22890,7 @@
         </p:nvSpPr>
         <p:spPr>
           <a:xfrm>
-            <a:off x="2857488" y="3981600"/>
+            <a:off x="2857488" y="4124476"/>
             <a:ext cx="2000264" cy="214314"/>
           </a:xfrm>
           <a:prstGeom prst="roundRect">
@@ -22935,7 +22935,7 @@
         </p:nvSpPr>
         <p:spPr>
           <a:xfrm>
-            <a:off x="2857488" y="3388822"/>
+            <a:off x="2857488" y="3531698"/>
             <a:ext cx="2000264" cy="357190"/>
           </a:xfrm>
           <a:prstGeom prst="roundRect">
@@ -22992,7 +22992,7 @@
         </p:nvSpPr>
         <p:spPr>
           <a:xfrm>
-            <a:off x="2857488" y="4786322"/>
+            <a:off x="2857488" y="4857760"/>
             <a:ext cx="2000264" cy="214314"/>
           </a:xfrm>
           <a:prstGeom prst="roundRect">
@@ -23041,7 +23041,7 @@
         </p:nvSpPr>
         <p:spPr>
           <a:xfrm>
-            <a:off x="2857488" y="5072074"/>
+            <a:off x="2857488" y="5143512"/>
             <a:ext cx="2000264" cy="214314"/>
           </a:xfrm>
           <a:prstGeom prst="roundRect">
@@ -23588,8 +23588,8 @@
         </p:nvCxnSpPr>
         <p:spPr>
           <a:xfrm flipV="1">
-            <a:off x="1036662" y="321447"/>
-            <a:ext cx="1820826" cy="1500291"/>
+            <a:off x="1036662" y="250009"/>
+            <a:ext cx="1820826" cy="1767669"/>
           </a:xfrm>
           <a:prstGeom prst="line">
             <a:avLst/>
@@ -23624,8 +23624,8 @@
         </p:nvCxnSpPr>
         <p:spPr>
           <a:xfrm rot="16200000" flipH="1">
-            <a:off x="463999" y="2107081"/>
-            <a:ext cx="306852" cy="193846"/>
+            <a:off x="482275" y="2269494"/>
+            <a:ext cx="270301" cy="193846"/>
           </a:xfrm>
           <a:prstGeom prst="line">
             <a:avLst/>
@@ -23660,8 +23660,8 @@
         </p:nvCxnSpPr>
         <p:spPr>
           <a:xfrm rot="16200000" flipH="1">
-            <a:off x="1023430" y="3476475"/>
-            <a:ext cx="278976" cy="697643"/>
+            <a:off x="994307" y="3518790"/>
+            <a:ext cx="345596" cy="689269"/>
           </a:xfrm>
           <a:prstGeom prst="line">
             <a:avLst/>
@@ -23696,7 +23696,7 @@
         </p:nvCxnSpPr>
         <p:spPr>
           <a:xfrm rot="10800000" flipV="1">
-            <a:off x="2608298" y="678636"/>
+            <a:off x="2608298" y="892950"/>
             <a:ext cx="249190" cy="1143101"/>
           </a:xfrm>
           <a:prstGeom prst="line">
@@ -23732,7 +23732,7 @@
         </p:nvCxnSpPr>
         <p:spPr>
           <a:xfrm rot="10800000" flipV="1">
-            <a:off x="2608298" y="964388"/>
+            <a:off x="2608298" y="1178702"/>
             <a:ext cx="249190" cy="857349"/>
           </a:xfrm>
           <a:prstGeom prst="line">
@@ -23768,7 +23768,7 @@
         </p:nvCxnSpPr>
         <p:spPr>
           <a:xfrm rot="10800000" flipV="1">
-            <a:off x="2608298" y="1250140"/>
+            <a:off x="2608298" y="1464454"/>
             <a:ext cx="249190" cy="571597"/>
           </a:xfrm>
           <a:prstGeom prst="line">
@@ -23804,7 +23804,7 @@
         </p:nvCxnSpPr>
         <p:spPr>
           <a:xfrm rot="10800000" flipV="1">
-            <a:off x="2608298" y="1535892"/>
+            <a:off x="2608298" y="1750206"/>
             <a:ext cx="249190" cy="285845"/>
           </a:xfrm>
           <a:prstGeom prst="line">
@@ -23840,7 +23840,7 @@
         </p:nvCxnSpPr>
         <p:spPr>
           <a:xfrm rot="10800000" flipV="1">
-            <a:off x="2608298" y="1821644"/>
+            <a:off x="2608298" y="2035958"/>
             <a:ext cx="249190" cy="93"/>
           </a:xfrm>
           <a:prstGeom prst="line">
@@ -23876,7 +23876,7 @@
         </p:nvCxnSpPr>
         <p:spPr>
           <a:xfrm flipV="1">
-            <a:off x="2571736" y="3067351"/>
+            <a:off x="2571736" y="3210227"/>
             <a:ext cx="285752" cy="879153"/>
           </a:xfrm>
           <a:prstGeom prst="line">
@@ -23912,7 +23912,7 @@
         </p:nvCxnSpPr>
         <p:spPr>
           <a:xfrm flipV="1">
-            <a:off x="2571736" y="2781599"/>
+            <a:off x="2571736" y="2924475"/>
             <a:ext cx="285752" cy="1164905"/>
           </a:xfrm>
           <a:prstGeom prst="line">
@@ -23948,8 +23948,8 @@
         </p:nvCxnSpPr>
         <p:spPr>
           <a:xfrm rot="16200000" flipH="1">
-            <a:off x="2516063" y="4552054"/>
-            <a:ext cx="211094" cy="471755"/>
+            <a:off x="2480344" y="4587773"/>
+            <a:ext cx="282532" cy="471755"/>
           </a:xfrm>
           <a:prstGeom prst="line">
             <a:avLst/>
@@ -23984,8 +23984,8 @@
         </p:nvCxnSpPr>
         <p:spPr>
           <a:xfrm rot="16200000" flipH="1">
-            <a:off x="2373187" y="4694930"/>
-            <a:ext cx="496846" cy="471755"/>
+            <a:off x="2337468" y="4730649"/>
+            <a:ext cx="568284" cy="471755"/>
           </a:xfrm>
           <a:prstGeom prst="line">
             <a:avLst/>
@@ -24020,7 +24020,7 @@
         </p:nvCxnSpPr>
         <p:spPr>
           <a:xfrm rot="5400000">
-            <a:off x="3803454" y="3798158"/>
+            <a:off x="3803454" y="3941034"/>
             <a:ext cx="106313" cy="2020"/>
           </a:xfrm>
           <a:prstGeom prst="line">
@@ -24054,7 +24054,7 @@
         </p:nvCxnSpPr>
         <p:spPr>
           <a:xfrm rot="16200000" flipH="1">
-            <a:off x="3803453" y="3334655"/>
+            <a:off x="3803453" y="3477531"/>
             <a:ext cx="106314" cy="2020"/>
           </a:xfrm>
           <a:prstGeom prst="line">
@@ -24448,8 +24448,8 @@
         </p:nvCxnSpPr>
         <p:spPr>
           <a:xfrm>
-            <a:off x="4429124" y="321447"/>
-            <a:ext cx="814390" cy="0"/>
+            <a:off x="4429124" y="250009"/>
+            <a:ext cx="814390" cy="71438"/>
           </a:xfrm>
           <a:prstGeom prst="line">
             <a:avLst/>
@@ -24482,8 +24482,8 @@
         </p:nvCxnSpPr>
         <p:spPr>
           <a:xfrm>
-            <a:off x="4429124" y="321447"/>
-            <a:ext cx="814390" cy="285752"/>
+            <a:off x="4429124" y="250009"/>
+            <a:ext cx="814390" cy="357190"/>
           </a:xfrm>
           <a:prstGeom prst="line">
             <a:avLst/>
@@ -24516,8 +24516,8 @@
         </p:nvCxnSpPr>
         <p:spPr>
           <a:xfrm>
-            <a:off x="4429124" y="678637"/>
-            <a:ext cx="857256" cy="785818"/>
+            <a:off x="4429124" y="892951"/>
+            <a:ext cx="857256" cy="571504"/>
           </a:xfrm>
           <a:prstGeom prst="line">
             <a:avLst/>
@@ -24550,8 +24550,8 @@
         </p:nvCxnSpPr>
         <p:spPr>
           <a:xfrm>
-            <a:off x="4429124" y="678637"/>
-            <a:ext cx="857256" cy="1500198"/>
+            <a:off x="4429124" y="892951"/>
+            <a:ext cx="857256" cy="1285884"/>
           </a:xfrm>
           <a:prstGeom prst="line">
             <a:avLst/>
@@ -24584,8 +24584,8 @@
         </p:nvCxnSpPr>
         <p:spPr>
           <a:xfrm>
-            <a:off x="4429124" y="964389"/>
-            <a:ext cx="857256" cy="500066"/>
+            <a:off x="4429124" y="1178703"/>
+            <a:ext cx="857256" cy="285752"/>
           </a:xfrm>
           <a:prstGeom prst="line">
             <a:avLst/>
@@ -24618,8 +24618,8 @@
         </p:nvCxnSpPr>
         <p:spPr>
           <a:xfrm>
-            <a:off x="4429124" y="964389"/>
-            <a:ext cx="857256" cy="1214446"/>
+            <a:off x="4429124" y="1178703"/>
+            <a:ext cx="857256" cy="1000132"/>
           </a:xfrm>
           <a:prstGeom prst="line">
             <a:avLst/>
@@ -24652,8 +24652,8 @@
         </p:nvCxnSpPr>
         <p:spPr>
           <a:xfrm>
-            <a:off x="4429124" y="1250141"/>
-            <a:ext cx="857256" cy="214314"/>
+            <a:off x="4429124" y="1464455"/>
+            <a:ext cx="857256" cy="0"/>
           </a:xfrm>
           <a:prstGeom prst="line">
             <a:avLst/>
@@ -24687,7 +24687,7 @@
         <p:spPr>
           <a:xfrm flipV="1">
             <a:off x="4429124" y="1464455"/>
-            <a:ext cx="857256" cy="71438"/>
+            <a:ext cx="857256" cy="285752"/>
           </a:xfrm>
           <a:prstGeom prst="line">
             <a:avLst/>
@@ -24721,7 +24721,7 @@
         <p:spPr>
           <a:xfrm flipV="1">
             <a:off x="4429124" y="1464455"/>
-            <a:ext cx="857256" cy="357190"/>
+            <a:ext cx="857256" cy="571504"/>
           </a:xfrm>
           <a:prstGeom prst="line">
             <a:avLst/>
@@ -24754,8 +24754,8 @@
         </p:nvCxnSpPr>
         <p:spPr>
           <a:xfrm>
-            <a:off x="4429124" y="1250141"/>
-            <a:ext cx="857256" cy="928694"/>
+            <a:off x="4429124" y="1464455"/>
+            <a:ext cx="857256" cy="714380"/>
           </a:xfrm>
           <a:prstGeom prst="line">
             <a:avLst/>
@@ -24788,8 +24788,8 @@
         </p:nvCxnSpPr>
         <p:spPr>
           <a:xfrm>
-            <a:off x="4429124" y="1535893"/>
-            <a:ext cx="857256" cy="642942"/>
+            <a:off x="4429124" y="1750207"/>
+            <a:ext cx="857256" cy="428628"/>
           </a:xfrm>
           <a:prstGeom prst="line">
             <a:avLst/>
@@ -24822,8 +24822,8 @@
         </p:nvCxnSpPr>
         <p:spPr>
           <a:xfrm>
-            <a:off x="4429124" y="1821645"/>
-            <a:ext cx="857256" cy="357190"/>
+            <a:off x="4429124" y="2035959"/>
+            <a:ext cx="857256" cy="142876"/>
           </a:xfrm>
           <a:prstGeom prst="line">
             <a:avLst/>
@@ -24856,8 +24856,8 @@
         </p:nvCxnSpPr>
         <p:spPr>
           <a:xfrm>
-            <a:off x="4857752" y="2781599"/>
-            <a:ext cx="1000132" cy="1040310"/>
+            <a:off x="4857752" y="2924475"/>
+            <a:ext cx="1000132" cy="897434"/>
           </a:xfrm>
           <a:prstGeom prst="line">
             <a:avLst/>
@@ -24890,8 +24890,8 @@
         </p:nvCxnSpPr>
         <p:spPr>
           <a:xfrm>
-            <a:off x="4857752" y="3067351"/>
-            <a:ext cx="1000132" cy="754558"/>
+            <a:off x="4857752" y="3210227"/>
+            <a:ext cx="1000132" cy="611682"/>
           </a:xfrm>
           <a:prstGeom prst="line">
             <a:avLst/>
@@ -24924,8 +24924,8 @@
         </p:nvCxnSpPr>
         <p:spPr>
           <a:xfrm>
-            <a:off x="4857752" y="4088757"/>
-            <a:ext cx="1000132" cy="804722"/>
+            <a:off x="4857752" y="4231633"/>
+            <a:ext cx="1000132" cy="661846"/>
           </a:xfrm>
           <a:prstGeom prst="line">
             <a:avLst/>
@@ -24958,8 +24958,8 @@
         </p:nvCxnSpPr>
         <p:spPr>
           <a:xfrm>
-            <a:off x="4857752" y="3567417"/>
-            <a:ext cx="1000132" cy="254492"/>
+            <a:off x="4857752" y="3710293"/>
+            <a:ext cx="1000132" cy="111616"/>
           </a:xfrm>
           <a:prstGeom prst="line">
             <a:avLst/>
@@ -24989,7 +24989,7 @@
         </p:nvSpPr>
         <p:spPr>
           <a:xfrm>
-            <a:off x="2857488" y="6357958"/>
+            <a:off x="2857488" y="6429396"/>
             <a:ext cx="2000264" cy="214314"/>
           </a:xfrm>
           <a:prstGeom prst="roundRect">
@@ -25037,7 +25037,7 @@
         </p:nvSpPr>
         <p:spPr>
           <a:xfrm>
-            <a:off x="2857488" y="6072206"/>
+            <a:off x="2857488" y="6143644"/>
             <a:ext cx="2000264" cy="214314"/>
           </a:xfrm>
           <a:prstGeom prst="roundRect">
@@ -25088,8 +25088,8 @@
         </p:nvCxnSpPr>
         <p:spPr>
           <a:xfrm rot="16200000" flipH="1">
-            <a:off x="589015" y="3910890"/>
-            <a:ext cx="2493554" cy="2043391"/>
+            <a:off x="559892" y="3953205"/>
+            <a:ext cx="2560174" cy="2035017"/>
           </a:xfrm>
           <a:prstGeom prst="line">
             <a:avLst/>
@@ -25124,8 +25124,8 @@
         </p:nvCxnSpPr>
         <p:spPr>
           <a:xfrm rot="16200000" flipH="1">
-            <a:off x="446139" y="4053766"/>
-            <a:ext cx="2779306" cy="2043391"/>
+            <a:off x="417016" y="4096081"/>
+            <a:ext cx="2845926" cy="2035017"/>
           </a:xfrm>
           <a:prstGeom prst="line">
             <a:avLst/>
@@ -25157,7 +25157,7 @@
         </p:nvSpPr>
         <p:spPr>
           <a:xfrm>
-            <a:off x="2857488" y="5786454"/>
+            <a:off x="2857488" y="5857892"/>
             <a:ext cx="2000264" cy="214314"/>
           </a:xfrm>
           <a:prstGeom prst="roundRect">
@@ -25208,8 +25208,8 @@
         </p:nvCxnSpPr>
         <p:spPr>
           <a:xfrm rot="16200000" flipH="1">
-            <a:off x="731891" y="3768014"/>
-            <a:ext cx="2207802" cy="2043391"/>
+            <a:off x="702768" y="3810329"/>
+            <a:ext cx="2274422" cy="2035017"/>
           </a:xfrm>
           <a:prstGeom prst="line">
             <a:avLst/>
@@ -25241,7 +25241,7 @@
         </p:nvSpPr>
         <p:spPr>
           <a:xfrm>
-            <a:off x="2857488" y="5357826"/>
+            <a:off x="2857488" y="5429264"/>
             <a:ext cx="2000264" cy="214314"/>
           </a:xfrm>
           <a:prstGeom prst="roundRect">
@@ -25292,8 +25292,8 @@
         </p:nvCxnSpPr>
         <p:spPr>
           <a:xfrm rot="16200000" flipH="1">
-            <a:off x="2230311" y="4837806"/>
-            <a:ext cx="782598" cy="471755"/>
+            <a:off x="2194592" y="4873525"/>
+            <a:ext cx="854036" cy="471755"/>
           </a:xfrm>
           <a:prstGeom prst="line">
             <a:avLst/>
@@ -25325,7 +25325,7 @@
         </p:nvSpPr>
         <p:spPr>
           <a:xfrm>
-            <a:off x="2857488" y="4286256"/>
+            <a:off x="2857488" y="4429132"/>
             <a:ext cx="2000264" cy="214314"/>
           </a:xfrm>
           <a:prstGeom prst="roundRect">
@@ -25376,7 +25376,7 @@
         </p:nvCxnSpPr>
         <p:spPr>
           <a:xfrm>
-            <a:off x="2571736" y="3946504"/>
+            <a:off x="2571736" y="4089380"/>
             <a:ext cx="285752" cy="446909"/>
           </a:xfrm>
           <a:prstGeom prst="line">
@@ -25409,7 +25409,7 @@
         </p:nvSpPr>
         <p:spPr>
           <a:xfrm>
-            <a:off x="2857488" y="2000240"/>
+            <a:off x="2857488" y="2214554"/>
             <a:ext cx="1571636" cy="214314"/>
           </a:xfrm>
           <a:prstGeom prst="roundRect">
@@ -25457,7 +25457,7 @@
         </p:nvSpPr>
         <p:spPr>
           <a:xfrm>
-            <a:off x="2857488" y="2285992"/>
+            <a:off x="2857488" y="2500306"/>
             <a:ext cx="1571636" cy="214314"/>
           </a:xfrm>
           <a:prstGeom prst="roundRect">
@@ -25487,12 +25487,8 @@
           <a:p>
             <a:pPr algn="ctr"/>
             <a:r>
-              <a:rPr lang="de-DE" sz="1200" dirty="0" err="1"/>
-              <a:t>S</a:t>
-            </a:r>
-            <a:r>
               <a:rPr lang="de-DE" sz="1200" dirty="0" err="1" smtClean="0"/>
-              <a:t>mallMolecule</a:t>
+              <a:t>SmallMolecule</a:t>
             </a:r>
             <a:endParaRPr lang="de-DE" sz="1200" dirty="0"/>
           </a:p>
@@ -25509,7 +25505,7 @@
         </p:nvCxnSpPr>
         <p:spPr>
           <a:xfrm rot="10800000">
-            <a:off x="2608298" y="1821739"/>
+            <a:off x="2608298" y="2036053"/>
             <a:ext cx="249190" cy="285659"/>
           </a:xfrm>
           <a:prstGeom prst="line">
@@ -25545,7 +25541,7 @@
         </p:nvCxnSpPr>
         <p:spPr>
           <a:xfrm rot="10800000">
-            <a:off x="2608298" y="1821739"/>
+            <a:off x="2608298" y="2036053"/>
             <a:ext cx="249190" cy="571411"/>
           </a:xfrm>
           <a:prstGeom prst="line">
@@ -25582,7 +25578,7 @@
         <p:spPr>
           <a:xfrm flipV="1">
             <a:off x="4429124" y="1464455"/>
-            <a:ext cx="857256" cy="642942"/>
+            <a:ext cx="857256" cy="857256"/>
           </a:xfrm>
           <a:prstGeom prst="line">
             <a:avLst/>
@@ -25616,7 +25612,7 @@
         <p:spPr>
           <a:xfrm flipV="1">
             <a:off x="4429124" y="1464455"/>
-            <a:ext cx="857256" cy="928694"/>
+            <a:ext cx="857256" cy="1143008"/>
           </a:xfrm>
           <a:prstGeom prst="line">
             <a:avLst/>
@@ -25650,7 +25646,7 @@
         <p:spPr>
           <a:xfrm flipV="1">
             <a:off x="4857752" y="4893479"/>
-            <a:ext cx="1000132" cy="1285884"/>
+            <a:ext cx="1000132" cy="1357322"/>
           </a:xfrm>
           <a:prstGeom prst="line">
             <a:avLst/>
@@ -25684,7 +25680,7 @@
         <p:spPr>
           <a:xfrm flipV="1">
             <a:off x="4857752" y="4893479"/>
-            <a:ext cx="1000132" cy="1571636"/>
+            <a:ext cx="1000132" cy="1643074"/>
           </a:xfrm>
           <a:prstGeom prst="line">
             <a:avLst/>
@@ -25718,7 +25714,7 @@
         <p:spPr>
           <a:xfrm flipV="1">
             <a:off x="4857752" y="4893479"/>
-            <a:ext cx="1000132" cy="571504"/>
+            <a:ext cx="1000132" cy="642942"/>
           </a:xfrm>
           <a:prstGeom prst="line">
             <a:avLst/>
@@ -25751,8 +25747,8 @@
         </p:nvCxnSpPr>
         <p:spPr>
           <a:xfrm>
-            <a:off x="4857752" y="4393413"/>
-            <a:ext cx="1000132" cy="500066"/>
+            <a:off x="4857752" y="4536289"/>
+            <a:ext cx="1000132" cy="357190"/>
           </a:xfrm>
           <a:prstGeom prst="line">
             <a:avLst/>
@@ -25786,7 +25782,7 @@
         <p:spPr>
           <a:xfrm flipV="1">
             <a:off x="4857752" y="4893479"/>
-            <a:ext cx="1000132" cy="1000132"/>
+            <a:ext cx="1000132" cy="1071570"/>
           </a:xfrm>
           <a:prstGeom prst="line">
             <a:avLst/>
@@ -25822,7 +25818,7 @@
         <p:spPr>
           <a:xfrm flipV="1">
             <a:off x="4857752" y="3821909"/>
-            <a:ext cx="1000132" cy="2071702"/>
+            <a:ext cx="1000132" cy="2143140"/>
           </a:xfrm>
           <a:prstGeom prst="line">
             <a:avLst/>
@@ -25856,9 +25852,9 @@
           <p:nvPr/>
         </p:nvCxnSpPr>
         <p:spPr>
-          <a:xfrm>
+          <a:xfrm flipV="1">
             <a:off x="4857752" y="4893479"/>
-            <a:ext cx="1000132" cy="0"/>
+            <a:ext cx="1000132" cy="71438"/>
           </a:xfrm>
           <a:prstGeom prst="line">
             <a:avLst/>
@@ -25894,7 +25890,7 @@
         <p:spPr>
           <a:xfrm flipV="1">
             <a:off x="4857752" y="3821909"/>
-            <a:ext cx="1000132" cy="1357322"/>
+            <a:ext cx="1000132" cy="1428760"/>
           </a:xfrm>
           <a:prstGeom prst="line">
             <a:avLst/>
@@ -25930,7 +25926,7 @@
         <p:spPr>
           <a:xfrm flipV="1">
             <a:off x="4857752" y="3821909"/>
-            <a:ext cx="1000132" cy="1071570"/>
+            <a:ext cx="1000132" cy="1143008"/>
           </a:xfrm>
           <a:prstGeom prst="line">
             <a:avLst/>
@@ -25966,7 +25962,7 @@
         <p:spPr>
           <a:xfrm flipV="1">
             <a:off x="4857752" y="4893479"/>
-            <a:ext cx="1000132" cy="285752"/>
+            <a:ext cx="1000132" cy="357190"/>
           </a:xfrm>
           <a:prstGeom prst="line">
             <a:avLst/>
@@ -26083,7 +26079,7 @@
         </p:nvCxnSpPr>
         <p:spPr>
           <a:xfrm>
-            <a:off x="214282" y="642918"/>
+            <a:off x="214282" y="928670"/>
             <a:ext cx="285752" cy="0"/>
           </a:xfrm>
           <a:prstGeom prst="line">
@@ -26114,7 +26110,7 @@
         </p:nvCxnSpPr>
         <p:spPr>
           <a:xfrm>
-            <a:off x="214282" y="785794"/>
+            <a:off x="214282" y="1071546"/>
             <a:ext cx="285752" cy="0"/>
           </a:xfrm>
           <a:prstGeom prst="line">
@@ -26147,7 +26143,7 @@
         </p:nvSpPr>
         <p:spPr>
           <a:xfrm>
-            <a:off x="500034" y="500042"/>
+            <a:off x="500034" y="785794"/>
             <a:ext cx="982961" cy="230832"/>
           </a:xfrm>
           <a:prstGeom prst="rect">
@@ -26185,7 +26181,7 @@
         </p:nvSpPr>
         <p:spPr>
           <a:xfrm>
-            <a:off x="500034" y="671436"/>
+            <a:off x="500034" y="957188"/>
             <a:ext cx="1205779" cy="369332"/>
           </a:xfrm>
           <a:prstGeom prst="rect">
@@ -26237,7 +26233,7 @@
         </p:nvSpPr>
         <p:spPr>
           <a:xfrm>
-            <a:off x="500034" y="968201"/>
+            <a:off x="500034" y="500042"/>
             <a:ext cx="720069" cy="230832"/>
           </a:xfrm>
           <a:prstGeom prst="rect">
@@ -26428,7 +26424,7 @@
         </p:nvGrpSpPr>
         <p:grpSpPr>
           <a:xfrm>
-            <a:off x="209754" y="1062000"/>
+            <a:off x="209754" y="593841"/>
             <a:ext cx="290280" cy="71438"/>
             <a:chOff x="209754" y="1071546"/>
             <a:chExt cx="290280" cy="71438"/>
@@ -26516,7 +26512,7 @@
         </p:nvCxnSpPr>
         <p:spPr>
           <a:xfrm>
-            <a:off x="312120" y="1261200"/>
+            <a:off x="312120" y="793041"/>
             <a:ext cx="198000" cy="0"/>
           </a:xfrm>
           <a:prstGeom prst="line">
@@ -26547,7 +26543,7 @@
         </p:nvSpPr>
         <p:spPr>
           <a:xfrm>
-            <a:off x="214282" y="1214422"/>
+            <a:off x="214282" y="746263"/>
             <a:ext cx="90000" cy="90000"/>
           </a:xfrm>
           <a:prstGeom prst="diamond">
@@ -26589,7 +26585,7 @@
         </p:nvSpPr>
         <p:spPr>
           <a:xfrm>
-            <a:off x="494345" y="1120601"/>
+            <a:off x="494345" y="652442"/>
             <a:ext cx="798617" cy="230832"/>
           </a:xfrm>
           <a:prstGeom prst="rect">
@@ -26619,7 +26615,7 @@
         </p:nvSpPr>
         <p:spPr>
           <a:xfrm rot="16200000">
-            <a:off x="928662" y="1767738"/>
+            <a:off x="928662" y="1963678"/>
             <a:ext cx="108000" cy="108000"/>
           </a:xfrm>
           <a:prstGeom prst="triangle">
@@ -26657,15 +26653,14 @@
         <p:nvCxnSpPr>
           <p:cNvPr id="138" name="Gerade Verbindung 137"/>
           <p:cNvCxnSpPr>
-            <a:stCxn id="137" idx="3"/>
             <a:endCxn id="5" idx="1"/>
           </p:cNvCxnSpPr>
           <p:nvPr/>
         </p:nvCxnSpPr>
         <p:spPr>
           <a:xfrm>
-            <a:off x="1036662" y="1821738"/>
-            <a:ext cx="320628" cy="1169"/>
+            <a:off x="1036662" y="2034790"/>
+            <a:ext cx="320628" cy="2431"/>
           </a:xfrm>
           <a:prstGeom prst="line">
             <a:avLst/>
@@ -26695,7 +26690,7 @@
         </p:nvSpPr>
         <p:spPr>
           <a:xfrm rot="16200000">
-            <a:off x="2463736" y="3892504"/>
+            <a:off x="2463736" y="4035380"/>
             <a:ext cx="108000" cy="108000"/>
           </a:xfrm>
           <a:prstGeom prst="triangle">
@@ -26740,7 +26735,7 @@
         </p:nvCxnSpPr>
         <p:spPr>
           <a:xfrm>
-            <a:off x="2571736" y="3946504"/>
+            <a:off x="2571736" y="4089380"/>
             <a:ext cx="285752" cy="142253"/>
           </a:xfrm>
           <a:prstGeom prst="line">
@@ -26771,7 +26766,7 @@
         </p:nvSpPr>
         <p:spPr>
           <a:xfrm rot="20220000">
-            <a:off x="445403" y="1946871"/>
+            <a:off x="445403" y="2127560"/>
             <a:ext cx="108000" cy="108000"/>
           </a:xfrm>
           <a:prstGeom prst="triangle">
@@ -26815,8 +26810,8 @@
         </p:nvCxnSpPr>
         <p:spPr>
           <a:xfrm rot="16200000" flipH="1">
-            <a:off x="570525" y="2856549"/>
-            <a:ext cx="665304" cy="336722"/>
+            <a:off x="642594" y="2928618"/>
+            <a:ext cx="521166" cy="336722"/>
           </a:xfrm>
           <a:prstGeom prst="line">
             <a:avLst/>
@@ -26848,7 +26843,7 @@
         </p:nvSpPr>
         <p:spPr>
           <a:xfrm rot="20220000">
-            <a:off x="659717" y="2588551"/>
+            <a:off x="659717" y="2732689"/>
             <a:ext cx="108000" cy="108000"/>
           </a:xfrm>
           <a:prstGeom prst="triangle">
@@ -26893,8 +26888,8 @@
         </p:nvCxnSpPr>
         <p:spPr>
           <a:xfrm rot="16200000" flipH="1">
-            <a:off x="874767" y="3625138"/>
-            <a:ext cx="779042" cy="900383"/>
+            <a:off x="881363" y="3631734"/>
+            <a:ext cx="774224" cy="892009"/>
           </a:xfrm>
           <a:prstGeom prst="line">
             <a:avLst/>
@@ -26926,7 +26921,7 @@
         </p:nvSpPr>
         <p:spPr>
           <a:xfrm rot="19380000">
-            <a:off x="727599" y="3588683"/>
+            <a:off x="735973" y="3593501"/>
             <a:ext cx="108000" cy="108000"/>
           </a:xfrm>
           <a:prstGeom prst="triangle">
@@ -26968,7 +26963,7 @@
         </p:nvSpPr>
         <p:spPr>
           <a:xfrm rot="10800000">
-            <a:off x="3801600" y="3852325"/>
+            <a:off x="3801600" y="3995201"/>
             <a:ext cx="108000" cy="108000"/>
           </a:xfrm>
           <a:prstGeom prst="triangle">
@@ -27010,7 +27005,7 @@
         </p:nvSpPr>
         <p:spPr>
           <a:xfrm rot="10800000" flipH="1" flipV="1">
-            <a:off x="3801600" y="3174508"/>
+            <a:off x="3801600" y="3317384"/>
             <a:ext cx="108000" cy="108000"/>
           </a:xfrm>
           <a:prstGeom prst="triangle">
@@ -27356,7 +27351,7 @@
         </p:nvSpPr>
         <p:spPr>
           <a:xfrm rot="16200000">
-            <a:off x="2500298" y="1767738"/>
+            <a:off x="2500298" y="1982052"/>
             <a:ext cx="108000" cy="108000"/>
           </a:xfrm>
           <a:prstGeom prst="triangle">
@@ -27390,6 +27385,154 @@
           </a:p>
         </p:txBody>
       </p:sp>
+      <p:sp>
+        <p:nvSpPr>
+          <p:cNvPr id="136" name="Abgerundetes Rechteck 135"/>
+          <p:cNvSpPr/>
+          <p:nvPr/>
+        </p:nvSpPr>
+        <p:spPr>
+          <a:xfrm>
+            <a:off x="2857488" y="500042"/>
+            <a:ext cx="1571636" cy="214314"/>
+          </a:xfrm>
+          <a:prstGeom prst="roundRect">
+            <a:avLst/>
+          </a:prstGeom>
+          <a:solidFill>
+            <a:srgbClr val="F7FAFF"/>
+          </a:solidFill>
+        </p:spPr>
+        <p:style>
+          <a:lnRef idx="2">
+            <a:schemeClr val="accent1"/>
+          </a:lnRef>
+          <a:fillRef idx="1">
+            <a:schemeClr val="lt1"/>
+          </a:fillRef>
+          <a:effectRef idx="0">
+            <a:schemeClr val="accent1"/>
+          </a:effectRef>
+          <a:fontRef idx="minor">
+            <a:schemeClr val="dk1"/>
+          </a:fontRef>
+        </p:style>
+        <p:txBody>
+          <a:bodyPr rtlCol="0" anchor="ctr"/>
+          <a:lstStyle/>
+          <a:p>
+            <a:pPr algn="ctr"/>
+            <a:r>
+              <a:rPr lang="de-DE" sz="1200" dirty="0" smtClean="0"/>
+              <a:t>Gene</a:t>
+            </a:r>
+            <a:endParaRPr lang="de-DE" sz="1200" dirty="0"/>
+          </a:p>
+        </p:txBody>
+      </p:sp>
+      <p:cxnSp>
+        <p:nvCxnSpPr>
+          <p:cNvPr id="139" name="Gerade Verbindung 138"/>
+          <p:cNvCxnSpPr>
+            <a:stCxn id="136" idx="1"/>
+          </p:cNvCxnSpPr>
+          <p:nvPr/>
+        </p:nvCxnSpPr>
+        <p:spPr>
+          <a:xfrm rot="10800000" flipV="1">
+            <a:off x="1036662" y="607198"/>
+            <a:ext cx="1820826" cy="1427591"/>
+          </a:xfrm>
+          <a:prstGeom prst="line">
+            <a:avLst/>
+          </a:prstGeom>
+          <a:ln>
+            <a:headEnd type="none"/>
+          </a:ln>
+        </p:spPr>
+        <p:style>
+          <a:lnRef idx="2">
+            <a:schemeClr val="accent1"/>
+          </a:lnRef>
+          <a:fillRef idx="1">
+            <a:schemeClr val="lt1"/>
+          </a:fillRef>
+          <a:effectRef idx="0">
+            <a:schemeClr val="accent1"/>
+          </a:effectRef>
+          <a:fontRef idx="minor">
+            <a:schemeClr val="dk1"/>
+          </a:fontRef>
+        </p:style>
+      </p:cxnSp>
+      <p:cxnSp>
+        <p:nvCxnSpPr>
+          <p:cNvPr id="142" name="Gerade Verbindung 141"/>
+          <p:cNvCxnSpPr>
+            <a:stCxn id="136" idx="3"/>
+            <a:endCxn id="39" idx="1"/>
+          </p:cNvCxnSpPr>
+          <p:nvPr/>
+        </p:nvCxnSpPr>
+        <p:spPr>
+          <a:xfrm>
+            <a:off x="4429124" y="607199"/>
+            <a:ext cx="857256" cy="857256"/>
+          </a:xfrm>
+          <a:prstGeom prst="line">
+            <a:avLst/>
+          </a:prstGeom>
+          <a:ln w="12700"/>
+        </p:spPr>
+        <p:style>
+          <a:lnRef idx="1">
+            <a:schemeClr val="dk1"/>
+          </a:lnRef>
+          <a:fillRef idx="0">
+            <a:schemeClr val="dk1"/>
+          </a:fillRef>
+          <a:effectRef idx="0">
+            <a:schemeClr val="dk1"/>
+          </a:effectRef>
+          <a:fontRef idx="minor">
+            <a:schemeClr val="tx1"/>
+          </a:fontRef>
+        </p:style>
+      </p:cxnSp>
+      <p:cxnSp>
+        <p:nvCxnSpPr>
+          <p:cNvPr id="146" name="Gerade Verbindung 145"/>
+          <p:cNvCxnSpPr>
+            <a:stCxn id="136" idx="3"/>
+            <a:endCxn id="46" idx="1"/>
+          </p:cNvCxnSpPr>
+          <p:nvPr/>
+        </p:nvCxnSpPr>
+        <p:spPr>
+          <a:xfrm>
+            <a:off x="4429124" y="607199"/>
+            <a:ext cx="857256" cy="1571636"/>
+          </a:xfrm>
+          <a:prstGeom prst="line">
+            <a:avLst/>
+          </a:prstGeom>
+          <a:ln w="12700"/>
+        </p:spPr>
+        <p:style>
+          <a:lnRef idx="1">
+            <a:schemeClr val="dk1"/>
+          </a:lnRef>
+          <a:fillRef idx="0">
+            <a:schemeClr val="dk1"/>
+          </a:fillRef>
+          <a:effectRef idx="0">
+            <a:schemeClr val="dk1"/>
+          </a:effectRef>
+          <a:fontRef idx="minor">
+            <a:schemeClr val="tx1"/>
+          </a:fontRef>
+        </p:style>
+      </p:cxnSp>
     </p:spTree>
   </p:cSld>
   <p:clrMapOvr>

</xml_diff>

<commit_message>
Version for Prof. Zell ready
</commit_message>
<xml_diff>
--- a/doc/ECCB2012_paper/Conversion.pptx
+++ b/doc/ECCB2012_paper/Conversion.pptx
@@ -294,7 +294,7 @@
             <a:fld id="{7FFB8D8C-A3C7-4ABD-A7A4-8E27FCE4E604}" type="datetimeFigureOut">
               <a:rPr lang="de-DE" smtClean="0"/>
               <a:pPr/>
-              <a:t>22.03.2012</a:t>
+              <a:t>23.03.2012</a:t>
             </a:fld>
             <a:endParaRPr lang="de-DE"/>
           </a:p>
@@ -461,7 +461,7 @@
             <a:fld id="{7FFB8D8C-A3C7-4ABD-A7A4-8E27FCE4E604}" type="datetimeFigureOut">
               <a:rPr lang="de-DE" smtClean="0"/>
               <a:pPr/>
-              <a:t>22.03.2012</a:t>
+              <a:t>23.03.2012</a:t>
             </a:fld>
             <a:endParaRPr lang="de-DE"/>
           </a:p>
@@ -638,7 +638,7 @@
             <a:fld id="{7FFB8D8C-A3C7-4ABD-A7A4-8E27FCE4E604}" type="datetimeFigureOut">
               <a:rPr lang="de-DE" smtClean="0"/>
               <a:pPr/>
-              <a:t>22.03.2012</a:t>
+              <a:t>23.03.2012</a:t>
             </a:fld>
             <a:endParaRPr lang="de-DE"/>
           </a:p>
@@ -805,7 +805,7 @@
             <a:fld id="{7FFB8D8C-A3C7-4ABD-A7A4-8E27FCE4E604}" type="datetimeFigureOut">
               <a:rPr lang="de-DE" smtClean="0"/>
               <a:pPr/>
-              <a:t>22.03.2012</a:t>
+              <a:t>23.03.2012</a:t>
             </a:fld>
             <a:endParaRPr lang="de-DE"/>
           </a:p>
@@ -1048,7 +1048,7 @@
             <a:fld id="{7FFB8D8C-A3C7-4ABD-A7A4-8E27FCE4E604}" type="datetimeFigureOut">
               <a:rPr lang="de-DE" smtClean="0"/>
               <a:pPr/>
-              <a:t>22.03.2012</a:t>
+              <a:t>23.03.2012</a:t>
             </a:fld>
             <a:endParaRPr lang="de-DE"/>
           </a:p>
@@ -1333,7 +1333,7 @@
             <a:fld id="{7FFB8D8C-A3C7-4ABD-A7A4-8E27FCE4E604}" type="datetimeFigureOut">
               <a:rPr lang="de-DE" smtClean="0"/>
               <a:pPr/>
-              <a:t>22.03.2012</a:t>
+              <a:t>23.03.2012</a:t>
             </a:fld>
             <a:endParaRPr lang="de-DE"/>
           </a:p>
@@ -1752,7 +1752,7 @@
             <a:fld id="{7FFB8D8C-A3C7-4ABD-A7A4-8E27FCE4E604}" type="datetimeFigureOut">
               <a:rPr lang="de-DE" smtClean="0"/>
               <a:pPr/>
-              <a:t>22.03.2012</a:t>
+              <a:t>23.03.2012</a:t>
             </a:fld>
             <a:endParaRPr lang="de-DE"/>
           </a:p>
@@ -1867,7 +1867,7 @@
             <a:fld id="{7FFB8D8C-A3C7-4ABD-A7A4-8E27FCE4E604}" type="datetimeFigureOut">
               <a:rPr lang="de-DE" smtClean="0"/>
               <a:pPr/>
-              <a:t>22.03.2012</a:t>
+              <a:t>23.03.2012</a:t>
             </a:fld>
             <a:endParaRPr lang="de-DE"/>
           </a:p>
@@ -1959,7 +1959,7 @@
             <a:fld id="{7FFB8D8C-A3C7-4ABD-A7A4-8E27FCE4E604}" type="datetimeFigureOut">
               <a:rPr lang="de-DE" smtClean="0"/>
               <a:pPr/>
-              <a:t>22.03.2012</a:t>
+              <a:t>23.03.2012</a:t>
             </a:fld>
             <a:endParaRPr lang="de-DE"/>
           </a:p>
@@ -2233,7 +2233,7 @@
             <a:fld id="{7FFB8D8C-A3C7-4ABD-A7A4-8E27FCE4E604}" type="datetimeFigureOut">
               <a:rPr lang="de-DE" smtClean="0"/>
               <a:pPr/>
-              <a:t>22.03.2012</a:t>
+              <a:t>23.03.2012</a:t>
             </a:fld>
             <a:endParaRPr lang="de-DE"/>
           </a:p>
@@ -2483,7 +2483,7 @@
             <a:fld id="{7FFB8D8C-A3C7-4ABD-A7A4-8E27FCE4E604}" type="datetimeFigureOut">
               <a:rPr lang="de-DE" smtClean="0"/>
               <a:pPr/>
-              <a:t>22.03.2012</a:t>
+              <a:t>23.03.2012</a:t>
             </a:fld>
             <a:endParaRPr lang="de-DE"/>
           </a:p>
@@ -2693,7 +2693,7 @@
             <a:fld id="{7FFB8D8C-A3C7-4ABD-A7A4-8E27FCE4E604}" type="datetimeFigureOut">
               <a:rPr lang="de-DE" smtClean="0"/>
               <a:pPr/>
-              <a:t>22.03.2012</a:t>
+              <a:t>23.03.2012</a:t>
             </a:fld>
             <a:endParaRPr lang="de-DE"/>
           </a:p>
@@ -26182,7 +26182,7 @@
         <p:spPr>
           <a:xfrm>
             <a:off x="500034" y="957188"/>
-            <a:ext cx="1205779" cy="369332"/>
+            <a:ext cx="1348446" cy="369332"/>
           </a:xfrm>
           <a:prstGeom prst="rect">
             <a:avLst/>
@@ -26201,11 +26201,15 @@
             </a:r>
             <a:r>
               <a:rPr lang="de-DE" sz="900" dirty="0" err="1" smtClean="0"/>
-              <a:t>depends</a:t>
+              <a:t>depending</a:t>
             </a:r>
             <a:r>
               <a:rPr lang="de-DE" sz="900" dirty="0" smtClean="0"/>
-              <a:t> on </a:t>
+              <a:t> </a:t>
+            </a:r>
+            <a:r>
+              <a:rPr lang="de-DE" sz="900" dirty="0" smtClean="0"/>
+              <a:t>on </a:t>
             </a:r>
           </a:p>
           <a:p>

</xml_diff>

<commit_message>
Changed that transition and degradation are translated into reactions instead of transitions
</commit_message>
<xml_diff>
--- a/doc/ECCB2012_paper/Conversion.pptx
+++ b/doc/ECCB2012_paper/Conversion.pptx
@@ -294,7 +294,7 @@
             <a:fld id="{7FFB8D8C-A3C7-4ABD-A7A4-8E27FCE4E604}" type="datetimeFigureOut">
               <a:rPr lang="de-DE" smtClean="0"/>
               <a:pPr/>
-              <a:t>23.03.2012</a:t>
+              <a:t>30.03.2012</a:t>
             </a:fld>
             <a:endParaRPr lang="de-DE"/>
           </a:p>
@@ -461,7 +461,7 @@
             <a:fld id="{7FFB8D8C-A3C7-4ABD-A7A4-8E27FCE4E604}" type="datetimeFigureOut">
               <a:rPr lang="de-DE" smtClean="0"/>
               <a:pPr/>
-              <a:t>23.03.2012</a:t>
+              <a:t>30.03.2012</a:t>
             </a:fld>
             <a:endParaRPr lang="de-DE"/>
           </a:p>
@@ -638,7 +638,7 @@
             <a:fld id="{7FFB8D8C-A3C7-4ABD-A7A4-8E27FCE4E604}" type="datetimeFigureOut">
               <a:rPr lang="de-DE" smtClean="0"/>
               <a:pPr/>
-              <a:t>23.03.2012</a:t>
+              <a:t>30.03.2012</a:t>
             </a:fld>
             <a:endParaRPr lang="de-DE"/>
           </a:p>
@@ -805,7 +805,7 @@
             <a:fld id="{7FFB8D8C-A3C7-4ABD-A7A4-8E27FCE4E604}" type="datetimeFigureOut">
               <a:rPr lang="de-DE" smtClean="0"/>
               <a:pPr/>
-              <a:t>23.03.2012</a:t>
+              <a:t>30.03.2012</a:t>
             </a:fld>
             <a:endParaRPr lang="de-DE"/>
           </a:p>
@@ -1048,7 +1048,7 @@
             <a:fld id="{7FFB8D8C-A3C7-4ABD-A7A4-8E27FCE4E604}" type="datetimeFigureOut">
               <a:rPr lang="de-DE" smtClean="0"/>
               <a:pPr/>
-              <a:t>23.03.2012</a:t>
+              <a:t>30.03.2012</a:t>
             </a:fld>
             <a:endParaRPr lang="de-DE"/>
           </a:p>
@@ -1333,7 +1333,7 @@
             <a:fld id="{7FFB8D8C-A3C7-4ABD-A7A4-8E27FCE4E604}" type="datetimeFigureOut">
               <a:rPr lang="de-DE" smtClean="0"/>
               <a:pPr/>
-              <a:t>23.03.2012</a:t>
+              <a:t>30.03.2012</a:t>
             </a:fld>
             <a:endParaRPr lang="de-DE"/>
           </a:p>
@@ -1752,7 +1752,7 @@
             <a:fld id="{7FFB8D8C-A3C7-4ABD-A7A4-8E27FCE4E604}" type="datetimeFigureOut">
               <a:rPr lang="de-DE" smtClean="0"/>
               <a:pPr/>
-              <a:t>23.03.2012</a:t>
+              <a:t>30.03.2012</a:t>
             </a:fld>
             <a:endParaRPr lang="de-DE"/>
           </a:p>
@@ -1867,7 +1867,7 @@
             <a:fld id="{7FFB8D8C-A3C7-4ABD-A7A4-8E27FCE4E604}" type="datetimeFigureOut">
               <a:rPr lang="de-DE" smtClean="0"/>
               <a:pPr/>
-              <a:t>23.03.2012</a:t>
+              <a:t>30.03.2012</a:t>
             </a:fld>
             <a:endParaRPr lang="de-DE"/>
           </a:p>
@@ -1959,7 +1959,7 @@
             <a:fld id="{7FFB8D8C-A3C7-4ABD-A7A4-8E27FCE4E604}" type="datetimeFigureOut">
               <a:rPr lang="de-DE" smtClean="0"/>
               <a:pPr/>
-              <a:t>23.03.2012</a:t>
+              <a:t>30.03.2012</a:t>
             </a:fld>
             <a:endParaRPr lang="de-DE"/>
           </a:p>
@@ -2233,7 +2233,7 @@
             <a:fld id="{7FFB8D8C-A3C7-4ABD-A7A4-8E27FCE4E604}" type="datetimeFigureOut">
               <a:rPr lang="de-DE" smtClean="0"/>
               <a:pPr/>
-              <a:t>23.03.2012</a:t>
+              <a:t>30.03.2012</a:t>
             </a:fld>
             <a:endParaRPr lang="de-DE"/>
           </a:p>
@@ -2483,7 +2483,7 @@
             <a:fld id="{7FFB8D8C-A3C7-4ABD-A7A4-8E27FCE4E604}" type="datetimeFigureOut">
               <a:rPr lang="de-DE" smtClean="0"/>
               <a:pPr/>
-              <a:t>23.03.2012</a:t>
+              <a:t>30.03.2012</a:t>
             </a:fld>
             <a:endParaRPr lang="de-DE"/>
           </a:p>
@@ -2693,7 +2693,7 @@
             <a:fld id="{7FFB8D8C-A3C7-4ABD-A7A4-8E27FCE4E604}" type="datetimeFigureOut">
               <a:rPr lang="de-DE" smtClean="0"/>
               <a:pPr/>
-              <a:t>23.03.2012</a:t>
+              <a:t>30.03.2012</a:t>
             </a:fld>
             <a:endParaRPr lang="de-DE"/>
           </a:p>
@@ -24918,14 +24918,14 @@
           <p:cNvPr id="448" name="Gerade Verbindung 447"/>
           <p:cNvCxnSpPr>
             <a:stCxn id="29" idx="3"/>
-            <a:endCxn id="51" idx="1"/>
-          </p:cNvCxnSpPr>
-          <p:nvPr/>
-        </p:nvCxnSpPr>
-        <p:spPr>
-          <a:xfrm>
-            <a:off x="4857752" y="4231633"/>
-            <a:ext cx="1000132" cy="661846"/>
+            <a:endCxn id="40" idx="1"/>
+          </p:cNvCxnSpPr>
+          <p:nvPr/>
+        </p:nvCxnSpPr>
+        <p:spPr>
+          <a:xfrm flipV="1">
+            <a:off x="4857752" y="3821909"/>
+            <a:ext cx="1000132" cy="409724"/>
           </a:xfrm>
           <a:prstGeom prst="line">
             <a:avLst/>
@@ -25741,14 +25741,14 @@
           <p:cNvPr id="265" name="Gerade Verbindung 264"/>
           <p:cNvCxnSpPr>
             <a:stCxn id="180" idx="3"/>
-            <a:endCxn id="51" idx="1"/>
-          </p:cNvCxnSpPr>
-          <p:nvPr/>
-        </p:nvCxnSpPr>
-        <p:spPr>
-          <a:xfrm>
-            <a:off x="4857752" y="4536289"/>
-            <a:ext cx="1000132" cy="357190"/>
+            <a:endCxn id="40" idx="1"/>
+          </p:cNvCxnSpPr>
+          <p:nvPr/>
+        </p:nvCxnSpPr>
+        <p:spPr>
+          <a:xfrm flipV="1">
+            <a:off x="4857752" y="3821909"/>
+            <a:ext cx="1000132" cy="714380"/>
           </a:xfrm>
           <a:prstGeom prst="line">
             <a:avLst/>
@@ -26205,11 +26205,7 @@
             </a:r>
             <a:r>
               <a:rPr lang="de-DE" sz="900" dirty="0" smtClean="0"/>
-              <a:t> </a:t>
-            </a:r>
-            <a:r>
-              <a:rPr lang="de-DE" sz="900" dirty="0" smtClean="0"/>
-              <a:t>on </a:t>
+              <a:t> on </a:t>
             </a:r>
           </a:p>
           <a:p>
@@ -27406,6 +27402,9 @@
           <a:solidFill>
             <a:srgbClr val="F7FAFF"/>
           </a:solidFill>
+          <a:ln>
+            <a:prstDash val="sysDash"/>
+          </a:ln>
         </p:spPr>
         <p:style>
           <a:lnRef idx="2">

</xml_diff>

<commit_message>
Further worked on the major revisions
</commit_message>
<xml_diff>
--- a/doc/ECCB2012_paper/Conversion.pptx
+++ b/doc/ECCB2012_paper/Conversion.pptx
@@ -294,7 +294,7 @@
             <a:fld id="{7FFB8D8C-A3C7-4ABD-A7A4-8E27FCE4E604}" type="datetimeFigureOut">
               <a:rPr lang="de-DE" smtClean="0"/>
               <a:pPr/>
-              <a:t>30.03.2012</a:t>
+              <a:t>25.07.2012</a:t>
             </a:fld>
             <a:endParaRPr lang="de-DE"/>
           </a:p>
@@ -461,7 +461,7 @@
             <a:fld id="{7FFB8D8C-A3C7-4ABD-A7A4-8E27FCE4E604}" type="datetimeFigureOut">
               <a:rPr lang="de-DE" smtClean="0"/>
               <a:pPr/>
-              <a:t>30.03.2012</a:t>
+              <a:t>25.07.2012</a:t>
             </a:fld>
             <a:endParaRPr lang="de-DE"/>
           </a:p>
@@ -638,7 +638,7 @@
             <a:fld id="{7FFB8D8C-A3C7-4ABD-A7A4-8E27FCE4E604}" type="datetimeFigureOut">
               <a:rPr lang="de-DE" smtClean="0"/>
               <a:pPr/>
-              <a:t>30.03.2012</a:t>
+              <a:t>25.07.2012</a:t>
             </a:fld>
             <a:endParaRPr lang="de-DE"/>
           </a:p>
@@ -805,7 +805,7 @@
             <a:fld id="{7FFB8D8C-A3C7-4ABD-A7A4-8E27FCE4E604}" type="datetimeFigureOut">
               <a:rPr lang="de-DE" smtClean="0"/>
               <a:pPr/>
-              <a:t>30.03.2012</a:t>
+              <a:t>25.07.2012</a:t>
             </a:fld>
             <a:endParaRPr lang="de-DE"/>
           </a:p>
@@ -1048,7 +1048,7 @@
             <a:fld id="{7FFB8D8C-A3C7-4ABD-A7A4-8E27FCE4E604}" type="datetimeFigureOut">
               <a:rPr lang="de-DE" smtClean="0"/>
               <a:pPr/>
-              <a:t>30.03.2012</a:t>
+              <a:t>25.07.2012</a:t>
             </a:fld>
             <a:endParaRPr lang="de-DE"/>
           </a:p>
@@ -1333,7 +1333,7 @@
             <a:fld id="{7FFB8D8C-A3C7-4ABD-A7A4-8E27FCE4E604}" type="datetimeFigureOut">
               <a:rPr lang="de-DE" smtClean="0"/>
               <a:pPr/>
-              <a:t>30.03.2012</a:t>
+              <a:t>25.07.2012</a:t>
             </a:fld>
             <a:endParaRPr lang="de-DE"/>
           </a:p>
@@ -1752,7 +1752,7 @@
             <a:fld id="{7FFB8D8C-A3C7-4ABD-A7A4-8E27FCE4E604}" type="datetimeFigureOut">
               <a:rPr lang="de-DE" smtClean="0"/>
               <a:pPr/>
-              <a:t>30.03.2012</a:t>
+              <a:t>25.07.2012</a:t>
             </a:fld>
             <a:endParaRPr lang="de-DE"/>
           </a:p>
@@ -1867,7 +1867,7 @@
             <a:fld id="{7FFB8D8C-A3C7-4ABD-A7A4-8E27FCE4E604}" type="datetimeFigureOut">
               <a:rPr lang="de-DE" smtClean="0"/>
               <a:pPr/>
-              <a:t>30.03.2012</a:t>
+              <a:t>25.07.2012</a:t>
             </a:fld>
             <a:endParaRPr lang="de-DE"/>
           </a:p>
@@ -1959,7 +1959,7 @@
             <a:fld id="{7FFB8D8C-A3C7-4ABD-A7A4-8E27FCE4E604}" type="datetimeFigureOut">
               <a:rPr lang="de-DE" smtClean="0"/>
               <a:pPr/>
-              <a:t>30.03.2012</a:t>
+              <a:t>25.07.2012</a:t>
             </a:fld>
             <a:endParaRPr lang="de-DE"/>
           </a:p>
@@ -2233,7 +2233,7 @@
             <a:fld id="{7FFB8D8C-A3C7-4ABD-A7A4-8E27FCE4E604}" type="datetimeFigureOut">
               <a:rPr lang="de-DE" smtClean="0"/>
               <a:pPr/>
-              <a:t>30.03.2012</a:t>
+              <a:t>25.07.2012</a:t>
             </a:fld>
             <a:endParaRPr lang="de-DE"/>
           </a:p>
@@ -2483,7 +2483,7 @@
             <a:fld id="{7FFB8D8C-A3C7-4ABD-A7A4-8E27FCE4E604}" type="datetimeFigureOut">
               <a:rPr lang="de-DE" smtClean="0"/>
               <a:pPr/>
-              <a:t>30.03.2012</a:t>
+              <a:t>25.07.2012</a:t>
             </a:fld>
             <a:endParaRPr lang="de-DE"/>
           </a:p>
@@ -2693,7 +2693,7 @@
             <a:fld id="{7FFB8D8C-A3C7-4ABD-A7A4-8E27FCE4E604}" type="datetimeFigureOut">
               <a:rPr lang="de-DE" smtClean="0"/>
               <a:pPr/>
-              <a:t>30.03.2012</a:t>
+              <a:t>25.07.2012</a:t>
             </a:fld>
             <a:endParaRPr lang="de-DE"/>
           </a:p>
@@ -5962,11 +5962,15 @@
           <a:p>
             <a:r>
               <a:rPr lang="de-DE" dirty="0" err="1" smtClean="0"/>
-              <a:t>BioPax</a:t>
+              <a:t>BioPAX</a:t>
             </a:r>
             <a:r>
               <a:rPr lang="de-DE" dirty="0" smtClean="0"/>
-              <a:t> Level 2 – SBML </a:t>
+              <a:t> </a:t>
+            </a:r>
+            <a:r>
+              <a:rPr lang="de-DE" dirty="0" smtClean="0"/>
+              <a:t>Level 2 – SBML </a:t>
             </a:r>
             <a:r>
               <a:rPr lang="de-DE" dirty="0" err="1" smtClean="0"/>
@@ -9056,11 +9060,15 @@
           <a:p>
             <a:r>
               <a:rPr lang="de-DE" dirty="0" err="1" smtClean="0"/>
-              <a:t>BioPax</a:t>
+              <a:t>BioPAX</a:t>
             </a:r>
             <a:r>
               <a:rPr lang="de-DE" dirty="0" smtClean="0"/>
-              <a:t> Level 3 – SBML </a:t>
+              <a:t> </a:t>
+            </a:r>
+            <a:r>
+              <a:rPr lang="de-DE" dirty="0" smtClean="0"/>
+              <a:t>Level 3 – SBML </a:t>
             </a:r>
             <a:r>
               <a:rPr lang="de-DE" dirty="0" err="1" smtClean="0"/>
@@ -13139,7 +13147,7 @@
                   <a:schemeClr val="accent2"/>
                 </a:solidFill>
               </a:rPr>
-              <a:t>BioPax</a:t>
+              <a:t>BioPAX</a:t>
             </a:r>
             <a:r>
               <a:rPr lang="de-DE" b="1" dirty="0" smtClean="0">
@@ -13147,7 +13155,15 @@
                   <a:schemeClr val="accent2"/>
                 </a:solidFill>
               </a:rPr>
-              <a:t> Level 2</a:t>
+              <a:t> </a:t>
+            </a:r>
+            <a:r>
+              <a:rPr lang="de-DE" b="1" dirty="0" smtClean="0">
+                <a:solidFill>
+                  <a:schemeClr val="accent2"/>
+                </a:solidFill>
+              </a:rPr>
+              <a:t>Level 2</a:t>
             </a:r>
             <a:endParaRPr lang="de-DE" b="1" dirty="0">
               <a:solidFill>
@@ -17421,7 +17437,7 @@
                   <a:schemeClr val="accent1"/>
                 </a:solidFill>
               </a:rPr>
-              <a:t>Biopax</a:t>
+              <a:t>BioPAX</a:t>
             </a:r>
             <a:r>
               <a:rPr lang="de-DE" b="1" dirty="0" smtClean="0">
@@ -17429,7 +17445,15 @@
                   <a:schemeClr val="accent1"/>
                 </a:solidFill>
               </a:rPr>
-              <a:t> Level 3</a:t>
+              <a:t> </a:t>
+            </a:r>
+            <a:r>
+              <a:rPr lang="de-DE" b="1" dirty="0" smtClean="0">
+                <a:solidFill>
+                  <a:schemeClr val="accent1"/>
+                </a:solidFill>
+              </a:rPr>
+              <a:t>Level 3</a:t>
             </a:r>
             <a:endParaRPr lang="de-DE" b="1" dirty="0">
               <a:solidFill>
@@ -21740,7 +21764,7 @@
                   <a:schemeClr val="accent1"/>
                 </a:solidFill>
               </a:rPr>
-              <a:t>Biopax</a:t>
+              <a:t>BioPAX</a:t>
             </a:r>
             <a:endParaRPr lang="de-DE" b="1" dirty="0">
               <a:solidFill>
@@ -26061,7 +26085,7 @@
                   <a:schemeClr val="accent1"/>
                 </a:solidFill>
               </a:rPr>
-              <a:t>Biopax</a:t>
+              <a:t>BioPAX</a:t>
             </a:r>
             <a:endParaRPr lang="de-DE" b="1" dirty="0">
               <a:solidFill>

</xml_diff>